<commit_message>
Finished first draft of result presentation
</commit_message>
<xml_diff>
--- a/theory/submission/result_presentation.pptx
+++ b/theory/submission/result_presentation.pptx
@@ -5,7 +5,7 @@
     <p:sldMasterId id="2147483648" r:id="rId1"/>
   </p:sldMasterIdLst>
   <p:notesMasterIdLst>
-    <p:notesMasterId r:id="rId18"/>
+    <p:notesMasterId r:id="rId19"/>
   </p:notesMasterIdLst>
   <p:sldIdLst>
     <p:sldId id="256" r:id="rId2"/>
@@ -24,6 +24,7 @@
     <p:sldId id="271" r:id="rId15"/>
     <p:sldId id="272" r:id="rId16"/>
     <p:sldId id="273" r:id="rId17"/>
+    <p:sldId id="274" r:id="rId18"/>
   </p:sldIdLst>
   <p:sldSz cx="12192000" cy="6858000"/>
   <p:notesSz cx="6858000" cy="9144000"/>
@@ -4982,6 +4983,187 @@
 </p:sld>
 </file>
 
+<file path=ppt/slides/slide17.xml><?xml version="1.0" encoding="utf-8"?>
+<p:sld xmlns:a="http://schemas.openxmlformats.org/drawingml/2006/main" xmlns:r="http://schemas.openxmlformats.org/officeDocument/2006/relationships" xmlns:p="http://schemas.openxmlformats.org/presentationml/2006/main">
+  <p:cSld>
+    <p:spTree>
+      <p:nvGrpSpPr>
+        <p:cNvPr id="1" name=""/>
+        <p:cNvGrpSpPr/>
+        <p:nvPr/>
+      </p:nvGrpSpPr>
+      <p:grpSpPr>
+        <a:xfrm>
+          <a:off x="0" y="0"/>
+          <a:ext cx="0" cy="0"/>
+          <a:chOff x="0" y="0"/>
+          <a:chExt cx="0" cy="0"/>
+        </a:xfrm>
+      </p:grpSpPr>
+      <p:sp>
+        <p:nvSpPr>
+          <p:cNvPr id="2" name="Titel 1">
+            <a:extLst>
+              <a:ext uri="{FF2B5EF4-FFF2-40B4-BE49-F238E27FC236}">
+                <a16:creationId xmlns:a16="http://schemas.microsoft.com/office/drawing/2014/main" id="{29FA37A3-FF5A-44AB-8DF3-1148A58E43F7}"/>
+              </a:ext>
+            </a:extLst>
+          </p:cNvPr>
+          <p:cNvSpPr>
+            <a:spLocks noGrp="1"/>
+          </p:cNvSpPr>
+          <p:nvPr>
+            <p:ph type="title"/>
+          </p:nvPr>
+        </p:nvSpPr>
+        <p:spPr/>
+        <p:txBody>
+          <a:bodyPr/>
+          <a:lstStyle/>
+          <a:p>
+            <a:r>
+              <a:rPr lang="de-DE" dirty="0"/>
+              <a:t>Implementierung in Python</a:t>
+            </a:r>
+          </a:p>
+        </p:txBody>
+      </p:sp>
+      <p:sp>
+        <p:nvSpPr>
+          <p:cNvPr id="3" name="Inhaltsplatzhalter 2">
+            <a:extLst>
+              <a:ext uri="{FF2B5EF4-FFF2-40B4-BE49-F238E27FC236}">
+                <a16:creationId xmlns:a16="http://schemas.microsoft.com/office/drawing/2014/main" id="{D2D4F1E2-9CD7-4555-B49C-3581844978A5}"/>
+              </a:ext>
+            </a:extLst>
+          </p:cNvPr>
+          <p:cNvSpPr>
+            <a:spLocks noGrp="1"/>
+          </p:cNvSpPr>
+          <p:nvPr>
+            <p:ph idx="1"/>
+          </p:nvPr>
+        </p:nvSpPr>
+        <p:spPr/>
+        <p:txBody>
+          <a:bodyPr/>
+          <a:lstStyle/>
+          <a:p>
+            <a:r>
+              <a:rPr lang="de-DE" dirty="0">
+                <a:hlinkClick r:id="rId2"/>
+              </a:rPr>
+              <a:t>Beispielanwendung MNIST Digit Classification</a:t>
+            </a:r>
+            <a:endParaRPr lang="de-DE" dirty="0"/>
+          </a:p>
+          <a:p>
+            <a:r>
+              <a:rPr lang="de-DE" dirty="0"/>
+              <a:t>Aufbau von </a:t>
+            </a:r>
+            <a:r>
+              <a:rPr lang="de-DE" dirty="0" err="1">
+                <a:hlinkClick r:id="rId3"/>
+              </a:rPr>
+              <a:t>src</a:t>
+            </a:r>
+            <a:r>
+              <a:rPr lang="de-DE" dirty="0">
+                <a:hlinkClick r:id="rId3"/>
+              </a:rPr>
+              <a:t>/</a:t>
+            </a:r>
+            <a:r>
+              <a:rPr lang="de-DE" dirty="0" err="1">
+                <a:hlinkClick r:id="rId3"/>
+              </a:rPr>
+              <a:t>lib</a:t>
+            </a:r>
+            <a:endParaRPr lang="de-DE" dirty="0"/>
+          </a:p>
+          <a:p>
+            <a:r>
+              <a:rPr lang="de-DE" dirty="0"/>
+              <a:t>Erklärung von </a:t>
+            </a:r>
+            <a:r>
+              <a:rPr lang="de-DE" dirty="0" err="1">
+                <a:hlinkClick r:id="rId2"/>
+              </a:rPr>
+              <a:t>SequentialModel</a:t>
+            </a:r>
+            <a:r>
+              <a:rPr lang="de-DE" dirty="0"/>
+              <a:t> Klasse</a:t>
+            </a:r>
+          </a:p>
+          <a:p>
+            <a:r>
+              <a:rPr lang="de-DE" dirty="0"/>
+              <a:t>Erklärung von </a:t>
+            </a:r>
+            <a:r>
+              <a:rPr lang="de-DE" dirty="0" err="1">
+                <a:hlinkClick r:id="rId4"/>
+              </a:rPr>
+              <a:t>Dense</a:t>
+            </a:r>
+            <a:r>
+              <a:rPr lang="de-DE" dirty="0">
+                <a:hlinkClick r:id="rId4"/>
+              </a:rPr>
+              <a:t> Layer</a:t>
+            </a:r>
+            <a:r>
+              <a:rPr lang="de-DE" dirty="0"/>
+              <a:t> Klasse</a:t>
+            </a:r>
+          </a:p>
+          <a:p>
+            <a:r>
+              <a:rPr lang="de-DE" dirty="0"/>
+              <a:t>Erklärung von </a:t>
+            </a:r>
+            <a:r>
+              <a:rPr lang="de-DE" dirty="0">
+                <a:hlinkClick r:id="rId5"/>
+              </a:rPr>
+              <a:t>Aktivierungsfunktionen</a:t>
+            </a:r>
+            <a:r>
+              <a:rPr lang="de-DE" dirty="0"/>
+              <a:t>, insbesondere die Anpassungen für numerische Stabilität </a:t>
+            </a:r>
+          </a:p>
+          <a:p>
+            <a:r>
+              <a:rPr lang="de-DE" dirty="0"/>
+              <a:t>Tests erklären, insbesondere </a:t>
+            </a:r>
+            <a:r>
+              <a:rPr lang="de-DE" dirty="0" err="1">
+                <a:hlinkClick r:id="rId6"/>
+              </a:rPr>
+              <a:t>test_model</a:t>
+            </a:r>
+            <a:endParaRPr lang="de-DE" dirty="0"/>
+          </a:p>
+        </p:txBody>
+      </p:sp>
+    </p:spTree>
+    <p:extLst>
+      <p:ext uri="{BB962C8B-B14F-4D97-AF65-F5344CB8AC3E}">
+        <p14:creationId xmlns:p14="http://schemas.microsoft.com/office/powerpoint/2010/main" val="2176953187"/>
+      </p:ext>
+    </p:extLst>
+  </p:cSld>
+  <p:clrMapOvr>
+    <a:masterClrMapping/>
+  </p:clrMapOvr>
+</p:sld>
+</file>
+
 <file path=ppt/slides/slide2.xml><?xml version="1.0" encoding="utf-8"?>
 <p:sld xmlns:a="http://schemas.openxmlformats.org/drawingml/2006/main" xmlns:r="http://schemas.openxmlformats.org/officeDocument/2006/relationships" xmlns:p="http://schemas.openxmlformats.org/presentationml/2006/main">
   <p:cSld>
@@ -5062,13 +5244,7 @@
           <a:p>
             <a:r>
               <a:rPr lang="de-DE" dirty="0"/>
-              <a:t>Implementierung in Python und daraus gelernte Erfahrungen</a:t>
-            </a:r>
-          </a:p>
-          <a:p>
-            <a:r>
-              <a:rPr lang="de-DE" dirty="0"/>
-              <a:t>Beispielanwendung</a:t>
+              <a:t>Implementierung in Python</a:t>
             </a:r>
           </a:p>
         </p:txBody>

</xml_diff>

<commit_message>
revised error at random hidden layer for single input
</commit_message>
<xml_diff>
--- a/theory/submission/result_presentation.pptx
+++ b/theory/submission/result_presentation.pptx
@@ -5,7 +5,7 @@
     <p:sldMasterId id="2147483648" r:id="rId1"/>
   </p:sldMasterIdLst>
   <p:notesMasterIdLst>
-    <p:notesMasterId r:id="rId21"/>
+    <p:notesMasterId r:id="rId22"/>
   </p:notesMasterIdLst>
   <p:sldIdLst>
     <p:sldId id="256" r:id="rId2"/>
@@ -18,15 +18,16 @@
     <p:sldId id="263" r:id="rId9"/>
     <p:sldId id="277" r:id="rId10"/>
     <p:sldId id="264" r:id="rId11"/>
-    <p:sldId id="267" r:id="rId12"/>
-    <p:sldId id="268" r:id="rId13"/>
-    <p:sldId id="269" r:id="rId14"/>
-    <p:sldId id="270" r:id="rId15"/>
-    <p:sldId id="271" r:id="rId16"/>
-    <p:sldId id="272" r:id="rId17"/>
-    <p:sldId id="273" r:id="rId18"/>
-    <p:sldId id="276" r:id="rId19"/>
-    <p:sldId id="274" r:id="rId20"/>
+    <p:sldId id="278" r:id="rId12"/>
+    <p:sldId id="267" r:id="rId13"/>
+    <p:sldId id="268" r:id="rId14"/>
+    <p:sldId id="269" r:id="rId15"/>
+    <p:sldId id="270" r:id="rId16"/>
+    <p:sldId id="271" r:id="rId17"/>
+    <p:sldId id="272" r:id="rId18"/>
+    <p:sldId id="273" r:id="rId19"/>
+    <p:sldId id="276" r:id="rId20"/>
+    <p:sldId id="274" r:id="rId21"/>
   </p:sldIdLst>
   <p:sldSz cx="12192000" cy="6858000"/>
   <p:notesSz cx="6858000" cy="9144000"/>
@@ -570,6 +571,97 @@
 </p:notes>
 </file>
 
+<file path=ppt/notesSlides/notesSlide10.xml><?xml version="1.0" encoding="utf-8"?>
+<p:notes xmlns:a="http://schemas.openxmlformats.org/drawingml/2006/main" xmlns:r="http://schemas.openxmlformats.org/officeDocument/2006/relationships" xmlns:p="http://schemas.openxmlformats.org/presentationml/2006/main">
+  <p:cSld>
+    <p:spTree>
+      <p:nvGrpSpPr>
+        <p:cNvPr id="1" name=""/>
+        <p:cNvGrpSpPr/>
+        <p:nvPr/>
+      </p:nvGrpSpPr>
+      <p:grpSpPr>
+        <a:xfrm>
+          <a:off x="0" y="0"/>
+          <a:ext cx="0" cy="0"/>
+          <a:chOff x="0" y="0"/>
+          <a:chExt cx="0" cy="0"/>
+        </a:xfrm>
+      </p:grpSpPr>
+      <p:sp>
+        <p:nvSpPr>
+          <p:cNvPr id="2" name="Slide Image Placeholder 1"/>
+          <p:cNvSpPr>
+            <a:spLocks noGrp="1" noRot="1" noChangeAspect="1"/>
+          </p:cNvSpPr>
+          <p:nvPr>
+            <p:ph type="sldImg"/>
+          </p:nvPr>
+        </p:nvSpPr>
+        <p:spPr/>
+      </p:sp>
+      <p:sp>
+        <p:nvSpPr>
+          <p:cNvPr id="3" name="Notes Placeholder 2"/>
+          <p:cNvSpPr>
+            <a:spLocks noGrp="1"/>
+          </p:cNvSpPr>
+          <p:nvPr>
+            <p:ph type="body" idx="1"/>
+          </p:nvPr>
+        </p:nvSpPr>
+        <p:spPr/>
+        <p:txBody>
+          <a:bodyPr/>
+          <a:lstStyle/>
+          <a:p>
+            <a:pPr marL="171450" indent="-171450">
+              <a:buFont typeface="Arial" panose="020B0604020202020204" pitchFamily="34" charset="0"/>
+              <a:buChar char="•"/>
+            </a:pPr>
+            <a:r>
+              <a:rPr lang="de-DE" dirty="0"/>
+              <a:t>Kurz erklären, wie der Backpropagation Algorithmus abläuft</a:t>
+            </a:r>
+          </a:p>
+        </p:txBody>
+      </p:sp>
+      <p:sp>
+        <p:nvSpPr>
+          <p:cNvPr id="4" name="Slide Number Placeholder 3"/>
+          <p:cNvSpPr>
+            <a:spLocks noGrp="1"/>
+          </p:cNvSpPr>
+          <p:nvPr>
+            <p:ph type="sldNum" sz="quarter" idx="5"/>
+          </p:nvPr>
+        </p:nvSpPr>
+        <p:spPr/>
+        <p:txBody>
+          <a:bodyPr/>
+          <a:lstStyle/>
+          <a:p>
+            <a:fld id="{D4C12A24-BF94-4906-B274-F5BF4D611E23}" type="slidenum">
+              <a:rPr lang="de-DE" smtClean="0"/>
+              <a:t>19</a:t>
+            </a:fld>
+            <a:endParaRPr lang="de-DE"/>
+          </a:p>
+        </p:txBody>
+      </p:sp>
+    </p:spTree>
+    <p:extLst>
+      <p:ext uri="{BB962C8B-B14F-4D97-AF65-F5344CB8AC3E}">
+        <p14:creationId xmlns:p14="http://schemas.microsoft.com/office/powerpoint/2010/main" val="3675257778"/>
+      </p:ext>
+    </p:extLst>
+  </p:cSld>
+  <p:clrMapOvr>
+    <a:masterClrMapping/>
+  </p:clrMapOvr>
+</p:notes>
+</file>
+
 <file path=ppt/notesSlides/notesSlide2.xml><?xml version="1.0" encoding="utf-8"?>
 <p:notes xmlns:a="http://schemas.openxmlformats.org/drawingml/2006/main" xmlns:r="http://schemas.openxmlformats.org/officeDocument/2006/relationships" xmlns:p="http://schemas.openxmlformats.org/presentationml/2006/main">
   <p:cSld>
@@ -1384,14 +1476,34 @@
           <a:bodyPr/>
           <a:lstStyle/>
           <a:p>
+            <a:pPr marL="171450" marR="0" lvl="0" indent="-171450" algn="l" defTabSz="914400" rtl="0" eaLnBrk="1" fontAlgn="auto" latinLnBrk="0" hangingPunct="1">
+              <a:lnSpc>
+                <a:spcPct val="100000"/>
+              </a:lnSpc>
+              <a:spcBef>
+                <a:spcPts val="0"/>
+              </a:spcBef>
+              <a:spcAft>
+                <a:spcPts val="0"/>
+              </a:spcAft>
+              <a:buClrTx/>
+              <a:buSzTx/>
+              <a:buFont typeface="Arial" panose="020B0604020202020204" pitchFamily="34" charset="0"/>
+              <a:buChar char="•"/>
+              <a:tabLst/>
+              <a:defRPr/>
+            </a:pPr>
+            <a:r>
+              <a:rPr lang="de-DE" sz="1200" dirty="0"/>
+              <a:t>Für jede Aktivierungsfunktion muss Forward Pass und Jacobi Matrix implementiert werden</a:t>
+            </a:r>
+          </a:p>
+          <a:p>
             <a:pPr marL="171450" indent="-171450">
               <a:buFont typeface="Arial" panose="020B0604020202020204" pitchFamily="34" charset="0"/>
               <a:buChar char="•"/>
             </a:pPr>
-            <a:r>
-              <a:rPr lang="de-DE" dirty="0"/>
-              <a:t>Kurz erklären, wie der Backpropagation Algorithmus abläuft</a:t>
-            </a:r>
+            <a:endParaRPr lang="de-DE" dirty="0"/>
           </a:p>
         </p:txBody>
       </p:sp>
@@ -1412,7 +1524,7 @@
           <a:p>
             <a:fld id="{D4C12A24-BF94-4906-B274-F5BF4D611E23}" type="slidenum">
               <a:rPr lang="de-DE" smtClean="0"/>
-              <a:t>18</a:t>
+              <a:t>10</a:t>
             </a:fld>
             <a:endParaRPr lang="de-DE"/>
           </a:p>
@@ -1421,7 +1533,7 @@
     </p:spTree>
     <p:extLst>
       <p:ext uri="{BB962C8B-B14F-4D97-AF65-F5344CB8AC3E}">
-        <p14:creationId xmlns:p14="http://schemas.microsoft.com/office/powerpoint/2010/main" val="3675257778"/>
+        <p14:creationId xmlns:p14="http://schemas.microsoft.com/office/powerpoint/2010/main" val="373455728"/>
       </p:ext>
     </p:extLst>
   </p:cSld>
@@ -4755,6 +4867,35 @@
           <a:chExt cx="0" cy="0"/>
         </a:xfrm>
       </p:grpSpPr>
+      <p:pic>
+        <p:nvPicPr>
+          <p:cNvPr id="20" name="Grafik 12">
+            <a:extLst>
+              <a:ext uri="{FF2B5EF4-FFF2-40B4-BE49-F238E27FC236}">
+                <a16:creationId xmlns:a16="http://schemas.microsoft.com/office/drawing/2014/main" id="{42D617A7-6DFF-4BD1-9EF7-498FCBF27981}"/>
+              </a:ext>
+            </a:extLst>
+          </p:cNvPr>
+          <p:cNvPicPr>
+            <a:picLocks noChangeAspect="1"/>
+          </p:cNvPicPr>
+          <p:nvPr/>
+        </p:nvPicPr>
+        <p:blipFill rotWithShape="1">
+          <a:blip r:embed="rId3"/>
+          <a:srcRect b="6160"/>
+          <a:stretch/>
+        </p:blipFill>
+        <p:spPr>
+          <a:xfrm>
+            <a:off x="8487940" y="365125"/>
+            <a:ext cx="3320701" cy="2126905"/>
+          </a:xfrm>
+          <a:prstGeom prst="rect">
+            <a:avLst/>
+          </a:prstGeom>
+        </p:spPr>
+      </p:pic>
       <p:sp>
         <p:nvSpPr>
           <p:cNvPr id="2" name="Titel 1">
@@ -4771,7 +4912,12 @@
             <p:ph type="title"/>
           </p:nvPr>
         </p:nvSpPr>
-        <p:spPr/>
+        <p:spPr>
+          <a:xfrm>
+            <a:off x="838200" y="365125"/>
+            <a:ext cx="10515600" cy="1325563"/>
+          </a:xfrm>
+        </p:spPr>
         <p:txBody>
           <a:bodyPr>
             <a:normAutofit/>
@@ -4787,7 +4933,7 @@
             </a:br>
             <a:r>
               <a:rPr lang="de-DE" sz="2400" dirty="0"/>
-              <a:t>Fehler bei einem beliebigem Hidden Layer für ein Datum</a:t>
+              <a:t>Fehlersignal an einem beliebigem Hidden Layer für ein Datum</a:t>
             </a:r>
             <a:endParaRPr lang="de-DE" dirty="0"/>
           </a:p>
@@ -4807,16 +4953,15 @@
           </p:cNvPicPr>
           <p:nvPr/>
         </p:nvPicPr>
-        <p:blipFill>
-          <a:blip r:embed="rId2"/>
-          <a:stretch>
-            <a:fillRect/>
-          </a:stretch>
+        <p:blipFill rotWithShape="1">
+          <a:blip r:embed="rId4"/>
+          <a:srcRect r="54093"/>
+          <a:stretch/>
         </p:blipFill>
         <p:spPr>
           <a:xfrm>
-            <a:off x="1292398" y="2195850"/>
-            <a:ext cx="3312129" cy="620225"/>
+            <a:off x="838200" y="1949469"/>
+            <a:ext cx="1520483" cy="620225"/>
           </a:xfrm>
           <a:prstGeom prst="rect">
             <a:avLst/>
@@ -4837,16 +4982,15 @@
           </p:cNvPicPr>
           <p:nvPr/>
         </p:nvPicPr>
-        <p:blipFill>
-          <a:blip r:embed="rId3"/>
-          <a:stretch>
-            <a:fillRect/>
-          </a:stretch>
+        <p:blipFill rotWithShape="1">
+          <a:blip r:embed="rId5"/>
+          <a:srcRect r="3307"/>
+          <a:stretch/>
         </p:blipFill>
         <p:spPr>
           <a:xfrm>
-            <a:off x="5122552" y="2249716"/>
-            <a:ext cx="2581203" cy="512491"/>
+            <a:off x="838200" y="5934519"/>
+            <a:ext cx="2495843" cy="512491"/>
           </a:xfrm>
           <a:prstGeom prst="rect">
             <a:avLst/>
@@ -4855,10 +4999,10 @@
       </p:pic>
       <p:pic>
         <p:nvPicPr>
-          <p:cNvPr id="21" name="Grafik 20">
-            <a:extLst>
-              <a:ext uri="{FF2B5EF4-FFF2-40B4-BE49-F238E27FC236}">
-                <a16:creationId xmlns:a16="http://schemas.microsoft.com/office/drawing/2014/main" id="{A5B9432D-5B2E-45E9-B433-BC2917CE174B}"/>
+          <p:cNvPr id="5" name="Picture 4">
+            <a:extLst>
+              <a:ext uri="{FF2B5EF4-FFF2-40B4-BE49-F238E27FC236}">
+                <a16:creationId xmlns:a16="http://schemas.microsoft.com/office/drawing/2014/main" id="{4779613B-07BE-4517-A5A8-DFBA23949972}"/>
               </a:ext>
             </a:extLst>
           </p:cNvPr>
@@ -4867,16 +5011,15 @@
           </p:cNvPicPr>
           <p:nvPr/>
         </p:nvPicPr>
-        <p:blipFill>
-          <a:blip r:embed="rId4"/>
-          <a:stretch>
-            <a:fillRect/>
-          </a:stretch>
+        <p:blipFill rotWithShape="1">
+          <a:blip r:embed="rId6"/>
+          <a:srcRect l="3886" t="16011" r="4425" b="14589"/>
+          <a:stretch/>
         </p:blipFill>
         <p:spPr>
           <a:xfrm>
-            <a:off x="769035" y="3460964"/>
-            <a:ext cx="6413860" cy="1325562"/>
+            <a:off x="838200" y="3174137"/>
+            <a:ext cx="2808841" cy="512491"/>
           </a:xfrm>
           <a:prstGeom prst="rect">
             <a:avLst/>
@@ -4885,10 +5028,10 @@
       </p:pic>
       <p:pic>
         <p:nvPicPr>
-          <p:cNvPr id="23" name="Grafik 22">
-            <a:extLst>
-              <a:ext uri="{FF2B5EF4-FFF2-40B4-BE49-F238E27FC236}">
-                <a16:creationId xmlns:a16="http://schemas.microsoft.com/office/drawing/2014/main" id="{6533EA64-7F53-4E6F-985B-F916024058D5}"/>
+          <p:cNvPr id="8" name="Picture 7">
+            <a:extLst>
+              <a:ext uri="{FF2B5EF4-FFF2-40B4-BE49-F238E27FC236}">
+                <a16:creationId xmlns:a16="http://schemas.microsoft.com/office/drawing/2014/main" id="{9E930C0C-1E3D-442A-809D-7061C53F2AC1}"/>
               </a:ext>
             </a:extLst>
           </p:cNvPr>
@@ -4898,14 +5041,72 @@
           <p:nvPr/>
         </p:nvPicPr>
         <p:blipFill rotWithShape="1">
-          <a:blip r:embed="rId5"/>
-          <a:srcRect b="6231"/>
+          <a:blip r:embed="rId7"/>
+          <a:srcRect l="6718" t="10977" r="1798"/>
           <a:stretch/>
         </p:blipFill>
         <p:spPr>
           <a:xfrm>
-            <a:off x="769035" y="5152588"/>
-            <a:ext cx="6349884" cy="1068168"/>
+            <a:off x="838200" y="4005845"/>
+            <a:ext cx="5403602" cy="1696331"/>
+          </a:xfrm>
+          <a:prstGeom prst="rect">
+            <a:avLst/>
+          </a:prstGeom>
+        </p:spPr>
+      </p:pic>
+      <p:pic>
+        <p:nvPicPr>
+          <p:cNvPr id="10" name="Picture 9">
+            <a:extLst>
+              <a:ext uri="{FF2B5EF4-FFF2-40B4-BE49-F238E27FC236}">
+                <a16:creationId xmlns:a16="http://schemas.microsoft.com/office/drawing/2014/main" id="{7C0F73AB-5607-43A3-87CA-73763647CE6E}"/>
+              </a:ext>
+            </a:extLst>
+          </p:cNvPr>
+          <p:cNvPicPr>
+            <a:picLocks noChangeAspect="1"/>
+          </p:cNvPicPr>
+          <p:nvPr/>
+        </p:nvPicPr>
+        <p:blipFill rotWithShape="1">
+          <a:blip r:embed="rId8"/>
+          <a:srcRect l="5880" r="7878" b="8127"/>
+          <a:stretch/>
+        </p:blipFill>
+        <p:spPr>
+          <a:xfrm>
+            <a:off x="7165140" y="4005845"/>
+            <a:ext cx="3798927" cy="1738464"/>
+          </a:xfrm>
+          <a:prstGeom prst="rect">
+            <a:avLst/>
+          </a:prstGeom>
+        </p:spPr>
+      </p:pic>
+      <p:pic>
+        <p:nvPicPr>
+          <p:cNvPr id="18" name="Grafik 3">
+            <a:extLst>
+              <a:ext uri="{FF2B5EF4-FFF2-40B4-BE49-F238E27FC236}">
+                <a16:creationId xmlns:a16="http://schemas.microsoft.com/office/drawing/2014/main" id="{43525829-4285-4196-A3E1-C06F9F6F64CE}"/>
+              </a:ext>
+            </a:extLst>
+          </p:cNvPr>
+          <p:cNvPicPr>
+            <a:picLocks noChangeAspect="1"/>
+          </p:cNvPicPr>
+          <p:nvPr/>
+        </p:nvPicPr>
+        <p:blipFill rotWithShape="1">
+          <a:blip r:embed="rId4"/>
+          <a:srcRect l="45719"/>
+          <a:stretch/>
+        </p:blipFill>
+        <p:spPr>
+          <a:xfrm>
+            <a:off x="5223794" y="1949469"/>
+            <a:ext cx="1797868" cy="620225"/>
           </a:xfrm>
           <a:prstGeom prst="rect">
             <a:avLst/>
@@ -4914,108 +5115,10 @@
       </p:pic>
       <p:sp>
         <p:nvSpPr>
-          <p:cNvPr id="24" name="Geschweifte Klammer rechts 23">
-            <a:extLst>
-              <a:ext uri="{FF2B5EF4-FFF2-40B4-BE49-F238E27FC236}">
-                <a16:creationId xmlns:a16="http://schemas.microsoft.com/office/drawing/2014/main" id="{7A16E7DD-2999-49A6-B47A-2E4F38F01F50}"/>
-              </a:ext>
-            </a:extLst>
-          </p:cNvPr>
-          <p:cNvSpPr/>
-          <p:nvPr/>
-        </p:nvSpPr>
-        <p:spPr>
-          <a:xfrm>
-            <a:off x="7300126" y="3460964"/>
-            <a:ext cx="362077" cy="2470913"/>
-          </a:xfrm>
-          <a:prstGeom prst="rightBrace">
-            <a:avLst/>
-          </a:prstGeom>
-          <a:ln>
-            <a:solidFill>
-              <a:schemeClr val="tx1"/>
-            </a:solidFill>
-          </a:ln>
-        </p:spPr>
-        <p:style>
-          <a:lnRef idx="1">
-            <a:schemeClr val="accent1"/>
-          </a:lnRef>
-          <a:fillRef idx="0">
-            <a:schemeClr val="accent1"/>
-          </a:fillRef>
-          <a:effectRef idx="0">
-            <a:schemeClr val="accent1"/>
-          </a:effectRef>
-          <a:fontRef idx="minor">
-            <a:schemeClr val="tx1"/>
-          </a:fontRef>
-        </p:style>
-        <p:txBody>
-          <a:bodyPr rtlCol="0" anchor="ctr"/>
-          <a:lstStyle/>
-          <a:p>
-            <a:pPr algn="ctr"/>
-            <a:endParaRPr lang="de-DE"/>
-          </a:p>
-        </p:txBody>
-      </p:sp>
-      <p:sp>
-        <p:nvSpPr>
-          <p:cNvPr id="25" name="Geschweifte Klammer rechts 24">
-            <a:extLst>
-              <a:ext uri="{FF2B5EF4-FFF2-40B4-BE49-F238E27FC236}">
-                <a16:creationId xmlns:a16="http://schemas.microsoft.com/office/drawing/2014/main" id="{E6A31F8E-0F98-4C30-AC2B-F1AA53F30977}"/>
-              </a:ext>
-            </a:extLst>
-          </p:cNvPr>
-          <p:cNvSpPr/>
-          <p:nvPr/>
-        </p:nvSpPr>
-        <p:spPr>
-          <a:xfrm>
-            <a:off x="7773071" y="2102874"/>
-            <a:ext cx="362077" cy="925812"/>
-          </a:xfrm>
-          <a:prstGeom prst="rightBrace">
-            <a:avLst/>
-          </a:prstGeom>
-          <a:ln>
-            <a:solidFill>
-              <a:schemeClr val="tx1"/>
-            </a:solidFill>
-          </a:ln>
-        </p:spPr>
-        <p:style>
-          <a:lnRef idx="1">
-            <a:schemeClr val="accent1"/>
-          </a:lnRef>
-          <a:fillRef idx="0">
-            <a:schemeClr val="accent1"/>
-          </a:fillRef>
-          <a:effectRef idx="0">
-            <a:schemeClr val="accent1"/>
-          </a:effectRef>
-          <a:fontRef idx="minor">
-            <a:schemeClr val="tx1"/>
-          </a:fontRef>
-        </p:style>
-        <p:txBody>
-          <a:bodyPr rtlCol="0" anchor="ctr"/>
-          <a:lstStyle/>
-          <a:p>
-            <a:pPr algn="ctr"/>
-            <a:endParaRPr lang="de-DE"/>
-          </a:p>
-        </p:txBody>
-      </p:sp>
-      <p:sp>
-        <p:nvSpPr>
-          <p:cNvPr id="26" name="Textfeld 25">
-            <a:extLst>
-              <a:ext uri="{FF2B5EF4-FFF2-40B4-BE49-F238E27FC236}">
-                <a16:creationId xmlns:a16="http://schemas.microsoft.com/office/drawing/2014/main" id="{FB294907-7138-4AF1-B6F6-909266970080}"/>
+          <p:cNvPr id="11" name="TextBox 10">
+            <a:extLst>
+              <a:ext uri="{FF2B5EF4-FFF2-40B4-BE49-F238E27FC236}">
+                <a16:creationId xmlns:a16="http://schemas.microsoft.com/office/drawing/2014/main" id="{31FA7E43-1D08-405F-9BA4-7DF8D07FD2F3}"/>
               </a:ext>
             </a:extLst>
           </p:cNvPr>
@@ -5024,8 +5127,8 @@
         </p:nvSpPr>
         <p:spPr>
           <a:xfrm>
-            <a:off x="8285871" y="2325858"/>
-            <a:ext cx="2686929" cy="646331"/>
+            <a:off x="4009292" y="3134087"/>
+            <a:ext cx="4581379" cy="523220"/>
           </a:xfrm>
           <a:prstGeom prst="rect">
             <a:avLst/>
@@ -5039,18 +5142,18 @@
           <a:lstStyle/>
           <a:p>
             <a:r>
-              <a:rPr lang="de-DE" dirty="0"/>
-              <a:t>Allgemeingültiges Ergebnis für jedes Hidden Layer</a:t>
+              <a:rPr lang="de-DE" sz="1400" dirty="0"/>
+              <a:t>Fehlersignal am vorigen Layer (Output Layer im Beispiel) ist bereits vorigen Schritt berechnet!</a:t>
             </a:r>
           </a:p>
         </p:txBody>
       </p:sp>
       <p:sp>
         <p:nvSpPr>
-          <p:cNvPr id="27" name="Textfeld 26">
-            <a:extLst>
-              <a:ext uri="{FF2B5EF4-FFF2-40B4-BE49-F238E27FC236}">
-                <a16:creationId xmlns:a16="http://schemas.microsoft.com/office/drawing/2014/main" id="{C15B4257-BDFA-4A19-BF45-907D571C3B90}"/>
+          <p:cNvPr id="12" name="TextBox 11">
+            <a:extLst>
+              <a:ext uri="{FF2B5EF4-FFF2-40B4-BE49-F238E27FC236}">
+                <a16:creationId xmlns:a16="http://schemas.microsoft.com/office/drawing/2014/main" id="{6EB66535-E1CE-4C8D-B4F2-9A73366DC6F4}"/>
               </a:ext>
             </a:extLst>
           </p:cNvPr>
@@ -5059,8 +5162,8 @@
         </p:nvSpPr>
         <p:spPr>
           <a:xfrm>
-            <a:off x="7843410" y="4324861"/>
-            <a:ext cx="3489960" cy="923330"/>
+            <a:off x="7165140" y="5726738"/>
+            <a:ext cx="4914318" cy="1169551"/>
           </a:xfrm>
           <a:prstGeom prst="rect">
             <a:avLst/>
@@ -5073,9 +5176,100 @@
           </a:bodyPr>
           <a:lstStyle/>
           <a:p>
-            <a:r>
-              <a:rPr lang="de-DE" dirty="0"/>
-              <a:t>Ergebnis, wenn die Aktivierungsfunktion in Layer l-1 die Sigmoid Funktion ist</a:t>
+            <a:pPr marL="285750" indent="-285750">
+              <a:buFont typeface="Arial" panose="020B0604020202020204" pitchFamily="34" charset="0"/>
+              <a:buChar char="•"/>
+            </a:pPr>
+            <a:r>
+              <a:rPr lang="de-DE" sz="1400" dirty="0"/>
+              <a:t>Wiederum die Ableitung der Aktivierungen nach den dendritischen Potenzialen </a:t>
+            </a:r>
+            <a:r>
+              <a:rPr lang="de-DE" sz="1400" dirty="0">
+                <a:sym typeface="Wingdings" panose="05000000000000000000" pitchFamily="2" charset="2"/>
+              </a:rPr>
+              <a:t></a:t>
+            </a:r>
+            <a:endParaRPr lang="de-DE" sz="1400" dirty="0"/>
+          </a:p>
+          <a:p>
+            <a:pPr marL="285750" indent="-285750">
+              <a:buFont typeface="Arial" panose="020B0604020202020204" pitchFamily="34" charset="0"/>
+              <a:buChar char="•"/>
+            </a:pPr>
+            <a:r>
+              <a:rPr lang="de-DE" sz="1400" dirty="0"/>
+              <a:t>Lediglich Forward Pass und Jacobi Matrix muss für jede Aktivierungsfunktion implementiert werden um Fehlersignal an jedem Layer zu berechnen</a:t>
+            </a:r>
+          </a:p>
+        </p:txBody>
+      </p:sp>
+      <p:sp>
+        <p:nvSpPr>
+          <p:cNvPr id="13" name="TextBox 12">
+            <a:extLst>
+              <a:ext uri="{FF2B5EF4-FFF2-40B4-BE49-F238E27FC236}">
+                <a16:creationId xmlns:a16="http://schemas.microsoft.com/office/drawing/2014/main" id="{EDFA226D-DDB5-4514-AA2B-71390FFAB519}"/>
+              </a:ext>
+            </a:extLst>
+          </p:cNvPr>
+          <p:cNvSpPr txBox="1"/>
+          <p:nvPr/>
+        </p:nvSpPr>
+        <p:spPr>
+          <a:xfrm>
+            <a:off x="3488789" y="6086630"/>
+            <a:ext cx="2288344" cy="307777"/>
+          </a:xfrm>
+          <a:prstGeom prst="rect">
+            <a:avLst/>
+          </a:prstGeom>
+          <a:noFill/>
+        </p:spPr>
+        <p:txBody>
+          <a:bodyPr wrap="square" rtlCol="0">
+            <a:spAutoFit/>
+          </a:bodyPr>
+          <a:lstStyle/>
+          <a:p>
+            <a:r>
+              <a:rPr lang="de-DE" sz="1400" dirty="0"/>
+              <a:t>Alle Terme zusammengefasst</a:t>
+            </a:r>
+          </a:p>
+        </p:txBody>
+      </p:sp>
+      <p:sp>
+        <p:nvSpPr>
+          <p:cNvPr id="14" name="TextBox 13">
+            <a:extLst>
+              <a:ext uri="{FF2B5EF4-FFF2-40B4-BE49-F238E27FC236}">
+                <a16:creationId xmlns:a16="http://schemas.microsoft.com/office/drawing/2014/main" id="{C1A09ABE-A349-40B7-9F88-189D1062A853}"/>
+              </a:ext>
+            </a:extLst>
+          </p:cNvPr>
+          <p:cNvSpPr txBox="1"/>
+          <p:nvPr/>
+        </p:nvSpPr>
+        <p:spPr>
+          <a:xfrm>
+            <a:off x="2719754" y="1936416"/>
+            <a:ext cx="2278966" cy="830997"/>
+          </a:xfrm>
+          <a:prstGeom prst="rect">
+            <a:avLst/>
+          </a:prstGeom>
+          <a:noFill/>
+        </p:spPr>
+        <p:txBody>
+          <a:bodyPr wrap="square" rtlCol="0">
+            <a:spAutoFit/>
+          </a:bodyPr>
+          <a:lstStyle/>
+          <a:p>
+            <a:r>
+              <a:rPr lang="de-DE" sz="1200" dirty="0"/>
+              <a:t>Fehlersignale im Hidden Layer l-1, bzw. die Ableitung des Fehlers nach den dendritischen Potenzialen</a:t>
             </a:r>
           </a:p>
         </p:txBody>
@@ -5090,10 +5284,531 @@
   <p:clrMapOvr>
     <a:masterClrMapping/>
   </p:clrMapOvr>
+  <p:timing>
+    <p:tnLst>
+      <p:par>
+        <p:cTn id="1" dur="indefinite" restart="never" nodeType="tmRoot">
+          <p:childTnLst>
+            <p:seq concurrent="1" nextAc="seek">
+              <p:cTn id="2" dur="indefinite" nodeType="mainSeq">
+                <p:childTnLst>
+                  <p:par>
+                    <p:cTn id="3" fill="hold">
+                      <p:stCondLst>
+                        <p:cond delay="indefinite"/>
+                      </p:stCondLst>
+                      <p:childTnLst>
+                        <p:par>
+                          <p:cTn id="4" fill="hold">
+                            <p:stCondLst>
+                              <p:cond delay="0"/>
+                            </p:stCondLst>
+                            <p:childTnLst>
+                              <p:par>
+                                <p:cTn id="5" presetID="1" presetClass="entr" presetSubtype="0" fill="hold" nodeType="clickEffect">
+                                  <p:stCondLst>
+                                    <p:cond delay="0"/>
+                                  </p:stCondLst>
+                                  <p:childTnLst>
+                                    <p:set>
+                                      <p:cBhvr>
+                                        <p:cTn id="6" dur="1" fill="hold">
+                                          <p:stCondLst>
+                                            <p:cond delay="0"/>
+                                          </p:stCondLst>
+                                        </p:cTn>
+                                        <p:tgtEl>
+                                          <p:spTgt spid="4"/>
+                                        </p:tgtEl>
+                                        <p:attrNameLst>
+                                          <p:attrName>style.visibility</p:attrName>
+                                        </p:attrNameLst>
+                                      </p:cBhvr>
+                                      <p:to>
+                                        <p:strVal val="visible"/>
+                                      </p:to>
+                                    </p:set>
+                                  </p:childTnLst>
+                                </p:cTn>
+                              </p:par>
+                              <p:par>
+                                <p:cTn id="7" presetID="1" presetClass="entr" presetSubtype="0" fill="hold" nodeType="withEffect">
+                                  <p:stCondLst>
+                                    <p:cond delay="0"/>
+                                  </p:stCondLst>
+                                  <p:childTnLst>
+                                    <p:set>
+                                      <p:cBhvr>
+                                        <p:cTn id="8" dur="1" fill="hold">
+                                          <p:stCondLst>
+                                            <p:cond delay="0"/>
+                                          </p:stCondLst>
+                                        </p:cTn>
+                                        <p:tgtEl>
+                                          <p:spTgt spid="20"/>
+                                        </p:tgtEl>
+                                        <p:attrNameLst>
+                                          <p:attrName>style.visibility</p:attrName>
+                                        </p:attrNameLst>
+                                      </p:cBhvr>
+                                      <p:to>
+                                        <p:strVal val="visible"/>
+                                      </p:to>
+                                    </p:set>
+                                  </p:childTnLst>
+                                </p:cTn>
+                              </p:par>
+                              <p:par>
+                                <p:cTn id="9" presetID="1" presetClass="entr" presetSubtype="0" fill="hold" grpId="0" nodeType="withEffect">
+                                  <p:stCondLst>
+                                    <p:cond delay="0"/>
+                                  </p:stCondLst>
+                                  <p:childTnLst>
+                                    <p:set>
+                                      <p:cBhvr>
+                                        <p:cTn id="10" dur="1" fill="hold">
+                                          <p:stCondLst>
+                                            <p:cond delay="0"/>
+                                          </p:stCondLst>
+                                        </p:cTn>
+                                        <p:tgtEl>
+                                          <p:spTgt spid="14"/>
+                                        </p:tgtEl>
+                                        <p:attrNameLst>
+                                          <p:attrName>style.visibility</p:attrName>
+                                        </p:attrNameLst>
+                                      </p:cBhvr>
+                                      <p:to>
+                                        <p:strVal val="visible"/>
+                                      </p:to>
+                                    </p:set>
+                                  </p:childTnLst>
+                                </p:cTn>
+                              </p:par>
+                            </p:childTnLst>
+                          </p:cTn>
+                        </p:par>
+                      </p:childTnLst>
+                    </p:cTn>
+                  </p:par>
+                  <p:par>
+                    <p:cTn id="11" fill="hold">
+                      <p:stCondLst>
+                        <p:cond delay="indefinite"/>
+                      </p:stCondLst>
+                      <p:childTnLst>
+                        <p:par>
+                          <p:cTn id="12" fill="hold">
+                            <p:stCondLst>
+                              <p:cond delay="0"/>
+                            </p:stCondLst>
+                            <p:childTnLst>
+                              <p:par>
+                                <p:cTn id="13" presetID="1" presetClass="entr" presetSubtype="0" fill="hold" nodeType="clickEffect">
+                                  <p:stCondLst>
+                                    <p:cond delay="0"/>
+                                  </p:stCondLst>
+                                  <p:childTnLst>
+                                    <p:set>
+                                      <p:cBhvr>
+                                        <p:cTn id="14" dur="1" fill="hold">
+                                          <p:stCondLst>
+                                            <p:cond delay="0"/>
+                                          </p:stCondLst>
+                                        </p:cTn>
+                                        <p:tgtEl>
+                                          <p:spTgt spid="18"/>
+                                        </p:tgtEl>
+                                        <p:attrNameLst>
+                                          <p:attrName>style.visibility</p:attrName>
+                                        </p:attrNameLst>
+                                      </p:cBhvr>
+                                      <p:to>
+                                        <p:strVal val="visible"/>
+                                      </p:to>
+                                    </p:set>
+                                  </p:childTnLst>
+                                </p:cTn>
+                              </p:par>
+                            </p:childTnLst>
+                          </p:cTn>
+                        </p:par>
+                      </p:childTnLst>
+                    </p:cTn>
+                  </p:par>
+                  <p:par>
+                    <p:cTn id="15" fill="hold">
+                      <p:stCondLst>
+                        <p:cond delay="indefinite"/>
+                      </p:stCondLst>
+                      <p:childTnLst>
+                        <p:par>
+                          <p:cTn id="16" fill="hold">
+                            <p:stCondLst>
+                              <p:cond delay="0"/>
+                            </p:stCondLst>
+                            <p:childTnLst>
+                              <p:par>
+                                <p:cTn id="17" presetID="1" presetClass="entr" presetSubtype="0" fill="hold" nodeType="clickEffect">
+                                  <p:stCondLst>
+                                    <p:cond delay="0"/>
+                                  </p:stCondLst>
+                                  <p:childTnLst>
+                                    <p:set>
+                                      <p:cBhvr>
+                                        <p:cTn id="18" dur="1" fill="hold">
+                                          <p:stCondLst>
+                                            <p:cond delay="0"/>
+                                          </p:stCondLst>
+                                        </p:cTn>
+                                        <p:tgtEl>
+                                          <p:spTgt spid="5"/>
+                                        </p:tgtEl>
+                                        <p:attrNameLst>
+                                          <p:attrName>style.visibility</p:attrName>
+                                        </p:attrNameLst>
+                                      </p:cBhvr>
+                                      <p:to>
+                                        <p:strVal val="visible"/>
+                                      </p:to>
+                                    </p:set>
+                                  </p:childTnLst>
+                                </p:cTn>
+                              </p:par>
+                              <p:par>
+                                <p:cTn id="19" presetID="1" presetClass="entr" presetSubtype="0" fill="hold" grpId="0" nodeType="withEffect">
+                                  <p:stCondLst>
+                                    <p:cond delay="0"/>
+                                  </p:stCondLst>
+                                  <p:childTnLst>
+                                    <p:set>
+                                      <p:cBhvr>
+                                        <p:cTn id="20" dur="1" fill="hold">
+                                          <p:stCondLst>
+                                            <p:cond delay="0"/>
+                                          </p:stCondLst>
+                                        </p:cTn>
+                                        <p:tgtEl>
+                                          <p:spTgt spid="11"/>
+                                        </p:tgtEl>
+                                        <p:attrNameLst>
+                                          <p:attrName>style.visibility</p:attrName>
+                                        </p:attrNameLst>
+                                      </p:cBhvr>
+                                      <p:to>
+                                        <p:strVal val="visible"/>
+                                      </p:to>
+                                    </p:set>
+                                  </p:childTnLst>
+                                </p:cTn>
+                              </p:par>
+                            </p:childTnLst>
+                          </p:cTn>
+                        </p:par>
+                      </p:childTnLst>
+                    </p:cTn>
+                  </p:par>
+                  <p:par>
+                    <p:cTn id="21" fill="hold">
+                      <p:stCondLst>
+                        <p:cond delay="indefinite"/>
+                      </p:stCondLst>
+                      <p:childTnLst>
+                        <p:par>
+                          <p:cTn id="22" fill="hold">
+                            <p:stCondLst>
+                              <p:cond delay="0"/>
+                            </p:stCondLst>
+                            <p:childTnLst>
+                              <p:par>
+                                <p:cTn id="23" presetID="1" presetClass="entr" presetSubtype="0" fill="hold" nodeType="clickEffect">
+                                  <p:stCondLst>
+                                    <p:cond delay="0"/>
+                                  </p:stCondLst>
+                                  <p:childTnLst>
+                                    <p:set>
+                                      <p:cBhvr>
+                                        <p:cTn id="24" dur="1" fill="hold">
+                                          <p:stCondLst>
+                                            <p:cond delay="0"/>
+                                          </p:stCondLst>
+                                        </p:cTn>
+                                        <p:tgtEl>
+                                          <p:spTgt spid="8"/>
+                                        </p:tgtEl>
+                                        <p:attrNameLst>
+                                          <p:attrName>style.visibility</p:attrName>
+                                        </p:attrNameLst>
+                                      </p:cBhvr>
+                                      <p:to>
+                                        <p:strVal val="visible"/>
+                                      </p:to>
+                                    </p:set>
+                                  </p:childTnLst>
+                                </p:cTn>
+                              </p:par>
+                            </p:childTnLst>
+                          </p:cTn>
+                        </p:par>
+                      </p:childTnLst>
+                    </p:cTn>
+                  </p:par>
+                  <p:par>
+                    <p:cTn id="25" fill="hold">
+                      <p:stCondLst>
+                        <p:cond delay="indefinite"/>
+                      </p:stCondLst>
+                      <p:childTnLst>
+                        <p:par>
+                          <p:cTn id="26" fill="hold">
+                            <p:stCondLst>
+                              <p:cond delay="0"/>
+                            </p:stCondLst>
+                            <p:childTnLst>
+                              <p:par>
+                                <p:cTn id="27" presetID="1" presetClass="entr" presetSubtype="0" fill="hold" nodeType="clickEffect">
+                                  <p:stCondLst>
+                                    <p:cond delay="0"/>
+                                  </p:stCondLst>
+                                  <p:childTnLst>
+                                    <p:set>
+                                      <p:cBhvr>
+                                        <p:cTn id="28" dur="1" fill="hold">
+                                          <p:stCondLst>
+                                            <p:cond delay="0"/>
+                                          </p:stCondLst>
+                                        </p:cTn>
+                                        <p:tgtEl>
+                                          <p:spTgt spid="10"/>
+                                        </p:tgtEl>
+                                        <p:attrNameLst>
+                                          <p:attrName>style.visibility</p:attrName>
+                                        </p:attrNameLst>
+                                      </p:cBhvr>
+                                      <p:to>
+                                        <p:strVal val="visible"/>
+                                      </p:to>
+                                    </p:set>
+                                  </p:childTnLst>
+                                </p:cTn>
+                              </p:par>
+                              <p:par>
+                                <p:cTn id="29" presetID="1" presetClass="entr" presetSubtype="0" fill="hold" grpId="0" nodeType="withEffect">
+                                  <p:stCondLst>
+                                    <p:cond delay="0"/>
+                                  </p:stCondLst>
+                                  <p:childTnLst>
+                                    <p:set>
+                                      <p:cBhvr>
+                                        <p:cTn id="30" dur="1" fill="hold">
+                                          <p:stCondLst>
+                                            <p:cond delay="0"/>
+                                          </p:stCondLst>
+                                        </p:cTn>
+                                        <p:tgtEl>
+                                          <p:spTgt spid="12"/>
+                                        </p:tgtEl>
+                                        <p:attrNameLst>
+                                          <p:attrName>style.visibility</p:attrName>
+                                        </p:attrNameLst>
+                                      </p:cBhvr>
+                                      <p:to>
+                                        <p:strVal val="visible"/>
+                                      </p:to>
+                                    </p:set>
+                                  </p:childTnLst>
+                                </p:cTn>
+                              </p:par>
+                            </p:childTnLst>
+                          </p:cTn>
+                        </p:par>
+                      </p:childTnLst>
+                    </p:cTn>
+                  </p:par>
+                  <p:par>
+                    <p:cTn id="31" fill="hold">
+                      <p:stCondLst>
+                        <p:cond delay="indefinite"/>
+                      </p:stCondLst>
+                      <p:childTnLst>
+                        <p:par>
+                          <p:cTn id="32" fill="hold">
+                            <p:stCondLst>
+                              <p:cond delay="0"/>
+                            </p:stCondLst>
+                            <p:childTnLst>
+                              <p:par>
+                                <p:cTn id="33" presetID="1" presetClass="entr" presetSubtype="0" fill="hold" nodeType="clickEffect">
+                                  <p:stCondLst>
+                                    <p:cond delay="0"/>
+                                  </p:stCondLst>
+                                  <p:childTnLst>
+                                    <p:set>
+                                      <p:cBhvr>
+                                        <p:cTn id="34" dur="1" fill="hold">
+                                          <p:stCondLst>
+                                            <p:cond delay="0"/>
+                                          </p:stCondLst>
+                                        </p:cTn>
+                                        <p:tgtEl>
+                                          <p:spTgt spid="19"/>
+                                        </p:tgtEl>
+                                        <p:attrNameLst>
+                                          <p:attrName>style.visibility</p:attrName>
+                                        </p:attrNameLst>
+                                      </p:cBhvr>
+                                      <p:to>
+                                        <p:strVal val="visible"/>
+                                      </p:to>
+                                    </p:set>
+                                  </p:childTnLst>
+                                </p:cTn>
+                              </p:par>
+                              <p:par>
+                                <p:cTn id="35" presetID="1" presetClass="entr" presetSubtype="0" fill="hold" grpId="0" nodeType="withEffect">
+                                  <p:stCondLst>
+                                    <p:cond delay="0"/>
+                                  </p:stCondLst>
+                                  <p:childTnLst>
+                                    <p:set>
+                                      <p:cBhvr>
+                                        <p:cTn id="36" dur="1" fill="hold">
+                                          <p:stCondLst>
+                                            <p:cond delay="0"/>
+                                          </p:stCondLst>
+                                        </p:cTn>
+                                        <p:tgtEl>
+                                          <p:spTgt spid="13"/>
+                                        </p:tgtEl>
+                                        <p:attrNameLst>
+                                          <p:attrName>style.visibility</p:attrName>
+                                        </p:attrNameLst>
+                                      </p:cBhvr>
+                                      <p:to>
+                                        <p:strVal val="visible"/>
+                                      </p:to>
+                                    </p:set>
+                                  </p:childTnLst>
+                                </p:cTn>
+                              </p:par>
+                            </p:childTnLst>
+                          </p:cTn>
+                        </p:par>
+                      </p:childTnLst>
+                    </p:cTn>
+                  </p:par>
+                </p:childTnLst>
+              </p:cTn>
+              <p:prevCondLst>
+                <p:cond evt="onPrev" delay="0">
+                  <p:tgtEl>
+                    <p:sldTgt/>
+                  </p:tgtEl>
+                </p:cond>
+              </p:prevCondLst>
+              <p:nextCondLst>
+                <p:cond evt="onNext" delay="0">
+                  <p:tgtEl>
+                    <p:sldTgt/>
+                  </p:tgtEl>
+                </p:cond>
+              </p:nextCondLst>
+            </p:seq>
+          </p:childTnLst>
+        </p:cTn>
+      </p:par>
+    </p:tnLst>
+    <p:bldLst>
+      <p:bldP spid="11" grpId="0"/>
+      <p:bldP spid="12" grpId="0"/>
+      <p:bldP spid="13" grpId="0"/>
+      <p:bldP spid="14" grpId="0"/>
+    </p:bldLst>
+  </p:timing>
 </p:sld>
 </file>
 
 <file path=ppt/slides/slide11.xml><?xml version="1.0" encoding="utf-8"?>
+<p:sld xmlns:a="http://schemas.openxmlformats.org/drawingml/2006/main" xmlns:r="http://schemas.openxmlformats.org/officeDocument/2006/relationships" xmlns:p="http://schemas.openxmlformats.org/presentationml/2006/main">
+  <p:cSld>
+    <p:spTree>
+      <p:nvGrpSpPr>
+        <p:cNvPr id="1" name=""/>
+        <p:cNvGrpSpPr/>
+        <p:nvPr/>
+      </p:nvGrpSpPr>
+      <p:grpSpPr>
+        <a:xfrm>
+          <a:off x="0" y="0"/>
+          <a:ext cx="0" cy="0"/>
+          <a:chOff x="0" y="0"/>
+          <a:chExt cx="0" cy="0"/>
+        </a:xfrm>
+      </p:grpSpPr>
+      <p:sp>
+        <p:nvSpPr>
+          <p:cNvPr id="2" name="Title 1">
+            <a:extLst>
+              <a:ext uri="{FF2B5EF4-FFF2-40B4-BE49-F238E27FC236}">
+                <a16:creationId xmlns:a16="http://schemas.microsoft.com/office/drawing/2014/main" id="{0D9B9604-497A-4863-A958-D569666FE5FD}"/>
+              </a:ext>
+            </a:extLst>
+          </p:cNvPr>
+          <p:cNvSpPr>
+            <a:spLocks noGrp="1"/>
+          </p:cNvSpPr>
+          <p:nvPr>
+            <p:ph type="title"/>
+          </p:nvPr>
+        </p:nvSpPr>
+        <p:spPr/>
+        <p:txBody>
+          <a:bodyPr/>
+          <a:lstStyle/>
+          <a:p>
+            <a:endParaRPr lang="de-DE"/>
+          </a:p>
+        </p:txBody>
+      </p:sp>
+      <p:sp>
+        <p:nvSpPr>
+          <p:cNvPr id="3" name="Content Placeholder 2">
+            <a:extLst>
+              <a:ext uri="{FF2B5EF4-FFF2-40B4-BE49-F238E27FC236}">
+                <a16:creationId xmlns:a16="http://schemas.microsoft.com/office/drawing/2014/main" id="{80FDD0F2-45E6-44BA-9B3F-C48279462AE4}"/>
+              </a:ext>
+            </a:extLst>
+          </p:cNvPr>
+          <p:cNvSpPr>
+            <a:spLocks noGrp="1"/>
+          </p:cNvSpPr>
+          <p:nvPr>
+            <p:ph idx="1"/>
+          </p:nvPr>
+        </p:nvSpPr>
+        <p:spPr/>
+        <p:txBody>
+          <a:bodyPr/>
+          <a:lstStyle/>
+          <a:p>
+            <a:endParaRPr lang="de-DE"/>
+          </a:p>
+        </p:txBody>
+      </p:sp>
+    </p:spTree>
+    <p:extLst>
+      <p:ext uri="{BB962C8B-B14F-4D97-AF65-F5344CB8AC3E}">
+        <p14:creationId xmlns:p14="http://schemas.microsoft.com/office/powerpoint/2010/main" val="48431961"/>
+      </p:ext>
+    </p:extLst>
+  </p:cSld>
+  <p:clrMapOvr>
+    <a:masterClrMapping/>
+  </p:clrMapOvr>
+</p:sld>
+</file>
+
+<file path=ppt/slides/slide12.xml><?xml version="1.0" encoding="utf-8"?>
 <p:sld xmlns:a="http://schemas.openxmlformats.org/drawingml/2006/main" xmlns:r="http://schemas.openxmlformats.org/officeDocument/2006/relationships" xmlns:p="http://schemas.openxmlformats.org/presentationml/2006/main">
   <p:cSld>
     <p:spTree>
@@ -5232,7 +5947,7 @@
 </p:sld>
 </file>
 
-<file path=ppt/slides/slide12.xml><?xml version="1.0" encoding="utf-8"?>
+<file path=ppt/slides/slide13.xml><?xml version="1.0" encoding="utf-8"?>
 <p:sld xmlns:a="http://schemas.openxmlformats.org/drawingml/2006/main" xmlns:r="http://schemas.openxmlformats.org/officeDocument/2006/relationships" xmlns:p="http://schemas.openxmlformats.org/presentationml/2006/main">
   <p:cSld>
     <p:spTree>
@@ -5371,7 +6086,7 @@
 </p:sld>
 </file>
 
-<file path=ppt/slides/slide13.xml><?xml version="1.0" encoding="utf-8"?>
+<file path=ppt/slides/slide14.xml><?xml version="1.0" encoding="utf-8"?>
 <p:sld xmlns:a="http://schemas.openxmlformats.org/drawingml/2006/main" xmlns:r="http://schemas.openxmlformats.org/officeDocument/2006/relationships" xmlns:p="http://schemas.openxmlformats.org/presentationml/2006/main">
   <p:cSld>
     <p:spTree>
@@ -5508,7 +6223,7 @@
 </p:sld>
 </file>
 
-<file path=ppt/slides/slide14.xml><?xml version="1.0" encoding="utf-8"?>
+<file path=ppt/slides/slide15.xml><?xml version="1.0" encoding="utf-8"?>
 <p:sld xmlns:a="http://schemas.openxmlformats.org/drawingml/2006/main" xmlns:r="http://schemas.openxmlformats.org/officeDocument/2006/relationships" xmlns:p="http://schemas.openxmlformats.org/presentationml/2006/main">
   <p:cSld>
     <p:spTree>
@@ -5646,7 +6361,7 @@
 </p:sld>
 </file>
 
-<file path=ppt/slides/slide15.xml><?xml version="1.0" encoding="utf-8"?>
+<file path=ppt/slides/slide16.xml><?xml version="1.0" encoding="utf-8"?>
 <p:sld xmlns:a="http://schemas.openxmlformats.org/drawingml/2006/main" xmlns:r="http://schemas.openxmlformats.org/officeDocument/2006/relationships" xmlns:p="http://schemas.openxmlformats.org/presentationml/2006/main">
   <p:cSld>
     <p:spTree>
@@ -5754,7 +6469,7 @@
 </p:sld>
 </file>
 
-<file path=ppt/slides/slide16.xml><?xml version="1.0" encoding="utf-8"?>
+<file path=ppt/slides/slide17.xml><?xml version="1.0" encoding="utf-8"?>
 <p:sld xmlns:a="http://schemas.openxmlformats.org/drawingml/2006/main" xmlns:r="http://schemas.openxmlformats.org/officeDocument/2006/relationships" xmlns:p="http://schemas.openxmlformats.org/presentationml/2006/main">
   <p:cSld>
     <p:spTree>
@@ -5863,7 +6578,7 @@
 </p:sld>
 </file>
 
-<file path=ppt/slides/slide17.xml><?xml version="1.0" encoding="utf-8"?>
+<file path=ppt/slides/slide18.xml><?xml version="1.0" encoding="utf-8"?>
 <p:sld xmlns:a="http://schemas.openxmlformats.org/drawingml/2006/main" xmlns:r="http://schemas.openxmlformats.org/officeDocument/2006/relationships" xmlns:p="http://schemas.openxmlformats.org/presentationml/2006/main">
   <p:cSld>
     <p:spTree>
@@ -6025,77 +6740,6 @@
 </p:sld>
 </file>
 
-<file path=ppt/slides/slide18.xml><?xml version="1.0" encoding="utf-8"?>
-<p:sld xmlns:a="http://schemas.openxmlformats.org/drawingml/2006/main" xmlns:r="http://schemas.openxmlformats.org/officeDocument/2006/relationships" xmlns:p="http://schemas.openxmlformats.org/presentationml/2006/main">
-  <p:cSld>
-    <p:spTree>
-      <p:nvGrpSpPr>
-        <p:cNvPr id="1" name=""/>
-        <p:cNvGrpSpPr/>
-        <p:nvPr/>
-      </p:nvGrpSpPr>
-      <p:grpSpPr>
-        <a:xfrm>
-          <a:off x="0" y="0"/>
-          <a:ext cx="0" cy="0"/>
-          <a:chOff x="0" y="0"/>
-          <a:chExt cx="0" cy="0"/>
-        </a:xfrm>
-      </p:grpSpPr>
-      <p:sp>
-        <p:nvSpPr>
-          <p:cNvPr id="2" name="Titel 1">
-            <a:extLst>
-              <a:ext uri="{FF2B5EF4-FFF2-40B4-BE49-F238E27FC236}">
-                <a16:creationId xmlns:a16="http://schemas.microsoft.com/office/drawing/2014/main" id="{2911F67F-327B-4C51-B9E3-A1D3BCC720A5}"/>
-              </a:ext>
-            </a:extLst>
-          </p:cNvPr>
-          <p:cNvSpPr>
-            <a:spLocks noGrp="1"/>
-          </p:cNvSpPr>
-          <p:nvPr>
-            <p:ph type="title"/>
-          </p:nvPr>
-        </p:nvSpPr>
-        <p:spPr>
-          <a:xfrm>
-            <a:off x="838200" y="365125"/>
-            <a:ext cx="10515600" cy="1325563"/>
-          </a:xfrm>
-        </p:spPr>
-        <p:txBody>
-          <a:bodyPr/>
-          <a:lstStyle/>
-          <a:p>
-            <a:r>
-              <a:rPr lang="de-DE" dirty="0"/>
-              <a:t>Mathematische Herleitungen</a:t>
-            </a:r>
-            <a:br>
-              <a:rPr lang="de-DE" dirty="0"/>
-            </a:br>
-            <a:r>
-              <a:rPr lang="de-DE" sz="2400" dirty="0"/>
-              <a:t>Backpropagation Algorithmus</a:t>
-            </a:r>
-            <a:endParaRPr lang="de-DE" dirty="0"/>
-          </a:p>
-        </p:txBody>
-      </p:sp>
-    </p:spTree>
-    <p:extLst>
-      <p:ext uri="{BB962C8B-B14F-4D97-AF65-F5344CB8AC3E}">
-        <p14:creationId xmlns:p14="http://schemas.microsoft.com/office/powerpoint/2010/main" val="3433578770"/>
-      </p:ext>
-    </p:extLst>
-  </p:cSld>
-  <p:clrMapOvr>
-    <a:masterClrMapping/>
-  </p:clrMapOvr>
-</p:sld>
-</file>
-
 <file path=ppt/slides/slide19.xml><?xml version="1.0" encoding="utf-8"?>
 <p:sld xmlns:a="http://schemas.openxmlformats.org/drawingml/2006/main" xmlns:r="http://schemas.openxmlformats.org/officeDocument/2006/relationships" xmlns:p="http://schemas.openxmlformats.org/presentationml/2006/main">
   <p:cSld>
@@ -6118,7 +6762,7 @@
           <p:cNvPr id="2" name="Titel 1">
             <a:extLst>
               <a:ext uri="{FF2B5EF4-FFF2-40B4-BE49-F238E27FC236}">
-                <a16:creationId xmlns:a16="http://schemas.microsoft.com/office/drawing/2014/main" id="{29FA37A3-FF5A-44AB-8DF3-1148A58E43F7}"/>
+                <a16:creationId xmlns:a16="http://schemas.microsoft.com/office/drawing/2014/main" id="{2911F67F-327B-4C51-B9E3-A1D3BCC720A5}"/>
               </a:ext>
             </a:extLst>
           </p:cNvPr>
@@ -6129,136 +6773,26 @@
             <p:ph type="title"/>
           </p:nvPr>
         </p:nvSpPr>
-        <p:spPr/>
+        <p:spPr>
+          <a:xfrm>
+            <a:off x="838200" y="365125"/>
+            <a:ext cx="10515600" cy="1325563"/>
+          </a:xfrm>
+        </p:spPr>
         <p:txBody>
           <a:bodyPr/>
           <a:lstStyle/>
           <a:p>
             <a:r>
               <a:rPr lang="de-DE" dirty="0"/>
-              <a:t>Implementierung in Python</a:t>
-            </a:r>
-          </a:p>
-        </p:txBody>
-      </p:sp>
-      <p:sp>
-        <p:nvSpPr>
-          <p:cNvPr id="3" name="Inhaltsplatzhalter 2">
-            <a:extLst>
-              <a:ext uri="{FF2B5EF4-FFF2-40B4-BE49-F238E27FC236}">
-                <a16:creationId xmlns:a16="http://schemas.microsoft.com/office/drawing/2014/main" id="{D2D4F1E2-9CD7-4555-B49C-3581844978A5}"/>
-              </a:ext>
-            </a:extLst>
-          </p:cNvPr>
-          <p:cNvSpPr>
-            <a:spLocks noGrp="1"/>
-          </p:cNvSpPr>
-          <p:nvPr>
-            <p:ph idx="1"/>
-          </p:nvPr>
-        </p:nvSpPr>
-        <p:spPr/>
-        <p:txBody>
-          <a:bodyPr/>
-          <a:lstStyle/>
-          <a:p>
-            <a:r>
-              <a:rPr lang="de-DE" dirty="0">
-                <a:hlinkClick r:id="rId2"/>
-              </a:rPr>
-              <a:t>Beispielanwendung MNIST Digit Classification</a:t>
-            </a:r>
-            <a:endParaRPr lang="de-DE" dirty="0"/>
-          </a:p>
-          <a:p>
-            <a:r>
+              <a:t>Mathematische Herleitungen</a:t>
+            </a:r>
+            <a:br>
               <a:rPr lang="de-DE" dirty="0"/>
-              <a:t>Aufbau von </a:t>
-            </a:r>
-            <a:r>
-              <a:rPr lang="de-DE" dirty="0" err="1">
-                <a:hlinkClick r:id="rId3"/>
-              </a:rPr>
-              <a:t>src</a:t>
-            </a:r>
-            <a:r>
-              <a:rPr lang="de-DE" dirty="0">
-                <a:hlinkClick r:id="rId3"/>
-              </a:rPr>
-              <a:t>/</a:t>
-            </a:r>
-            <a:r>
-              <a:rPr lang="de-DE" dirty="0" err="1">
-                <a:hlinkClick r:id="rId3"/>
-              </a:rPr>
-              <a:t>lib</a:t>
-            </a:r>
-            <a:endParaRPr lang="de-DE" dirty="0"/>
-          </a:p>
-          <a:p>
-            <a:r>
-              <a:rPr lang="de-DE" dirty="0"/>
-              <a:t>Erklärung von </a:t>
-            </a:r>
-            <a:r>
-              <a:rPr lang="de-DE" dirty="0" err="1">
-                <a:hlinkClick r:id="rId2"/>
-              </a:rPr>
-              <a:t>SequentialModel</a:t>
-            </a:r>
-            <a:r>
-              <a:rPr lang="de-DE" dirty="0"/>
-              <a:t> Klasse</a:t>
-            </a:r>
-          </a:p>
-          <a:p>
-            <a:r>
-              <a:rPr lang="de-DE" dirty="0"/>
-              <a:t>Erklärung von </a:t>
-            </a:r>
-            <a:r>
-              <a:rPr lang="de-DE" dirty="0" err="1">
-                <a:hlinkClick r:id="rId4"/>
-              </a:rPr>
-              <a:t>Dense</a:t>
-            </a:r>
-            <a:r>
-              <a:rPr lang="de-DE" dirty="0">
-                <a:hlinkClick r:id="rId4"/>
-              </a:rPr>
-              <a:t> Layer</a:t>
-            </a:r>
-            <a:r>
-              <a:rPr lang="de-DE" dirty="0"/>
-              <a:t> Klasse</a:t>
-            </a:r>
-          </a:p>
-          <a:p>
-            <a:r>
-              <a:rPr lang="de-DE" dirty="0"/>
-              <a:t>Erklärung von </a:t>
-            </a:r>
-            <a:r>
-              <a:rPr lang="de-DE" dirty="0">
-                <a:hlinkClick r:id="rId5"/>
-              </a:rPr>
-              <a:t>Aktivierungsfunktionen</a:t>
-            </a:r>
-            <a:r>
-              <a:rPr lang="de-DE" dirty="0"/>
-              <a:t>, insbesondere die Anpassungen für numerische Stabilität </a:t>
-            </a:r>
-          </a:p>
-          <a:p>
-            <a:r>
-              <a:rPr lang="de-DE" dirty="0"/>
-              <a:t>Tests erklären, insbesondere </a:t>
-            </a:r>
-            <a:r>
-              <a:rPr lang="de-DE" dirty="0" err="1">
-                <a:hlinkClick r:id="rId6"/>
-              </a:rPr>
-              <a:t>test_model</a:t>
+            </a:br>
+            <a:r>
+              <a:rPr lang="de-DE" sz="2400" dirty="0"/>
+              <a:t>Backpropagation Algorithmus</a:t>
             </a:r>
             <a:endParaRPr lang="de-DE" dirty="0"/>
           </a:p>
@@ -6267,7 +6801,7 @@
     </p:spTree>
     <p:extLst>
       <p:ext uri="{BB962C8B-B14F-4D97-AF65-F5344CB8AC3E}">
-        <p14:creationId xmlns:p14="http://schemas.microsoft.com/office/powerpoint/2010/main" val="2176953187"/>
+        <p14:creationId xmlns:p14="http://schemas.microsoft.com/office/powerpoint/2010/main" val="3433578770"/>
       </p:ext>
     </p:extLst>
   </p:cSld>
@@ -6421,6 +6955,187 @@
     <p:extLst>
       <p:ext uri="{BB962C8B-B14F-4D97-AF65-F5344CB8AC3E}">
         <p14:creationId xmlns:p14="http://schemas.microsoft.com/office/powerpoint/2010/main" val="2326574477"/>
+      </p:ext>
+    </p:extLst>
+  </p:cSld>
+  <p:clrMapOvr>
+    <a:masterClrMapping/>
+  </p:clrMapOvr>
+</p:sld>
+</file>
+
+<file path=ppt/slides/slide20.xml><?xml version="1.0" encoding="utf-8"?>
+<p:sld xmlns:a="http://schemas.openxmlformats.org/drawingml/2006/main" xmlns:r="http://schemas.openxmlformats.org/officeDocument/2006/relationships" xmlns:p="http://schemas.openxmlformats.org/presentationml/2006/main">
+  <p:cSld>
+    <p:spTree>
+      <p:nvGrpSpPr>
+        <p:cNvPr id="1" name=""/>
+        <p:cNvGrpSpPr/>
+        <p:nvPr/>
+      </p:nvGrpSpPr>
+      <p:grpSpPr>
+        <a:xfrm>
+          <a:off x="0" y="0"/>
+          <a:ext cx="0" cy="0"/>
+          <a:chOff x="0" y="0"/>
+          <a:chExt cx="0" cy="0"/>
+        </a:xfrm>
+      </p:grpSpPr>
+      <p:sp>
+        <p:nvSpPr>
+          <p:cNvPr id="2" name="Titel 1">
+            <a:extLst>
+              <a:ext uri="{FF2B5EF4-FFF2-40B4-BE49-F238E27FC236}">
+                <a16:creationId xmlns:a16="http://schemas.microsoft.com/office/drawing/2014/main" id="{29FA37A3-FF5A-44AB-8DF3-1148A58E43F7}"/>
+              </a:ext>
+            </a:extLst>
+          </p:cNvPr>
+          <p:cNvSpPr>
+            <a:spLocks noGrp="1"/>
+          </p:cNvSpPr>
+          <p:nvPr>
+            <p:ph type="title"/>
+          </p:nvPr>
+        </p:nvSpPr>
+        <p:spPr/>
+        <p:txBody>
+          <a:bodyPr/>
+          <a:lstStyle/>
+          <a:p>
+            <a:r>
+              <a:rPr lang="de-DE" dirty="0"/>
+              <a:t>Implementierung in Python</a:t>
+            </a:r>
+          </a:p>
+        </p:txBody>
+      </p:sp>
+      <p:sp>
+        <p:nvSpPr>
+          <p:cNvPr id="3" name="Inhaltsplatzhalter 2">
+            <a:extLst>
+              <a:ext uri="{FF2B5EF4-FFF2-40B4-BE49-F238E27FC236}">
+                <a16:creationId xmlns:a16="http://schemas.microsoft.com/office/drawing/2014/main" id="{D2D4F1E2-9CD7-4555-B49C-3581844978A5}"/>
+              </a:ext>
+            </a:extLst>
+          </p:cNvPr>
+          <p:cNvSpPr>
+            <a:spLocks noGrp="1"/>
+          </p:cNvSpPr>
+          <p:nvPr>
+            <p:ph idx="1"/>
+          </p:nvPr>
+        </p:nvSpPr>
+        <p:spPr/>
+        <p:txBody>
+          <a:bodyPr/>
+          <a:lstStyle/>
+          <a:p>
+            <a:r>
+              <a:rPr lang="de-DE" dirty="0">
+                <a:hlinkClick r:id="rId2"/>
+              </a:rPr>
+              <a:t>Beispielanwendung MNIST Digit Classification</a:t>
+            </a:r>
+            <a:endParaRPr lang="de-DE" dirty="0"/>
+          </a:p>
+          <a:p>
+            <a:r>
+              <a:rPr lang="de-DE" dirty="0"/>
+              <a:t>Aufbau von </a:t>
+            </a:r>
+            <a:r>
+              <a:rPr lang="de-DE" dirty="0" err="1">
+                <a:hlinkClick r:id="rId3"/>
+              </a:rPr>
+              <a:t>src</a:t>
+            </a:r>
+            <a:r>
+              <a:rPr lang="de-DE" dirty="0">
+                <a:hlinkClick r:id="rId3"/>
+              </a:rPr>
+              <a:t>/</a:t>
+            </a:r>
+            <a:r>
+              <a:rPr lang="de-DE" dirty="0" err="1">
+                <a:hlinkClick r:id="rId3"/>
+              </a:rPr>
+              <a:t>lib</a:t>
+            </a:r>
+            <a:endParaRPr lang="de-DE" dirty="0"/>
+          </a:p>
+          <a:p>
+            <a:r>
+              <a:rPr lang="de-DE" dirty="0"/>
+              <a:t>Erklärung von </a:t>
+            </a:r>
+            <a:r>
+              <a:rPr lang="de-DE" dirty="0" err="1">
+                <a:hlinkClick r:id="rId2"/>
+              </a:rPr>
+              <a:t>SequentialModel</a:t>
+            </a:r>
+            <a:r>
+              <a:rPr lang="de-DE" dirty="0"/>
+              <a:t> Klasse</a:t>
+            </a:r>
+          </a:p>
+          <a:p>
+            <a:r>
+              <a:rPr lang="de-DE" dirty="0"/>
+              <a:t>Erklärung von </a:t>
+            </a:r>
+            <a:r>
+              <a:rPr lang="de-DE" dirty="0" err="1">
+                <a:hlinkClick r:id="rId4"/>
+              </a:rPr>
+              <a:t>Dense</a:t>
+            </a:r>
+            <a:r>
+              <a:rPr lang="de-DE" dirty="0">
+                <a:hlinkClick r:id="rId4"/>
+              </a:rPr>
+              <a:t> Layer</a:t>
+            </a:r>
+            <a:r>
+              <a:rPr lang="de-DE" dirty="0"/>
+              <a:t> Klasse</a:t>
+            </a:r>
+          </a:p>
+          <a:p>
+            <a:r>
+              <a:rPr lang="de-DE" dirty="0"/>
+              <a:t>Erklärung von </a:t>
+            </a:r>
+            <a:r>
+              <a:rPr lang="de-DE" dirty="0">
+                <a:hlinkClick r:id="rId5"/>
+              </a:rPr>
+              <a:t>Aktivierungsfunktionen</a:t>
+            </a:r>
+            <a:r>
+              <a:rPr lang="de-DE" dirty="0"/>
+              <a:t>, insbesondere die Anpassungen für numerische Stabilität </a:t>
+            </a:r>
+          </a:p>
+          <a:p>
+            <a:r>
+              <a:rPr lang="de-DE" dirty="0"/>
+              <a:t>Tests erklären, insbesondere </a:t>
+            </a:r>
+            <a:r>
+              <a:rPr lang="de-DE" dirty="0" err="1">
+                <a:hlinkClick r:id="rId6"/>
+              </a:rPr>
+              <a:t>test_model</a:t>
+            </a:r>
+            <a:endParaRPr lang="de-DE" dirty="0"/>
+          </a:p>
+        </p:txBody>
+      </p:sp>
+    </p:spTree>
+    <p:extLst>
+      <p:ext uri="{BB962C8B-B14F-4D97-AF65-F5344CB8AC3E}">
+        <p14:creationId xmlns:p14="http://schemas.microsoft.com/office/powerpoint/2010/main" val="2176953187"/>
       </p:ext>
     </p:extLst>
   </p:cSld>
@@ -12541,7 +13256,7 @@
             </a:pPr>
             <a:r>
               <a:rPr lang="de-DE" sz="1400" dirty="0"/>
-              <a:t>Fehler am Output Layer</a:t>
+              <a:t>Fehlersignal am Output Layer</a:t>
             </a:r>
           </a:p>
           <a:p>
@@ -12592,7 +13307,7 @@
                 </a:pPr>
                 <a:r>
                   <a:rPr lang="de-DE" sz="1400" dirty="0"/>
-                  <a:t>Fehler am Hidden Layer </a:t>
+                  <a:t>Fehlersignal am Hidden Layer </a:t>
                 </a:r>
                 <a14:m>
                   <m:oMath xmlns:m="http://schemas.openxmlformats.org/officeDocument/2006/math">
@@ -13721,7 +14436,7 @@
             </a:br>
             <a:r>
               <a:rPr lang="de-DE" sz="2400" dirty="0"/>
-              <a:t>Fehler am Output Layer für ein einziges Datum</a:t>
+              <a:t>Fehlersignal am Output Layer für ein einziges Datum</a:t>
             </a:r>
             <a:endParaRPr lang="de-DE" dirty="0"/>
           </a:p>
@@ -13743,13 +14458,13 @@
         </p:nvPicPr>
         <p:blipFill rotWithShape="1">
           <a:blip r:embed="rId3"/>
-          <a:srcRect l="2873" r="3532"/>
+          <a:srcRect l="2873" r="67630"/>
           <a:stretch/>
         </p:blipFill>
         <p:spPr>
           <a:xfrm>
-            <a:off x="838200" y="2108287"/>
-            <a:ext cx="3976468" cy="867359"/>
+            <a:off x="838200" y="1681571"/>
+            <a:ext cx="1253197" cy="867359"/>
           </a:xfrm>
           <a:prstGeom prst="rect">
             <a:avLst/>
@@ -13772,13 +14487,13 @@
         </p:nvPicPr>
         <p:blipFill rotWithShape="1">
           <a:blip r:embed="rId4"/>
-          <a:srcRect l="4896" r="3068"/>
+          <a:srcRect l="30689" t="36478" r="37333" b="35013"/>
           <a:stretch/>
         </p:blipFill>
         <p:spPr>
           <a:xfrm>
-            <a:off x="838200" y="3301220"/>
-            <a:ext cx="5425440" cy="1767840"/>
+            <a:off x="1689307" y="2899803"/>
+            <a:ext cx="1885072" cy="503980"/>
           </a:xfrm>
           <a:prstGeom prst="rect">
             <a:avLst/>
@@ -13816,59 +14531,10 @@
       </p:pic>
       <p:sp>
         <p:nvSpPr>
-          <p:cNvPr id="12" name="Geschweifte Klammer rechts 11">
-            <a:extLst>
-              <a:ext uri="{FF2B5EF4-FFF2-40B4-BE49-F238E27FC236}">
-                <a16:creationId xmlns:a16="http://schemas.microsoft.com/office/drawing/2014/main" id="{6635DDC2-4A8C-4A68-BD22-99BE979A5EEF}"/>
-              </a:ext>
-            </a:extLst>
-          </p:cNvPr>
-          <p:cNvSpPr/>
-          <p:nvPr/>
-        </p:nvSpPr>
-        <p:spPr>
-          <a:xfrm>
-            <a:off x="6522726" y="2006992"/>
-            <a:ext cx="360000" cy="3108960"/>
-          </a:xfrm>
-          <a:prstGeom prst="rightBrace">
-            <a:avLst/>
-          </a:prstGeom>
-          <a:ln>
-            <a:solidFill>
-              <a:schemeClr val="tx1"/>
-            </a:solidFill>
-          </a:ln>
-        </p:spPr>
-        <p:style>
-          <a:lnRef idx="1">
-            <a:schemeClr val="accent1"/>
-          </a:lnRef>
-          <a:fillRef idx="0">
-            <a:schemeClr val="accent1"/>
-          </a:fillRef>
-          <a:effectRef idx="0">
-            <a:schemeClr val="accent1"/>
-          </a:effectRef>
-          <a:fontRef idx="minor">
-            <a:schemeClr val="tx1"/>
-          </a:fontRef>
-        </p:style>
-        <p:txBody>
-          <a:bodyPr rtlCol="0" anchor="ctr"/>
-          <a:lstStyle/>
-          <a:p>
-            <a:pPr algn="ctr"/>
-            <a:endParaRPr lang="de-DE"/>
-          </a:p>
-        </p:txBody>
-      </p:sp>
-      <p:sp>
-        <p:nvSpPr>
-          <p:cNvPr id="13" name="Textfeld 12">
-            <a:extLst>
-              <a:ext uri="{FF2B5EF4-FFF2-40B4-BE49-F238E27FC236}">
-                <a16:creationId xmlns:a16="http://schemas.microsoft.com/office/drawing/2014/main" id="{425C0FA8-7CFF-472A-8A96-3CC30436E834}"/>
+          <p:cNvPr id="15" name="Textfeld 14">
+            <a:extLst>
+              <a:ext uri="{FF2B5EF4-FFF2-40B4-BE49-F238E27FC236}">
+                <a16:creationId xmlns:a16="http://schemas.microsoft.com/office/drawing/2014/main" id="{BC24B7C9-C95B-4115-9947-2F92849CAAD7}"/>
               </a:ext>
             </a:extLst>
           </p:cNvPr>
@@ -13877,8 +14543,8 @@
         </p:nvSpPr>
         <p:spPr>
           <a:xfrm>
-            <a:off x="7104197" y="3207436"/>
-            <a:ext cx="3062067" cy="738664"/>
+            <a:off x="6949457" y="5536702"/>
+            <a:ext cx="4249603" cy="738664"/>
           </a:xfrm>
           <a:prstGeom prst="rect">
             <a:avLst/>
@@ -13893,66 +14559,191 @@
           <a:p>
             <a:r>
               <a:rPr lang="de-DE" sz="1400" dirty="0"/>
-              <a:t>Allgemeingültiges Ergebnis unabhängig von Fehlerfunktion und Aktivierungsfunktion im Output Layer</a:t>
+              <a:t>Ergebnis für eine Multi Class Klassifikation mit Categorical-Crossentropy und Softmax Aktivierungsfunktion</a:t>
             </a:r>
           </a:p>
         </p:txBody>
       </p:sp>
+      <p:pic>
+        <p:nvPicPr>
+          <p:cNvPr id="10" name="Grafik 12">
+            <a:extLst>
+              <a:ext uri="{FF2B5EF4-FFF2-40B4-BE49-F238E27FC236}">
+                <a16:creationId xmlns:a16="http://schemas.microsoft.com/office/drawing/2014/main" id="{DD9A7A2A-84DA-4964-A953-9C8FD677C452}"/>
+              </a:ext>
+            </a:extLst>
+          </p:cNvPr>
+          <p:cNvPicPr>
+            <a:picLocks noChangeAspect="1"/>
+          </p:cNvPicPr>
+          <p:nvPr/>
+        </p:nvPicPr>
+        <p:blipFill rotWithShape="1">
+          <a:blip r:embed="rId6"/>
+          <a:srcRect b="6160"/>
+          <a:stretch/>
+        </p:blipFill>
+        <p:spPr>
+          <a:xfrm>
+            <a:off x="8492641" y="365125"/>
+            <a:ext cx="3320701" cy="2126905"/>
+          </a:xfrm>
+          <a:prstGeom prst="rect">
+            <a:avLst/>
+          </a:prstGeom>
+        </p:spPr>
+      </p:pic>
+      <p:pic>
+        <p:nvPicPr>
+          <p:cNvPr id="16" name="Grafik 4">
+            <a:extLst>
+              <a:ext uri="{FF2B5EF4-FFF2-40B4-BE49-F238E27FC236}">
+                <a16:creationId xmlns:a16="http://schemas.microsoft.com/office/drawing/2014/main" id="{51B4E1B3-29CF-481A-B998-DDE6497E2450}"/>
+              </a:ext>
+            </a:extLst>
+          </p:cNvPr>
+          <p:cNvPicPr>
+            <a:picLocks noChangeAspect="1"/>
+          </p:cNvPicPr>
+          <p:nvPr/>
+        </p:nvPicPr>
+        <p:blipFill rotWithShape="1">
+          <a:blip r:embed="rId3"/>
+          <a:srcRect l="32149" r="3532"/>
+          <a:stretch/>
+        </p:blipFill>
+        <p:spPr>
+          <a:xfrm>
+            <a:off x="2114263" y="1681571"/>
+            <a:ext cx="2732644" cy="867359"/>
+          </a:xfrm>
+          <a:prstGeom prst="rect">
+            <a:avLst/>
+          </a:prstGeom>
+        </p:spPr>
+      </p:pic>
+      <p:pic>
+        <p:nvPicPr>
+          <p:cNvPr id="18" name="Grafik 6">
+            <a:extLst>
+              <a:ext uri="{FF2B5EF4-FFF2-40B4-BE49-F238E27FC236}">
+                <a16:creationId xmlns:a16="http://schemas.microsoft.com/office/drawing/2014/main" id="{C182DD97-11AA-41AD-8F08-C09971F2C473}"/>
+              </a:ext>
+            </a:extLst>
+          </p:cNvPr>
+          <p:cNvPicPr>
+            <a:picLocks noChangeAspect="1"/>
+          </p:cNvPicPr>
+          <p:nvPr/>
+        </p:nvPicPr>
+        <p:blipFill rotWithShape="1">
+          <a:blip r:embed="rId4"/>
+          <a:srcRect l="61949" r="3068"/>
+          <a:stretch/>
+        </p:blipFill>
+        <p:spPr>
+          <a:xfrm>
+            <a:off x="1534004" y="3700615"/>
+            <a:ext cx="1838737" cy="1576268"/>
+          </a:xfrm>
+          <a:prstGeom prst="rect">
+            <a:avLst/>
+          </a:prstGeom>
+        </p:spPr>
+      </p:pic>
+      <p:pic>
+        <p:nvPicPr>
+          <p:cNvPr id="19" name="Grafik 4">
+            <a:extLst>
+              <a:ext uri="{FF2B5EF4-FFF2-40B4-BE49-F238E27FC236}">
+                <a16:creationId xmlns:a16="http://schemas.microsoft.com/office/drawing/2014/main" id="{24D20412-E6D9-4C23-929E-E6D0C0B6DE13}"/>
+              </a:ext>
+            </a:extLst>
+          </p:cNvPr>
+          <p:cNvPicPr>
+            <a:picLocks noChangeAspect="1"/>
+          </p:cNvPicPr>
+          <p:nvPr/>
+        </p:nvPicPr>
+        <p:blipFill rotWithShape="1">
+          <a:blip r:embed="rId3"/>
+          <a:srcRect l="36964" t="8543" r="52523" b="11241"/>
+          <a:stretch/>
+        </p:blipFill>
+        <p:spPr>
+          <a:xfrm>
+            <a:off x="838200" y="2803911"/>
+            <a:ext cx="446649" cy="695764"/>
+          </a:xfrm>
+          <a:prstGeom prst="rect">
+            <a:avLst/>
+          </a:prstGeom>
+        </p:spPr>
+      </p:pic>
+      <p:pic>
+        <p:nvPicPr>
+          <p:cNvPr id="20" name="Grafik 4">
+            <a:extLst>
+              <a:ext uri="{FF2B5EF4-FFF2-40B4-BE49-F238E27FC236}">
+                <a16:creationId xmlns:a16="http://schemas.microsoft.com/office/drawing/2014/main" id="{C4016A3C-C42A-435B-92A9-11BB598B020E}"/>
+              </a:ext>
+            </a:extLst>
+          </p:cNvPr>
+          <p:cNvPicPr>
+            <a:picLocks noChangeAspect="1"/>
+          </p:cNvPicPr>
+          <p:nvPr/>
+        </p:nvPicPr>
+        <p:blipFill rotWithShape="1">
+          <a:blip r:embed="rId3"/>
+          <a:srcRect l="47864" t="8543" r="36326" b="11241"/>
+          <a:stretch/>
+        </p:blipFill>
+        <p:spPr>
+          <a:xfrm>
+            <a:off x="838200" y="4140867"/>
+            <a:ext cx="671701" cy="695764"/>
+          </a:xfrm>
+          <a:prstGeom prst="rect">
+            <a:avLst/>
+          </a:prstGeom>
+        </p:spPr>
+      </p:pic>
+      <p:pic>
+        <p:nvPicPr>
+          <p:cNvPr id="21" name="Grafik 4">
+            <a:extLst>
+              <a:ext uri="{FF2B5EF4-FFF2-40B4-BE49-F238E27FC236}">
+                <a16:creationId xmlns:a16="http://schemas.microsoft.com/office/drawing/2014/main" id="{7B3B7A6E-857C-4C7A-BA13-386907D9D446}"/>
+              </a:ext>
+            </a:extLst>
+          </p:cNvPr>
+          <p:cNvPicPr>
+            <a:picLocks noChangeAspect="1"/>
+          </p:cNvPicPr>
+          <p:nvPr/>
+        </p:nvPicPr>
+        <p:blipFill rotWithShape="1">
+          <a:blip r:embed="rId3"/>
+          <a:srcRect l="58521" t="8543" r="36327" b="11241"/>
+          <a:stretch/>
+        </p:blipFill>
+        <p:spPr>
+          <a:xfrm>
+            <a:off x="1400997" y="2756981"/>
+            <a:ext cx="218903" cy="695764"/>
+          </a:xfrm>
+          <a:prstGeom prst="rect">
+            <a:avLst/>
+          </a:prstGeom>
+        </p:spPr>
+      </p:pic>
       <p:sp>
         <p:nvSpPr>
-          <p:cNvPr id="14" name="Geschweifte Klammer rechts 13">
-            <a:extLst>
-              <a:ext uri="{FF2B5EF4-FFF2-40B4-BE49-F238E27FC236}">
-                <a16:creationId xmlns:a16="http://schemas.microsoft.com/office/drawing/2014/main" id="{BA12528F-5BC4-46A9-8D24-1631E951C474}"/>
-              </a:ext>
-            </a:extLst>
-          </p:cNvPr>
-          <p:cNvSpPr/>
-          <p:nvPr/>
-        </p:nvSpPr>
-        <p:spPr>
-          <a:xfrm>
-            <a:off x="6696229" y="5502486"/>
-            <a:ext cx="360000" cy="811786"/>
-          </a:xfrm>
-          <a:prstGeom prst="rightBrace">
-            <a:avLst/>
-          </a:prstGeom>
-          <a:ln>
-            <a:solidFill>
-              <a:schemeClr val="tx1"/>
-            </a:solidFill>
-          </a:ln>
-        </p:spPr>
-        <p:style>
-          <a:lnRef idx="1">
-            <a:schemeClr val="accent1"/>
-          </a:lnRef>
-          <a:fillRef idx="0">
-            <a:schemeClr val="accent1"/>
-          </a:fillRef>
-          <a:effectRef idx="0">
-            <a:schemeClr val="accent1"/>
-          </a:effectRef>
-          <a:fontRef idx="minor">
-            <a:schemeClr val="tx1"/>
-          </a:fontRef>
-        </p:style>
-        <p:txBody>
-          <a:bodyPr rtlCol="0" anchor="ctr"/>
-          <a:lstStyle/>
-          <a:p>
-            <a:pPr algn="ctr"/>
-            <a:endParaRPr lang="de-DE"/>
-          </a:p>
-        </p:txBody>
-      </p:sp>
-      <p:sp>
-        <p:nvSpPr>
-          <p:cNvPr id="15" name="Textfeld 14">
-            <a:extLst>
-              <a:ext uri="{FF2B5EF4-FFF2-40B4-BE49-F238E27FC236}">
-                <a16:creationId xmlns:a16="http://schemas.microsoft.com/office/drawing/2014/main" id="{BC24B7C9-C95B-4115-9947-2F92849CAAD7}"/>
+          <p:cNvPr id="3" name="TextBox 2">
+            <a:extLst>
+              <a:ext uri="{FF2B5EF4-FFF2-40B4-BE49-F238E27FC236}">
+                <a16:creationId xmlns:a16="http://schemas.microsoft.com/office/drawing/2014/main" id="{BC0B4A73-0499-4BF1-93BD-D51D23E60EDF}"/>
               </a:ext>
             </a:extLst>
           </p:cNvPr>
@@ -13961,8 +14752,8 @@
         </p:nvSpPr>
         <p:spPr>
           <a:xfrm>
-            <a:off x="7197980" y="5547357"/>
-            <a:ext cx="3677529" cy="738664"/>
+            <a:off x="3647037" y="2782461"/>
+            <a:ext cx="6622378" cy="738664"/>
           </a:xfrm>
           <a:prstGeom prst="rect">
             <a:avLst/>
@@ -13975,9 +14766,72 @@
           </a:bodyPr>
           <a:lstStyle/>
           <a:p>
+            <a:pPr marL="285750" indent="-285750">
+              <a:buFont typeface="Arial" panose="020B0604020202020204" pitchFamily="34" charset="0"/>
+              <a:buChar char="•"/>
+            </a:pPr>
             <a:r>
               <a:rPr lang="de-DE" sz="1400" dirty="0"/>
-              <a:t>Ergebnis für eine Multi Class Klassifikation mit Categorical-Crossentropy und Softmax Aktivierungsfunktion</a:t>
+              <a:t>Ableitung des Fehlers nach den Aktivierungen im Output Layer (i.e. Vorhersagen)</a:t>
+            </a:r>
+          </a:p>
+          <a:p>
+            <a:pPr marL="285750" indent="-285750">
+              <a:buFont typeface="Arial" panose="020B0604020202020204" pitchFamily="34" charset="0"/>
+              <a:buChar char="•"/>
+            </a:pPr>
+            <a:r>
+              <a:rPr lang="de-DE" sz="1400" dirty="0"/>
+              <a:t>Werte sind abhängig von der Wahl der Fehlerfunktion und der Aktivierungsfunktion im Output Layer</a:t>
+            </a:r>
+          </a:p>
+        </p:txBody>
+      </p:sp>
+      <p:sp>
+        <p:nvSpPr>
+          <p:cNvPr id="4" name="TextBox 3">
+            <a:extLst>
+              <a:ext uri="{FF2B5EF4-FFF2-40B4-BE49-F238E27FC236}">
+                <a16:creationId xmlns:a16="http://schemas.microsoft.com/office/drawing/2014/main" id="{67E6B865-21B3-40B3-97AF-5E00E1D8A9C0}"/>
+              </a:ext>
+            </a:extLst>
+          </p:cNvPr>
+          <p:cNvSpPr txBox="1"/>
+          <p:nvPr/>
+        </p:nvSpPr>
+        <p:spPr>
+          <a:xfrm>
+            <a:off x="3647037" y="4227139"/>
+            <a:ext cx="6535615" cy="523220"/>
+          </a:xfrm>
+          <a:prstGeom prst="rect">
+            <a:avLst/>
+          </a:prstGeom>
+          <a:noFill/>
+        </p:spPr>
+        <p:txBody>
+          <a:bodyPr wrap="square" rtlCol="0">
+            <a:spAutoFit/>
+          </a:bodyPr>
+          <a:lstStyle/>
+          <a:p>
+            <a:pPr marL="285750" indent="-285750">
+              <a:buFont typeface="Arial" panose="020B0604020202020204" pitchFamily="34" charset="0"/>
+              <a:buChar char="•"/>
+            </a:pPr>
+            <a:r>
+              <a:rPr lang="de-DE" sz="1400" dirty="0"/>
+              <a:t>Ableitung der Aktivierungen nach den dendritischen Potenzialen</a:t>
+            </a:r>
+          </a:p>
+          <a:p>
+            <a:pPr marL="285750" indent="-285750">
+              <a:buFont typeface="Arial" panose="020B0604020202020204" pitchFamily="34" charset="0"/>
+              <a:buChar char="•"/>
+            </a:pPr>
+            <a:r>
+              <a:rPr lang="de-DE" sz="1400" dirty="0"/>
+              <a:t>Werte sind abhängig von der Wahl der Aktivierungsfunktion </a:t>
             </a:r>
           </a:p>
         </p:txBody>
@@ -14071,61 +14925,7 @@
                                           </p:stCondLst>
                                         </p:cTn>
                                         <p:tgtEl>
-                                          <p:spTgt spid="7"/>
-                                        </p:tgtEl>
-                                        <p:attrNameLst>
-                                          <p:attrName>style.visibility</p:attrName>
-                                        </p:attrNameLst>
-                                      </p:cBhvr>
-                                      <p:to>
-                                        <p:strVal val="visible"/>
-                                      </p:to>
-                                    </p:set>
-                                  </p:childTnLst>
-                                </p:cTn>
-                              </p:par>
-                              <p:par>
-                                <p:cTn id="11" presetID="1" presetClass="entr" presetSubtype="0" fill="hold" grpId="0" nodeType="withEffect">
-                                  <p:stCondLst>
-                                    <p:cond delay="0"/>
-                                  </p:stCondLst>
-                                  <p:childTnLst>
-                                    <p:set>
-                                      <p:cBhvr>
-                                        <p:cTn id="12" dur="1" fill="hold">
-                                          <p:stCondLst>
-                                            <p:cond delay="0"/>
-                                          </p:stCondLst>
-                                        </p:cTn>
-                                        <p:tgtEl>
-                                          <p:spTgt spid="12"/>
-                                        </p:tgtEl>
-                                        <p:attrNameLst>
-                                          <p:attrName>style.visibility</p:attrName>
-                                        </p:attrNameLst>
-                                      </p:cBhvr>
-                                      <p:to>
-                                        <p:strVal val="visible"/>
-                                      </p:to>
-                                    </p:set>
-                                  </p:childTnLst>
-                                </p:cTn>
-                              </p:par>
-                              <p:par>
-                                <p:cTn id="13" presetID="1" presetClass="entr" presetSubtype="0" fill="hold" grpId="0" nodeType="withEffect">
-                                  <p:stCondLst>
-                                    <p:cond delay="0"/>
-                                  </p:stCondLst>
-                                  <p:childTnLst>
-                                    <p:set>
-                                      <p:cBhvr>
-                                        <p:cTn id="14" dur="1" fill="hold">
-                                          <p:stCondLst>
-                                            <p:cond delay="0"/>
-                                          </p:stCondLst>
-                                        </p:cTn>
-                                        <p:tgtEl>
-                                          <p:spTgt spid="13"/>
+                                          <p:spTgt spid="16"/>
                                         </p:tgtEl>
                                         <p:attrNameLst>
                                           <p:attrName>style.visibility</p:attrName>
@@ -14145,19 +14945,73 @@
                     </p:cTn>
                   </p:par>
                   <p:par>
-                    <p:cTn id="15" fill="hold">
+                    <p:cTn id="11" fill="hold">
                       <p:stCondLst>
                         <p:cond delay="indefinite"/>
                       </p:stCondLst>
                       <p:childTnLst>
                         <p:par>
-                          <p:cTn id="16" fill="hold">
+                          <p:cTn id="12" fill="hold">
                             <p:stCondLst>
                               <p:cond delay="0"/>
                             </p:stCondLst>
                             <p:childTnLst>
                               <p:par>
-                                <p:cTn id="17" presetID="1" presetClass="entr" presetSubtype="0" fill="hold" nodeType="clickEffect">
+                                <p:cTn id="13" presetID="1" presetClass="entr" presetSubtype="0" fill="hold" nodeType="clickEffect">
+                                  <p:stCondLst>
+                                    <p:cond delay="0"/>
+                                  </p:stCondLst>
+                                  <p:childTnLst>
+                                    <p:set>
+                                      <p:cBhvr>
+                                        <p:cTn id="14" dur="1" fill="hold">
+                                          <p:stCondLst>
+                                            <p:cond delay="0"/>
+                                          </p:stCondLst>
+                                        </p:cTn>
+                                        <p:tgtEl>
+                                          <p:spTgt spid="19"/>
+                                        </p:tgtEl>
+                                        <p:attrNameLst>
+                                          <p:attrName>style.visibility</p:attrName>
+                                        </p:attrNameLst>
+                                      </p:cBhvr>
+                                      <p:to>
+                                        <p:strVal val="visible"/>
+                                      </p:to>
+                                    </p:set>
+                                  </p:childTnLst>
+                                </p:cTn>
+                              </p:par>
+                              <p:par>
+                                <p:cTn id="15" presetID="1" presetClass="entr" presetSubtype="0" fill="hold" nodeType="withEffect">
+                                  <p:stCondLst>
+                                    <p:cond delay="0"/>
+                                  </p:stCondLst>
+                                  <p:childTnLst>
+                                    <p:set>
+                                      <p:cBhvr>
+                                        <p:cTn id="16" dur="1" fill="hold">
+                                          <p:stCondLst>
+                                            <p:cond delay="0"/>
+                                          </p:stCondLst>
+                                        </p:cTn>
+                                        <p:tgtEl>
+                                          <p:spTgt spid="21"/>
+                                        </p:tgtEl>
+                                        <p:attrNameLst>
+                                          <p:attrName>style.visibility</p:attrName>
+                                        </p:attrNameLst>
+                                      </p:cBhvr>
+                                      <p:to>
+                                        <p:strVal val="visible"/>
+                                      </p:to>
+                                    </p:set>
+                                  </p:childTnLst>
+                                </p:cTn>
+                              </p:par>
+                              <p:par>
+                                <p:cTn id="17" presetID="1" presetClass="entr" presetSubtype="0" fill="hold" nodeType="withEffect">
                                   <p:stCondLst>
                                     <p:cond delay="0"/>
                                   </p:stCondLst>
@@ -14170,7 +15024,7 @@
                                           </p:stCondLst>
                                         </p:cTn>
                                         <p:tgtEl>
-                                          <p:spTgt spid="11"/>
+                                          <p:spTgt spid="7"/>
                                         </p:tgtEl>
                                         <p:attrNameLst>
                                           <p:attrName>style.visibility</p:attrName>
@@ -14197,7 +15051,52 @@
                                           </p:stCondLst>
                                         </p:cTn>
                                         <p:tgtEl>
-                                          <p:spTgt spid="14"/>
+                                          <p:spTgt spid="3"/>
+                                        </p:tgtEl>
+                                        <p:attrNameLst>
+                                          <p:attrName>style.visibility</p:attrName>
+                                        </p:attrNameLst>
+                                      </p:cBhvr>
+                                      <p:to>
+                                        <p:strVal val="visible"/>
+                                      </p:to>
+                                    </p:set>
+                                  </p:childTnLst>
+                                </p:cTn>
+                              </p:par>
+                            </p:childTnLst>
+                          </p:cTn>
+                        </p:par>
+                      </p:childTnLst>
+                    </p:cTn>
+                  </p:par>
+                  <p:par>
+                    <p:cTn id="21" fill="hold">
+                      <p:stCondLst>
+                        <p:cond delay="indefinite"/>
+                      </p:stCondLst>
+                      <p:childTnLst>
+                        <p:par>
+                          <p:cTn id="22" fill="hold">
+                            <p:stCondLst>
+                              <p:cond delay="0"/>
+                            </p:stCondLst>
+                            <p:childTnLst>
+                              <p:par>
+                                <p:cTn id="23" presetID="1" presetClass="entr" presetSubtype="0" fill="hold" nodeType="clickEffect">
+                                  <p:stCondLst>
+                                    <p:cond delay="0"/>
+                                  </p:stCondLst>
+                                  <p:childTnLst>
+                                    <p:set>
+                                      <p:cBhvr>
+                                        <p:cTn id="24" dur="1" fill="hold">
+                                          <p:stCondLst>
+                                            <p:cond delay="0"/>
+                                          </p:stCondLst>
+                                        </p:cTn>
+                                        <p:tgtEl>
+                                          <p:spTgt spid="20"/>
                                         </p:tgtEl>
                                         <p:attrNameLst>
                                           <p:attrName>style.visibility</p:attrName>
@@ -14211,14 +15110,113 @@
                                 </p:cTn>
                               </p:par>
                               <p:par>
-                                <p:cTn id="21" presetID="1" presetClass="entr" presetSubtype="0" fill="hold" grpId="0" nodeType="withEffect">
+                                <p:cTn id="25" presetID="1" presetClass="entr" presetSubtype="0" fill="hold" nodeType="withEffect">
                                   <p:stCondLst>
                                     <p:cond delay="0"/>
                                   </p:stCondLst>
                                   <p:childTnLst>
                                     <p:set>
                                       <p:cBhvr>
-                                        <p:cTn id="22" dur="1" fill="hold">
+                                        <p:cTn id="26" dur="1" fill="hold">
+                                          <p:stCondLst>
+                                            <p:cond delay="0"/>
+                                          </p:stCondLst>
+                                        </p:cTn>
+                                        <p:tgtEl>
+                                          <p:spTgt spid="18"/>
+                                        </p:tgtEl>
+                                        <p:attrNameLst>
+                                          <p:attrName>style.visibility</p:attrName>
+                                        </p:attrNameLst>
+                                      </p:cBhvr>
+                                      <p:to>
+                                        <p:strVal val="visible"/>
+                                      </p:to>
+                                    </p:set>
+                                  </p:childTnLst>
+                                </p:cTn>
+                              </p:par>
+                              <p:par>
+                                <p:cTn id="27" presetID="1" presetClass="entr" presetSubtype="0" fill="hold" grpId="0" nodeType="withEffect">
+                                  <p:stCondLst>
+                                    <p:cond delay="0"/>
+                                  </p:stCondLst>
+                                  <p:childTnLst>
+                                    <p:set>
+                                      <p:cBhvr>
+                                        <p:cTn id="28" dur="1" fill="hold">
+                                          <p:stCondLst>
+                                            <p:cond delay="0"/>
+                                          </p:stCondLst>
+                                        </p:cTn>
+                                        <p:tgtEl>
+                                          <p:spTgt spid="4"/>
+                                        </p:tgtEl>
+                                        <p:attrNameLst>
+                                          <p:attrName>style.visibility</p:attrName>
+                                        </p:attrNameLst>
+                                      </p:cBhvr>
+                                      <p:to>
+                                        <p:strVal val="visible"/>
+                                      </p:to>
+                                    </p:set>
+                                  </p:childTnLst>
+                                </p:cTn>
+                              </p:par>
+                            </p:childTnLst>
+                          </p:cTn>
+                        </p:par>
+                      </p:childTnLst>
+                    </p:cTn>
+                  </p:par>
+                  <p:par>
+                    <p:cTn id="29" fill="hold">
+                      <p:stCondLst>
+                        <p:cond delay="indefinite"/>
+                      </p:stCondLst>
+                      <p:childTnLst>
+                        <p:par>
+                          <p:cTn id="30" fill="hold">
+                            <p:stCondLst>
+                              <p:cond delay="0"/>
+                            </p:stCondLst>
+                            <p:childTnLst>
+                              <p:par>
+                                <p:cTn id="31" presetID="1" presetClass="entr" presetSubtype="0" fill="hold" nodeType="clickEffect">
+                                  <p:stCondLst>
+                                    <p:cond delay="0"/>
+                                  </p:stCondLst>
+                                  <p:childTnLst>
+                                    <p:set>
+                                      <p:cBhvr>
+                                        <p:cTn id="32" dur="1" fill="hold">
+                                          <p:stCondLst>
+                                            <p:cond delay="0"/>
+                                          </p:stCondLst>
+                                        </p:cTn>
+                                        <p:tgtEl>
+                                          <p:spTgt spid="11"/>
+                                        </p:tgtEl>
+                                        <p:attrNameLst>
+                                          <p:attrName>style.visibility</p:attrName>
+                                        </p:attrNameLst>
+                                      </p:cBhvr>
+                                      <p:to>
+                                        <p:strVal val="visible"/>
+                                      </p:to>
+                                    </p:set>
+                                  </p:childTnLst>
+                                </p:cTn>
+                              </p:par>
+                              <p:par>
+                                <p:cTn id="33" presetID="1" presetClass="entr" presetSubtype="0" fill="hold" grpId="0" nodeType="withEffect">
+                                  <p:stCondLst>
+                                    <p:cond delay="0"/>
+                                  </p:stCondLst>
+                                  <p:childTnLst>
+                                    <p:set>
+                                      <p:cBhvr>
+                                        <p:cTn id="34" dur="1" fill="hold">
                                           <p:stCondLst>
                                             <p:cond delay="0"/>
                                           </p:stCondLst>
@@ -14265,10 +15263,9 @@
       </p:par>
     </p:tnLst>
     <p:bldLst>
-      <p:bldP spid="12" grpId="0" animBg="1"/>
-      <p:bldP spid="13" grpId="0"/>
-      <p:bldP spid="14" grpId="0" animBg="1"/>
       <p:bldP spid="15" grpId="0"/>
+      <p:bldP spid="3" grpId="0"/>
+      <p:bldP spid="4" grpId="0"/>
     </p:bldLst>
   </p:timing>
 </p:sld>
@@ -14328,7 +15325,7 @@
             </a:br>
             <a:r>
               <a:rPr lang="de-DE" sz="2400" dirty="0"/>
-              <a:t>Fehler am Output Layer für ein Batch von Daten</a:t>
+              <a:t>Fehlersignal am Output Layer für ein Batch von Daten</a:t>
             </a:r>
             <a:endParaRPr lang="de-DE" dirty="0"/>
           </a:p>

</xml_diff>

<commit_message>
Revised up to BP2.2
</commit_message>
<xml_diff>
--- a/theory/submission/result_presentation.pptx
+++ b/theory/submission/result_presentation.pptx
@@ -216,7 +216,7 @@
           <a:p>
             <a:fld id="{8EB49EC5-088D-473F-9BFC-E2740B5DA688}" type="datetimeFigureOut">
               <a:rPr lang="de-DE" smtClean="0"/>
-              <a:t>01.05.2022</a:t>
+              <a:t>02.05.2022</a:t>
             </a:fld>
             <a:endParaRPr lang="de-DE"/>
           </a:p>
@@ -621,6 +621,120 @@
             </a:pPr>
             <a:r>
               <a:rPr lang="de-DE" dirty="0"/>
+              <a:t>Wiederum Stapelung von M Fehlern entlang </a:t>
+            </a:r>
+            <a:r>
+              <a:rPr lang="de-DE" dirty="0" err="1"/>
+              <a:t>axis</a:t>
+            </a:r>
+            <a:r>
+              <a:rPr lang="de-DE" dirty="0"/>
+              <a:t>=0</a:t>
+            </a:r>
+          </a:p>
+          <a:p>
+            <a:pPr marL="171450" indent="-171450">
+              <a:buFont typeface="Arial" panose="020B0604020202020204" pitchFamily="34" charset="0"/>
+              <a:buChar char="•"/>
+            </a:pPr>
+            <a:r>
+              <a:rPr lang="de-DE" dirty="0"/>
+              <a:t>Gewichtsmatrix W und Bias Vektor b wird M mal </a:t>
+            </a:r>
+            <a:r>
+              <a:rPr lang="de-DE" dirty="0" err="1"/>
+              <a:t>ge-broadcasted</a:t>
+            </a:r>
+            <a:endParaRPr lang="de-DE" dirty="0"/>
+          </a:p>
+        </p:txBody>
+      </p:sp>
+      <p:sp>
+        <p:nvSpPr>
+          <p:cNvPr id="4" name="Slide Number Placeholder 3"/>
+          <p:cNvSpPr>
+            <a:spLocks noGrp="1"/>
+          </p:cNvSpPr>
+          <p:nvPr>
+            <p:ph type="sldNum" sz="quarter" idx="5"/>
+          </p:nvPr>
+        </p:nvSpPr>
+        <p:spPr/>
+        <p:txBody>
+          <a:bodyPr/>
+          <a:lstStyle/>
+          <a:p>
+            <a:fld id="{D4C12A24-BF94-4906-B274-F5BF4D611E23}" type="slidenum">
+              <a:rPr lang="de-DE" smtClean="0"/>
+              <a:t>11</a:t>
+            </a:fld>
+            <a:endParaRPr lang="de-DE"/>
+          </a:p>
+        </p:txBody>
+      </p:sp>
+    </p:spTree>
+    <p:extLst>
+      <p:ext uri="{BB962C8B-B14F-4D97-AF65-F5344CB8AC3E}">
+        <p14:creationId xmlns:p14="http://schemas.microsoft.com/office/powerpoint/2010/main" val="3074439996"/>
+      </p:ext>
+    </p:extLst>
+  </p:cSld>
+  <p:clrMapOvr>
+    <a:masterClrMapping/>
+  </p:clrMapOvr>
+</p:notes>
+</file>
+
+<file path=ppt/notesSlides/notesSlide11.xml><?xml version="1.0" encoding="utf-8"?>
+<p:notes xmlns:a="http://schemas.openxmlformats.org/drawingml/2006/main" xmlns:r="http://schemas.openxmlformats.org/officeDocument/2006/relationships" xmlns:p="http://schemas.openxmlformats.org/presentationml/2006/main">
+  <p:cSld>
+    <p:spTree>
+      <p:nvGrpSpPr>
+        <p:cNvPr id="1" name=""/>
+        <p:cNvGrpSpPr/>
+        <p:nvPr/>
+      </p:nvGrpSpPr>
+      <p:grpSpPr>
+        <a:xfrm>
+          <a:off x="0" y="0"/>
+          <a:ext cx="0" cy="0"/>
+          <a:chOff x="0" y="0"/>
+          <a:chExt cx="0" cy="0"/>
+        </a:xfrm>
+      </p:grpSpPr>
+      <p:sp>
+        <p:nvSpPr>
+          <p:cNvPr id="2" name="Slide Image Placeholder 1"/>
+          <p:cNvSpPr>
+            <a:spLocks noGrp="1" noRot="1" noChangeAspect="1"/>
+          </p:cNvSpPr>
+          <p:nvPr>
+            <p:ph type="sldImg"/>
+          </p:nvPr>
+        </p:nvSpPr>
+        <p:spPr/>
+      </p:sp>
+      <p:sp>
+        <p:nvSpPr>
+          <p:cNvPr id="3" name="Notes Placeholder 2"/>
+          <p:cNvSpPr>
+            <a:spLocks noGrp="1"/>
+          </p:cNvSpPr>
+          <p:nvPr>
+            <p:ph type="body" idx="1"/>
+          </p:nvPr>
+        </p:nvSpPr>
+        <p:spPr/>
+        <p:txBody>
+          <a:bodyPr/>
+          <a:lstStyle/>
+          <a:p>
+            <a:pPr marL="171450" indent="-171450">
+              <a:buFont typeface="Arial" panose="020B0604020202020204" pitchFamily="34" charset="0"/>
+              <a:buChar char="•"/>
+            </a:pPr>
+            <a:r>
+              <a:rPr lang="de-DE" dirty="0"/>
               <a:t>Kurz erklären, wie der Backpropagation Algorithmus abläuft</a:t>
             </a:r>
           </a:p>
@@ -1385,14 +1499,47 @@
           <a:bodyPr/>
           <a:lstStyle/>
           <a:p>
-            <a:pPr marL="171450" indent="-171450">
+            <a:pPr marL="285750" indent="-285750">
               <a:buFont typeface="Arial" panose="020B0604020202020204" pitchFamily="34" charset="0"/>
               <a:buChar char="•"/>
             </a:pPr>
             <a:r>
-              <a:rPr lang="de-DE" dirty="0"/>
-              <a:t>Auf die Dimensionen eingehen</a:t>
-            </a:r>
+              <a:rPr lang="de-DE" sz="1200" dirty="0"/>
+              <a:t>Stapeln von M Fehlersignalen jedes Datums entlang </a:t>
+            </a:r>
+            <a:r>
+              <a:rPr lang="de-DE" sz="1200" dirty="0" err="1"/>
+              <a:t>axis</a:t>
+            </a:r>
+            <a:r>
+              <a:rPr lang="de-DE" sz="1200" dirty="0"/>
+              <a:t>=0</a:t>
+            </a:r>
+          </a:p>
+          <a:p>
+            <a:pPr marL="285750" indent="-285750">
+              <a:buFont typeface="Arial" panose="020B0604020202020204" pitchFamily="34" charset="0"/>
+              <a:buChar char="•"/>
+            </a:pPr>
+            <a:r>
+              <a:rPr lang="de-DE" sz="1200" dirty="0"/>
+              <a:t>„Gleichzeitige“ Berechnung von batch-size Fehlersignalen ohne explizite </a:t>
+            </a:r>
+            <a:r>
+              <a:rPr lang="de-DE" sz="1200" dirty="0" err="1"/>
+              <a:t>for</a:t>
+            </a:r>
+            <a:r>
+              <a:rPr lang="de-DE" sz="1200" dirty="0"/>
+              <a:t>-loop</a:t>
+            </a:r>
+          </a:p>
+          <a:p>
+            <a:pPr marL="0" indent="0">
+              <a:buFont typeface="Arial" panose="020B0604020202020204" pitchFamily="34" charset="0"/>
+              <a:buNone/>
+            </a:pPr>
+            <a:endParaRPr lang="de-DE" dirty="0"/>
           </a:p>
         </p:txBody>
       </p:sp>
@@ -1499,6 +1646,29 @@
             </a:r>
           </a:p>
           <a:p>
+            <a:pPr marL="171450" marR="0" lvl="0" indent="-171450" algn="l" defTabSz="914400" rtl="0" eaLnBrk="1" fontAlgn="auto" latinLnBrk="0" hangingPunct="1">
+              <a:lnSpc>
+                <a:spcPct val="100000"/>
+              </a:lnSpc>
+              <a:spcBef>
+                <a:spcPts val="0"/>
+              </a:spcBef>
+              <a:spcAft>
+                <a:spcPts val="0"/>
+              </a:spcAft>
+              <a:buClrTx/>
+              <a:buSzTx/>
+              <a:buFont typeface="Arial" panose="020B0604020202020204" pitchFamily="34" charset="0"/>
+              <a:buChar char="•"/>
+              <a:tabLst/>
+              <a:defRPr/>
+            </a:pPr>
+            <a:r>
+              <a:rPr lang="de-DE" sz="1200" dirty="0"/>
+              <a:t>Auf Dimensionen eingehen</a:t>
+            </a:r>
+          </a:p>
+          <a:p>
             <a:pPr marL="171450" indent="-171450">
               <a:buFont typeface="Arial" panose="020B0604020202020204" pitchFamily="34" charset="0"/>
               <a:buChar char="•"/>
@@ -1690,7 +1860,7 @@
           <a:p>
             <a:fld id="{E47F9164-12F9-48A6-9622-CDF71CB57A75}" type="datetimeFigureOut">
               <a:rPr lang="de-DE" smtClean="0"/>
-              <a:t>01.05.2022</a:t>
+              <a:t>02.05.2022</a:t>
             </a:fld>
             <a:endParaRPr lang="de-DE"/>
           </a:p>
@@ -1888,7 +2058,7 @@
           <a:p>
             <a:fld id="{E47F9164-12F9-48A6-9622-CDF71CB57A75}" type="datetimeFigureOut">
               <a:rPr lang="de-DE" smtClean="0"/>
-              <a:t>01.05.2022</a:t>
+              <a:t>02.05.2022</a:t>
             </a:fld>
             <a:endParaRPr lang="de-DE"/>
           </a:p>
@@ -2096,7 +2266,7 @@
           <a:p>
             <a:fld id="{E47F9164-12F9-48A6-9622-CDF71CB57A75}" type="datetimeFigureOut">
               <a:rPr lang="de-DE" smtClean="0"/>
-              <a:t>01.05.2022</a:t>
+              <a:t>02.05.2022</a:t>
             </a:fld>
             <a:endParaRPr lang="de-DE"/>
           </a:p>
@@ -2294,7 +2464,7 @@
           <a:p>
             <a:fld id="{E47F9164-12F9-48A6-9622-CDF71CB57A75}" type="datetimeFigureOut">
               <a:rPr lang="de-DE" smtClean="0"/>
-              <a:t>01.05.2022</a:t>
+              <a:t>02.05.2022</a:t>
             </a:fld>
             <a:endParaRPr lang="de-DE"/>
           </a:p>
@@ -2569,7 +2739,7 @@
           <a:p>
             <a:fld id="{E47F9164-12F9-48A6-9622-CDF71CB57A75}" type="datetimeFigureOut">
               <a:rPr lang="de-DE" smtClean="0"/>
-              <a:t>01.05.2022</a:t>
+              <a:t>02.05.2022</a:t>
             </a:fld>
             <a:endParaRPr lang="de-DE"/>
           </a:p>
@@ -2834,7 +3004,7 @@
           <a:p>
             <a:fld id="{E47F9164-12F9-48A6-9622-CDF71CB57A75}" type="datetimeFigureOut">
               <a:rPr lang="de-DE" smtClean="0"/>
-              <a:t>01.05.2022</a:t>
+              <a:t>02.05.2022</a:t>
             </a:fld>
             <a:endParaRPr lang="de-DE"/>
           </a:p>
@@ -3246,7 +3416,7 @@
           <a:p>
             <a:fld id="{E47F9164-12F9-48A6-9622-CDF71CB57A75}" type="datetimeFigureOut">
               <a:rPr lang="de-DE" smtClean="0"/>
-              <a:t>01.05.2022</a:t>
+              <a:t>02.05.2022</a:t>
             </a:fld>
             <a:endParaRPr lang="de-DE"/>
           </a:p>
@@ -3387,7 +3557,7 @@
           <a:p>
             <a:fld id="{E47F9164-12F9-48A6-9622-CDF71CB57A75}" type="datetimeFigureOut">
               <a:rPr lang="de-DE" smtClean="0"/>
-              <a:t>01.05.2022</a:t>
+              <a:t>02.05.2022</a:t>
             </a:fld>
             <a:endParaRPr lang="de-DE"/>
           </a:p>
@@ -3500,7 +3670,7 @@
           <a:p>
             <a:fld id="{E47F9164-12F9-48A6-9622-CDF71CB57A75}" type="datetimeFigureOut">
               <a:rPr lang="de-DE" smtClean="0"/>
-              <a:t>01.05.2022</a:t>
+              <a:t>02.05.2022</a:t>
             </a:fld>
             <a:endParaRPr lang="de-DE"/>
           </a:p>
@@ -3811,7 +3981,7 @@
           <a:p>
             <a:fld id="{E47F9164-12F9-48A6-9622-CDF71CB57A75}" type="datetimeFigureOut">
               <a:rPr lang="de-DE" smtClean="0"/>
-              <a:t>01.05.2022</a:t>
+              <a:t>02.05.2022</a:t>
             </a:fld>
             <a:endParaRPr lang="de-DE"/>
           </a:p>
@@ -4099,7 +4269,7 @@
           <a:p>
             <a:fld id="{E47F9164-12F9-48A6-9622-CDF71CB57A75}" type="datetimeFigureOut">
               <a:rPr lang="de-DE" smtClean="0"/>
-              <a:t>01.05.2022</a:t>
+              <a:t>02.05.2022</a:t>
             </a:fld>
             <a:endParaRPr lang="de-DE"/>
           </a:p>
@@ -4340,7 +4510,7 @@
           <a:p>
             <a:fld id="{E47F9164-12F9-48A6-9622-CDF71CB57A75}" type="datetimeFigureOut">
               <a:rPr lang="de-DE" smtClean="0"/>
-              <a:t>01.05.2022</a:t>
+              <a:t>02.05.2022</a:t>
             </a:fld>
             <a:endParaRPr lang="de-DE"/>
           </a:p>
@@ -5766,32 +5936,201 @@
           <a:bodyPr/>
           <a:lstStyle/>
           <a:p>
-            <a:endParaRPr lang="de-DE"/>
+            <a:r>
+              <a:rPr kumimoji="0" lang="de-DE" sz="4400" b="0" i="0" u="none" strike="noStrike" kern="1200" cap="none" spc="0" normalizeH="0" baseline="0" noProof="0" dirty="0">
+                <a:ln>
+                  <a:noFill/>
+                </a:ln>
+                <a:solidFill>
+                  <a:prstClr val="black"/>
+                </a:solidFill>
+                <a:effectLst/>
+                <a:uLnTx/>
+                <a:uFillTx/>
+                <a:latin typeface="Calibri Light" panose="020F0302020204030204"/>
+                <a:ea typeface="+mj-ea"/>
+                <a:cs typeface="+mj-cs"/>
+              </a:rPr>
+              <a:t>Mathematische Herleitungen</a:t>
+            </a:r>
+            <a:br>
+              <a:rPr kumimoji="0" lang="de-DE" sz="4400" b="0" i="0" u="none" strike="noStrike" kern="1200" cap="none" spc="0" normalizeH="0" baseline="0" noProof="0" dirty="0">
+                <a:ln>
+                  <a:noFill/>
+                </a:ln>
+                <a:solidFill>
+                  <a:prstClr val="black"/>
+                </a:solidFill>
+                <a:effectLst/>
+                <a:uLnTx/>
+                <a:uFillTx/>
+                <a:latin typeface="Calibri Light" panose="020F0302020204030204"/>
+                <a:ea typeface="+mj-ea"/>
+                <a:cs typeface="+mj-cs"/>
+              </a:rPr>
+            </a:br>
+            <a:r>
+              <a:rPr kumimoji="0" lang="de-DE" sz="2400" b="0" i="0" u="none" strike="noStrike" kern="1200" cap="none" spc="0" normalizeH="0" baseline="0" noProof="0" dirty="0">
+                <a:ln>
+                  <a:noFill/>
+                </a:ln>
+                <a:solidFill>
+                  <a:prstClr val="black"/>
+                </a:solidFill>
+                <a:effectLst/>
+                <a:uLnTx/>
+                <a:uFillTx/>
+                <a:latin typeface="Calibri Light" panose="020F0302020204030204"/>
+                <a:ea typeface="+mj-ea"/>
+                <a:cs typeface="+mj-cs"/>
+              </a:rPr>
+              <a:t>Fehlersignal an einem beliebigem Hidden Layer für ein Batch von Daten</a:t>
+            </a:r>
+            <a:endParaRPr lang="de-DE" dirty="0"/>
+          </a:p>
+        </p:txBody>
+      </p:sp>
+      <p:pic>
+        <p:nvPicPr>
+          <p:cNvPr id="5" name="Picture 4">
+            <a:extLst>
+              <a:ext uri="{FF2B5EF4-FFF2-40B4-BE49-F238E27FC236}">
+                <a16:creationId xmlns:a16="http://schemas.microsoft.com/office/drawing/2014/main" id="{C52218E5-5798-7A1D-1130-37111F1D2CC4}"/>
+              </a:ext>
+            </a:extLst>
+          </p:cNvPr>
+          <p:cNvPicPr>
+            <a:picLocks noChangeAspect="1"/>
+          </p:cNvPicPr>
+          <p:nvPr/>
+        </p:nvPicPr>
+        <p:blipFill rotWithShape="1">
+          <a:blip r:embed="rId3"/>
+          <a:srcRect l="960" r="2192" b="17273"/>
+          <a:stretch/>
+        </p:blipFill>
+        <p:spPr>
+          <a:xfrm>
+            <a:off x="168815" y="1680880"/>
+            <a:ext cx="10728959" cy="2377645"/>
+          </a:xfrm>
+          <a:prstGeom prst="rect">
+            <a:avLst/>
+          </a:prstGeom>
+        </p:spPr>
+      </p:pic>
+      <p:pic>
+        <p:nvPicPr>
+          <p:cNvPr id="7" name="Picture 6">
+            <a:extLst>
+              <a:ext uri="{FF2B5EF4-FFF2-40B4-BE49-F238E27FC236}">
+                <a16:creationId xmlns:a16="http://schemas.microsoft.com/office/drawing/2014/main" id="{E4B3F011-AEA6-6515-75F8-6165E6EA2C20}"/>
+              </a:ext>
+            </a:extLst>
+          </p:cNvPr>
+          <p:cNvPicPr>
+            <a:picLocks noChangeAspect="1"/>
+          </p:cNvPicPr>
+          <p:nvPr/>
+        </p:nvPicPr>
+        <p:blipFill rotWithShape="1">
+          <a:blip r:embed="rId4"/>
+          <a:srcRect t="2944" r="1115" b="13573"/>
+          <a:stretch/>
+        </p:blipFill>
+        <p:spPr>
+          <a:xfrm>
+            <a:off x="168815" y="4377692"/>
+            <a:ext cx="10728959" cy="2249315"/>
+          </a:xfrm>
+          <a:prstGeom prst="rect">
+            <a:avLst/>
+          </a:prstGeom>
+        </p:spPr>
+      </p:pic>
+      <p:sp>
+        <p:nvSpPr>
+          <p:cNvPr id="8" name="TextBox 7">
+            <a:extLst>
+              <a:ext uri="{FF2B5EF4-FFF2-40B4-BE49-F238E27FC236}">
+                <a16:creationId xmlns:a16="http://schemas.microsoft.com/office/drawing/2014/main" id="{0A3E9498-2E47-6DE2-3871-BE3E19CDBFFA}"/>
+              </a:ext>
+            </a:extLst>
+          </p:cNvPr>
+          <p:cNvSpPr txBox="1"/>
+          <p:nvPr/>
+        </p:nvSpPr>
+        <p:spPr>
+          <a:xfrm>
+            <a:off x="11029072" y="2664858"/>
+            <a:ext cx="1059766" cy="738664"/>
+          </a:xfrm>
+          <a:prstGeom prst="rect">
+            <a:avLst/>
+          </a:prstGeom>
+          <a:noFill/>
+        </p:spPr>
+        <p:txBody>
+          <a:bodyPr wrap="square" rtlCol="0">
+            <a:spAutoFit/>
+          </a:bodyPr>
+          <a:lstStyle/>
+          <a:p>
+            <a:r>
+              <a:rPr lang="de-DE" sz="1400" dirty="0"/>
+              <a:t>Allgemein-</a:t>
+            </a:r>
+          </a:p>
+          <a:p>
+            <a:r>
+              <a:rPr lang="de-DE" sz="1400" dirty="0"/>
+              <a:t>gültige Lösung</a:t>
+            </a:r>
           </a:p>
         </p:txBody>
       </p:sp>
       <p:sp>
         <p:nvSpPr>
-          <p:cNvPr id="3" name="Content Placeholder 2">
-            <a:extLst>
-              <a:ext uri="{FF2B5EF4-FFF2-40B4-BE49-F238E27FC236}">
-                <a16:creationId xmlns:a16="http://schemas.microsoft.com/office/drawing/2014/main" id="{80FDD0F2-45E6-44BA-9B3F-C48279462AE4}"/>
-              </a:ext>
-            </a:extLst>
-          </p:cNvPr>
-          <p:cNvSpPr>
-            <a:spLocks noGrp="1"/>
-          </p:cNvSpPr>
-          <p:nvPr>
-            <p:ph idx="1"/>
-          </p:nvPr>
+          <p:cNvPr id="9" name="TextBox 8">
+            <a:extLst>
+              <a:ext uri="{FF2B5EF4-FFF2-40B4-BE49-F238E27FC236}">
+                <a16:creationId xmlns:a16="http://schemas.microsoft.com/office/drawing/2014/main" id="{95D52D75-3BC5-83FB-D4B7-3D31BE9C66C8}"/>
+              </a:ext>
+            </a:extLst>
+          </p:cNvPr>
+          <p:cNvSpPr txBox="1"/>
+          <p:nvPr/>
         </p:nvSpPr>
-        <p:spPr/>
+        <p:spPr>
+          <a:xfrm>
+            <a:off x="11029072" y="4897902"/>
+            <a:ext cx="1162928" cy="1169551"/>
+          </a:xfrm>
+          <a:prstGeom prst="rect">
+            <a:avLst/>
+          </a:prstGeom>
+          <a:noFill/>
+        </p:spPr>
         <p:txBody>
-          <a:bodyPr/>
+          <a:bodyPr wrap="square" rtlCol="0">
+            <a:spAutoFit/>
+          </a:bodyPr>
           <a:lstStyle/>
           <a:p>
-            <a:endParaRPr lang="de-DE"/>
+            <a:r>
+              <a:rPr lang="de-DE" sz="1400" dirty="0"/>
+              <a:t>Lösung bei Sigmoid Aktivierungs-</a:t>
+            </a:r>
+          </a:p>
+          <a:p>
+            <a:r>
+              <a:rPr lang="de-DE" sz="1400" dirty="0" err="1"/>
+              <a:t>funktion</a:t>
+            </a:r>
+            <a:r>
+              <a:rPr lang="de-DE" sz="1400" dirty="0"/>
+              <a:t> im Hidden Layer</a:t>
+            </a:r>
           </a:p>
         </p:txBody>
       </p:sp>
@@ -5805,6 +6144,184 @@
   <p:clrMapOvr>
     <a:masterClrMapping/>
   </p:clrMapOvr>
+  <p:timing>
+    <p:tnLst>
+      <p:par>
+        <p:cTn id="1" dur="indefinite" restart="never" nodeType="tmRoot">
+          <p:childTnLst>
+            <p:seq concurrent="1" nextAc="seek">
+              <p:cTn id="2" dur="indefinite" nodeType="mainSeq">
+                <p:childTnLst>
+                  <p:par>
+                    <p:cTn id="3" fill="hold">
+                      <p:stCondLst>
+                        <p:cond delay="indefinite"/>
+                      </p:stCondLst>
+                      <p:childTnLst>
+                        <p:par>
+                          <p:cTn id="4" fill="hold">
+                            <p:stCondLst>
+                              <p:cond delay="0"/>
+                            </p:stCondLst>
+                            <p:childTnLst>
+                              <p:par>
+                                <p:cTn id="5" presetID="1" presetClass="entr" presetSubtype="0" fill="hold" nodeType="clickEffect">
+                                  <p:stCondLst>
+                                    <p:cond delay="0"/>
+                                  </p:stCondLst>
+                                  <p:childTnLst>
+                                    <p:set>
+                                      <p:cBhvr>
+                                        <p:cTn id="6" dur="1" fill="hold">
+                                          <p:stCondLst>
+                                            <p:cond delay="0"/>
+                                          </p:stCondLst>
+                                        </p:cTn>
+                                        <p:tgtEl>
+                                          <p:spTgt spid="5"/>
+                                        </p:tgtEl>
+                                        <p:attrNameLst>
+                                          <p:attrName>style.visibility</p:attrName>
+                                        </p:attrNameLst>
+                                      </p:cBhvr>
+                                      <p:to>
+                                        <p:strVal val="visible"/>
+                                      </p:to>
+                                    </p:set>
+                                  </p:childTnLst>
+                                </p:cTn>
+                              </p:par>
+                              <p:par>
+                                <p:cTn id="7" presetID="1" presetClass="entr" presetSubtype="0" fill="hold" grpId="0" nodeType="withEffect">
+                                  <p:stCondLst>
+                                    <p:cond delay="0"/>
+                                  </p:stCondLst>
+                                  <p:childTnLst>
+                                    <p:set>
+                                      <p:cBhvr>
+                                        <p:cTn id="8" dur="1" fill="hold">
+                                          <p:stCondLst>
+                                            <p:cond delay="0"/>
+                                          </p:stCondLst>
+                                        </p:cTn>
+                                        <p:tgtEl>
+                                          <p:spTgt spid="8"/>
+                                        </p:tgtEl>
+                                        <p:attrNameLst>
+                                          <p:attrName>style.visibility</p:attrName>
+                                        </p:attrNameLst>
+                                      </p:cBhvr>
+                                      <p:to>
+                                        <p:strVal val="visible"/>
+                                      </p:to>
+                                    </p:set>
+                                  </p:childTnLst>
+                                </p:cTn>
+                              </p:par>
+                            </p:childTnLst>
+                          </p:cTn>
+                        </p:par>
+                      </p:childTnLst>
+                    </p:cTn>
+                  </p:par>
+                  <p:par>
+                    <p:cTn id="9" fill="hold">
+                      <p:stCondLst>
+                        <p:cond delay="indefinite"/>
+                      </p:stCondLst>
+                      <p:childTnLst>
+                        <p:par>
+                          <p:cTn id="10" fill="hold">
+                            <p:stCondLst>
+                              <p:cond delay="0"/>
+                            </p:stCondLst>
+                            <p:childTnLst>
+                              <p:par>
+                                <p:cTn id="11" presetID="1" presetClass="entr" presetSubtype="0" fill="hold" nodeType="clickEffect">
+                                  <p:stCondLst>
+                                    <p:cond delay="0"/>
+                                  </p:stCondLst>
+                                  <p:childTnLst>
+                                    <p:set>
+                                      <p:cBhvr>
+                                        <p:cTn id="12" dur="1" fill="hold">
+                                          <p:stCondLst>
+                                            <p:cond delay="0"/>
+                                          </p:stCondLst>
+                                        </p:cTn>
+                                        <p:tgtEl>
+                                          <p:spTgt spid="7"/>
+                                        </p:tgtEl>
+                                        <p:attrNameLst>
+                                          <p:attrName>style.visibility</p:attrName>
+                                        </p:attrNameLst>
+                                      </p:cBhvr>
+                                      <p:to>
+                                        <p:strVal val="visible"/>
+                                      </p:to>
+                                    </p:set>
+                                  </p:childTnLst>
+                                </p:cTn>
+                              </p:par>
+                              <p:par>
+                                <p:cTn id="13" presetID="1" presetClass="entr" presetSubtype="0" fill="hold" grpId="0" nodeType="withEffect">
+                                  <p:stCondLst>
+                                    <p:cond delay="0"/>
+                                  </p:stCondLst>
+                                  <p:childTnLst>
+                                    <p:set>
+                                      <p:cBhvr>
+                                        <p:cTn id="14" dur="1" fill="hold">
+                                          <p:stCondLst>
+                                            <p:cond delay="0"/>
+                                          </p:stCondLst>
+                                        </p:cTn>
+                                        <p:tgtEl>
+                                          <p:spTgt spid="9"/>
+                                        </p:tgtEl>
+                                        <p:attrNameLst>
+                                          <p:attrName>style.visibility</p:attrName>
+                                        </p:attrNameLst>
+                                      </p:cBhvr>
+                                      <p:to>
+                                        <p:strVal val="visible"/>
+                                      </p:to>
+                                    </p:set>
+                                  </p:childTnLst>
+                                </p:cTn>
+                              </p:par>
+                            </p:childTnLst>
+                          </p:cTn>
+                        </p:par>
+                      </p:childTnLst>
+                    </p:cTn>
+                  </p:par>
+                </p:childTnLst>
+              </p:cTn>
+              <p:prevCondLst>
+                <p:cond evt="onPrev" delay="0">
+                  <p:tgtEl>
+                    <p:sldTgt/>
+                  </p:tgtEl>
+                </p:cond>
+              </p:prevCondLst>
+              <p:nextCondLst>
+                <p:cond evt="onNext" delay="0">
+                  <p:tgtEl>
+                    <p:sldTgt/>
+                  </p:tgtEl>
+                </p:cond>
+              </p:nextCondLst>
+            </p:seq>
+          </p:childTnLst>
+        </p:cTn>
+      </p:par>
+    </p:tnLst>
+    <p:bldLst>
+      <p:bldP spid="8" grpId="0"/>
+      <p:bldP spid="9" grpId="0"/>
+    </p:bldLst>
+  </p:timing>
 </p:sld>
 </file>
 
@@ -7785,8 +8302,8 @@
           </a:prstGeom>
         </p:spPr>
       </p:pic>
-      <mc:AlternateContent xmlns:mc="http://schemas.openxmlformats.org/markup-compatibility/2006">
-        <mc:Choice xmlns:a14="http://schemas.microsoft.com/office/drawing/2010/main" Requires="a14">
+      <mc:AlternateContent xmlns:mc="http://schemas.openxmlformats.org/markup-compatibility/2006" xmlns:a14="http://schemas.microsoft.com/office/drawing/2010/main">
+        <mc:Choice Requires="a14">
           <p:sp>
             <p:nvSpPr>
               <p:cNvPr id="14" name="Textfeld 13">
@@ -8072,7 +8589,7 @@
             </p:txBody>
           </p:sp>
         </mc:Choice>
-        <mc:Fallback>
+        <mc:Fallback xmlns="">
           <p:sp>
             <p:nvSpPr>
               <p:cNvPr id="14" name="Textfeld 13">
@@ -8433,8 +8950,8 @@
           </a:prstGeom>
         </p:spPr>
       </p:pic>
-      <mc:AlternateContent xmlns:mc="http://schemas.openxmlformats.org/markup-compatibility/2006">
-        <mc:Choice xmlns:a14="http://schemas.microsoft.com/office/drawing/2010/main" Requires="a14">
+      <mc:AlternateContent xmlns:mc="http://schemas.openxmlformats.org/markup-compatibility/2006" xmlns:a14="http://schemas.microsoft.com/office/drawing/2010/main">
+        <mc:Choice Requires="a14">
           <p:sp>
             <p:nvSpPr>
               <p:cNvPr id="10" name="Textfeld 9">
@@ -8509,7 +9026,7 @@
             </p:txBody>
           </p:sp>
         </mc:Choice>
-        <mc:Fallback>
+        <mc:Fallback xmlns="">
           <p:sp>
             <p:nvSpPr>
               <p:cNvPr id="10" name="Textfeld 9">
@@ -8554,8 +9071,8 @@
           </p:sp>
         </mc:Fallback>
       </mc:AlternateContent>
-      <mc:AlternateContent xmlns:mc="http://schemas.openxmlformats.org/markup-compatibility/2006">
-        <mc:Choice xmlns:a14="http://schemas.microsoft.com/office/drawing/2010/main" Requires="a14">
+      <mc:AlternateContent xmlns:mc="http://schemas.openxmlformats.org/markup-compatibility/2006" xmlns:a14="http://schemas.microsoft.com/office/drawing/2010/main">
+        <mc:Choice Requires="a14">
           <p:sp>
             <p:nvSpPr>
               <p:cNvPr id="14" name="Textfeld 13">
@@ -8661,7 +9178,7 @@
             </p:txBody>
           </p:sp>
         </mc:Choice>
-        <mc:Fallback>
+        <mc:Fallback xmlns="">
           <p:sp>
             <p:nvSpPr>
               <p:cNvPr id="14" name="Textfeld 13">
@@ -8706,8 +9223,8 @@
           </p:sp>
         </mc:Fallback>
       </mc:AlternateContent>
-      <mc:AlternateContent xmlns:mc="http://schemas.openxmlformats.org/markup-compatibility/2006">
-        <mc:Choice xmlns:a14="http://schemas.microsoft.com/office/drawing/2010/main" Requires="a14">
+      <mc:AlternateContent xmlns:mc="http://schemas.openxmlformats.org/markup-compatibility/2006" xmlns:a14="http://schemas.microsoft.com/office/drawing/2010/main">
+        <mc:Choice Requires="a14">
           <p:sp>
             <p:nvSpPr>
               <p:cNvPr id="15" name="Textfeld 14">
@@ -8788,7 +9305,7 @@
             </p:txBody>
           </p:sp>
         </mc:Choice>
-        <mc:Fallback>
+        <mc:Fallback xmlns="">
           <p:sp>
             <p:nvSpPr>
               <p:cNvPr id="15" name="Textfeld 14">
@@ -8833,8 +9350,8 @@
           </p:sp>
         </mc:Fallback>
       </mc:AlternateContent>
-      <mc:AlternateContent xmlns:mc="http://schemas.openxmlformats.org/markup-compatibility/2006">
-        <mc:Choice xmlns:a14="http://schemas.microsoft.com/office/drawing/2010/main" Requires="a14">
+      <mc:AlternateContent xmlns:mc="http://schemas.openxmlformats.org/markup-compatibility/2006" xmlns:a14="http://schemas.microsoft.com/office/drawing/2010/main">
+        <mc:Choice Requires="a14">
           <p:sp>
             <p:nvSpPr>
               <p:cNvPr id="16" name="Textfeld 15">
@@ -8909,7 +9426,7 @@
             </p:txBody>
           </p:sp>
         </mc:Choice>
-        <mc:Fallback>
+        <mc:Fallback xmlns="">
           <p:sp>
             <p:nvSpPr>
               <p:cNvPr id="16" name="Textfeld 15">
@@ -8954,8 +9471,8 @@
           </p:sp>
         </mc:Fallback>
       </mc:AlternateContent>
-      <mc:AlternateContent xmlns:mc="http://schemas.openxmlformats.org/markup-compatibility/2006">
-        <mc:Choice xmlns:a14="http://schemas.microsoft.com/office/drawing/2010/main" Requires="a14">
+      <mc:AlternateContent xmlns:mc="http://schemas.openxmlformats.org/markup-compatibility/2006" xmlns:a14="http://schemas.microsoft.com/office/drawing/2010/main">
+        <mc:Choice Requires="a14">
           <p:sp>
             <p:nvSpPr>
               <p:cNvPr id="17" name="Textfeld 16">
@@ -9030,7 +9547,7 @@
             </p:txBody>
           </p:sp>
         </mc:Choice>
-        <mc:Fallback>
+        <mc:Fallback xmlns="">
           <p:sp>
             <p:nvSpPr>
               <p:cNvPr id="17" name="Textfeld 16">
@@ -9075,8 +9592,8 @@
           </p:sp>
         </mc:Fallback>
       </mc:AlternateContent>
-      <mc:AlternateContent xmlns:mc="http://schemas.openxmlformats.org/markup-compatibility/2006">
-        <mc:Choice xmlns:a14="http://schemas.microsoft.com/office/drawing/2010/main" Requires="a14">
+      <mc:AlternateContent xmlns:mc="http://schemas.openxmlformats.org/markup-compatibility/2006" xmlns:a14="http://schemas.microsoft.com/office/drawing/2010/main">
+        <mc:Choice Requires="a14">
           <p:sp>
             <p:nvSpPr>
               <p:cNvPr id="18" name="Textfeld 17">
@@ -9151,7 +9668,7 @@
             </p:txBody>
           </p:sp>
         </mc:Choice>
-        <mc:Fallback>
+        <mc:Fallback xmlns="">
           <p:sp>
             <p:nvSpPr>
               <p:cNvPr id="18" name="Textfeld 17">
@@ -10380,8 +10897,8 @@
           </a:prstGeom>
         </p:spPr>
       </p:pic>
-      <mc:AlternateContent xmlns:mc="http://schemas.openxmlformats.org/markup-compatibility/2006">
-        <mc:Choice xmlns:a14="http://schemas.microsoft.com/office/drawing/2010/main" Requires="a14">
+      <mc:AlternateContent xmlns:mc="http://schemas.openxmlformats.org/markup-compatibility/2006" xmlns:a14="http://schemas.microsoft.com/office/drawing/2010/main">
+        <mc:Choice Requires="a14">
           <p:sp>
             <p:nvSpPr>
               <p:cNvPr id="19" name="Textfeld 18">
@@ -10468,7 +10985,7 @@
             </p:txBody>
           </p:sp>
         </mc:Choice>
-        <mc:Fallback>
+        <mc:Fallback xmlns="">
           <p:sp>
             <p:nvSpPr>
               <p:cNvPr id="19" name="Textfeld 18">
@@ -10513,8 +11030,8 @@
           </p:sp>
         </mc:Fallback>
       </mc:AlternateContent>
-      <mc:AlternateContent xmlns:mc="http://schemas.openxmlformats.org/markup-compatibility/2006">
-        <mc:Choice xmlns:a14="http://schemas.microsoft.com/office/drawing/2010/main" Requires="a14">
+      <mc:AlternateContent xmlns:mc="http://schemas.openxmlformats.org/markup-compatibility/2006" xmlns:a14="http://schemas.microsoft.com/office/drawing/2010/main">
+        <mc:Choice Requires="a14">
           <p:sp>
             <p:nvSpPr>
               <p:cNvPr id="21" name="Textfeld 20">
@@ -10632,7 +11149,7 @@
             </p:txBody>
           </p:sp>
         </mc:Choice>
-        <mc:Fallback>
+        <mc:Fallback xmlns="">
           <p:sp>
             <p:nvSpPr>
               <p:cNvPr id="21" name="Textfeld 20">
@@ -10677,8 +11194,8 @@
           </p:sp>
         </mc:Fallback>
       </mc:AlternateContent>
-      <mc:AlternateContent xmlns:mc="http://schemas.openxmlformats.org/markup-compatibility/2006">
-        <mc:Choice xmlns:a14="http://schemas.microsoft.com/office/drawing/2010/main" Requires="a14">
+      <mc:AlternateContent xmlns:mc="http://schemas.openxmlformats.org/markup-compatibility/2006" xmlns:a14="http://schemas.microsoft.com/office/drawing/2010/main">
+        <mc:Choice Requires="a14">
           <p:sp>
             <p:nvSpPr>
               <p:cNvPr id="23" name="Textfeld 22">
@@ -10771,7 +11288,7 @@
             </p:txBody>
           </p:sp>
         </mc:Choice>
-        <mc:Fallback>
+        <mc:Fallback xmlns="">
           <p:sp>
             <p:nvSpPr>
               <p:cNvPr id="23" name="Textfeld 22">
@@ -10816,8 +11333,8 @@
           </p:sp>
         </mc:Fallback>
       </mc:AlternateContent>
-      <mc:AlternateContent xmlns:mc="http://schemas.openxmlformats.org/markup-compatibility/2006">
-        <mc:Choice xmlns:a14="http://schemas.microsoft.com/office/drawing/2010/main" Requires="a14">
+      <mc:AlternateContent xmlns:mc="http://schemas.openxmlformats.org/markup-compatibility/2006" xmlns:a14="http://schemas.microsoft.com/office/drawing/2010/main">
+        <mc:Choice Requires="a14">
           <p:sp>
             <p:nvSpPr>
               <p:cNvPr id="24" name="Textfeld 23">
@@ -10904,7 +11421,7 @@
             </p:txBody>
           </p:sp>
         </mc:Choice>
-        <mc:Fallback>
+        <mc:Fallback xmlns="">
           <p:sp>
             <p:nvSpPr>
               <p:cNvPr id="24" name="Textfeld 23">
@@ -10949,8 +11466,8 @@
           </p:sp>
         </mc:Fallback>
       </mc:AlternateContent>
-      <mc:AlternateContent xmlns:mc="http://schemas.openxmlformats.org/markup-compatibility/2006">
-        <mc:Choice xmlns:a14="http://schemas.microsoft.com/office/drawing/2010/main" Requires="a14">
+      <mc:AlternateContent xmlns:mc="http://schemas.openxmlformats.org/markup-compatibility/2006" xmlns:a14="http://schemas.microsoft.com/office/drawing/2010/main">
+        <mc:Choice Requires="a14">
           <p:sp>
             <p:nvSpPr>
               <p:cNvPr id="25" name="Textfeld 24">
@@ -11037,7 +11554,7 @@
             </p:txBody>
           </p:sp>
         </mc:Choice>
-        <mc:Fallback>
+        <mc:Fallback xmlns="">
           <p:sp>
             <p:nvSpPr>
               <p:cNvPr id="25" name="Textfeld 24">
@@ -11082,8 +11599,8 @@
           </p:sp>
         </mc:Fallback>
       </mc:AlternateContent>
-      <mc:AlternateContent xmlns:mc="http://schemas.openxmlformats.org/markup-compatibility/2006">
-        <mc:Choice xmlns:a14="http://schemas.microsoft.com/office/drawing/2010/main" Requires="a14">
+      <mc:AlternateContent xmlns:mc="http://schemas.openxmlformats.org/markup-compatibility/2006" xmlns:a14="http://schemas.microsoft.com/office/drawing/2010/main">
+        <mc:Choice Requires="a14">
           <p:sp>
             <p:nvSpPr>
               <p:cNvPr id="26" name="Textfeld 25">
@@ -11170,7 +11687,7 @@
             </p:txBody>
           </p:sp>
         </mc:Choice>
-        <mc:Fallback>
+        <mc:Fallback xmlns="">
           <p:sp>
             <p:nvSpPr>
               <p:cNvPr id="26" name="Textfeld 25">
@@ -12057,8 +12574,8 @@
           </a:p>
         </p:txBody>
       </p:sp>
-      <mc:AlternateContent xmlns:mc="http://schemas.openxmlformats.org/markup-compatibility/2006">
-        <mc:Choice xmlns:a14="http://schemas.microsoft.com/office/drawing/2010/main" Requires="a14">
+      <mc:AlternateContent xmlns:mc="http://schemas.openxmlformats.org/markup-compatibility/2006" xmlns:a14="http://schemas.microsoft.com/office/drawing/2010/main">
+        <mc:Choice Requires="a14">
           <p:sp>
             <p:nvSpPr>
               <p:cNvPr id="30" name="TextBox 29">
@@ -12133,7 +12650,7 @@
             </p:txBody>
           </p:sp>
         </mc:Choice>
-        <mc:Fallback>
+        <mc:Fallback xmlns="">
           <p:sp>
             <p:nvSpPr>
               <p:cNvPr id="30" name="TextBox 29">
@@ -12178,8 +12695,8 @@
           </p:sp>
         </mc:Fallback>
       </mc:AlternateContent>
-      <mc:AlternateContent xmlns:mc="http://schemas.openxmlformats.org/markup-compatibility/2006">
-        <mc:Choice xmlns:a14="http://schemas.microsoft.com/office/drawing/2010/main" Requires="a14">
+      <mc:AlternateContent xmlns:mc="http://schemas.openxmlformats.org/markup-compatibility/2006" xmlns:a14="http://schemas.microsoft.com/office/drawing/2010/main">
+        <mc:Choice Requires="a14">
           <p:sp>
             <p:nvSpPr>
               <p:cNvPr id="31" name="TextBox 30">
@@ -12260,7 +12777,7 @@
             </p:txBody>
           </p:sp>
         </mc:Choice>
-        <mc:Fallback>
+        <mc:Fallback xmlns="">
           <p:sp>
             <p:nvSpPr>
               <p:cNvPr id="31" name="TextBox 30">
@@ -12305,8 +12822,8 @@
           </p:sp>
         </mc:Fallback>
       </mc:AlternateContent>
-      <mc:AlternateContent xmlns:mc="http://schemas.openxmlformats.org/markup-compatibility/2006">
-        <mc:Choice xmlns:a14="http://schemas.microsoft.com/office/drawing/2010/main" Requires="a14">
+      <mc:AlternateContent xmlns:mc="http://schemas.openxmlformats.org/markup-compatibility/2006" xmlns:a14="http://schemas.microsoft.com/office/drawing/2010/main">
+        <mc:Choice Requires="a14">
           <p:sp>
             <p:nvSpPr>
               <p:cNvPr id="32" name="TextBox 31">
@@ -12415,7 +12932,7 @@
             </p:txBody>
           </p:sp>
         </mc:Choice>
-        <mc:Fallback>
+        <mc:Fallback xmlns="">
           <p:sp>
             <p:nvSpPr>
               <p:cNvPr id="32" name="TextBox 31">
@@ -12460,8 +12977,8 @@
           </p:sp>
         </mc:Fallback>
       </mc:AlternateContent>
-      <mc:AlternateContent xmlns:mc="http://schemas.openxmlformats.org/markup-compatibility/2006">
-        <mc:Choice xmlns:a14="http://schemas.microsoft.com/office/drawing/2010/main" Requires="a14">
+      <mc:AlternateContent xmlns:mc="http://schemas.openxmlformats.org/markup-compatibility/2006" xmlns:a14="http://schemas.microsoft.com/office/drawing/2010/main">
+        <mc:Choice Requires="a14">
           <p:sp>
             <p:nvSpPr>
               <p:cNvPr id="33" name="TextBox 32">
@@ -12536,7 +13053,7 @@
             </p:txBody>
           </p:sp>
         </mc:Choice>
-        <mc:Fallback>
+        <mc:Fallback xmlns="">
           <p:sp>
             <p:nvSpPr>
               <p:cNvPr id="33" name="TextBox 32">
@@ -12671,8 +13188,8 @@
           </a:prstGeom>
         </p:spPr>
       </p:pic>
-      <mc:AlternateContent xmlns:mc="http://schemas.openxmlformats.org/markup-compatibility/2006">
-        <mc:Choice xmlns:a14="http://schemas.microsoft.com/office/drawing/2010/main" Requires="a14">
+      <mc:AlternateContent xmlns:mc="http://schemas.openxmlformats.org/markup-compatibility/2006" xmlns:a14="http://schemas.microsoft.com/office/drawing/2010/main">
+        <mc:Choice Requires="a14">
           <p:sp>
             <p:nvSpPr>
               <p:cNvPr id="40" name="TextBox 39">
@@ -12759,7 +13276,7 @@
             </p:txBody>
           </p:sp>
         </mc:Choice>
-        <mc:Fallback>
+        <mc:Fallback xmlns="">
           <p:sp>
             <p:nvSpPr>
               <p:cNvPr id="40" name="TextBox 39">
@@ -12804,8 +13321,8 @@
           </p:sp>
         </mc:Fallback>
       </mc:AlternateContent>
-      <mc:AlternateContent xmlns:mc="http://schemas.openxmlformats.org/markup-compatibility/2006">
-        <mc:Choice xmlns:a14="http://schemas.microsoft.com/office/drawing/2010/main" Requires="a14">
+      <mc:AlternateContent xmlns:mc="http://schemas.openxmlformats.org/markup-compatibility/2006" xmlns:a14="http://schemas.microsoft.com/office/drawing/2010/main">
+        <mc:Choice Requires="a14">
           <p:sp>
             <p:nvSpPr>
               <p:cNvPr id="41" name="TextBox 40">
@@ -12898,7 +13415,7 @@
             </p:txBody>
           </p:sp>
         </mc:Choice>
-        <mc:Fallback>
+        <mc:Fallback xmlns="">
           <p:sp>
             <p:nvSpPr>
               <p:cNvPr id="41" name="TextBox 40">
@@ -12943,8 +13460,8 @@
           </p:sp>
         </mc:Fallback>
       </mc:AlternateContent>
-      <mc:AlternateContent xmlns:mc="http://schemas.openxmlformats.org/markup-compatibility/2006">
-        <mc:Choice xmlns:a14="http://schemas.microsoft.com/office/drawing/2010/main" Requires="a14">
+      <mc:AlternateContent xmlns:mc="http://schemas.openxmlformats.org/markup-compatibility/2006" xmlns:a14="http://schemas.microsoft.com/office/drawing/2010/main">
+        <mc:Choice Requires="a14">
           <p:sp>
             <p:nvSpPr>
               <p:cNvPr id="42" name="TextBox 41">
@@ -13053,7 +13570,7 @@
             </p:txBody>
           </p:sp>
         </mc:Choice>
-        <mc:Fallback>
+        <mc:Fallback xmlns="">
           <p:sp>
             <p:nvSpPr>
               <p:cNvPr id="42" name="TextBox 41">
@@ -13098,8 +13615,8 @@
           </p:sp>
         </mc:Fallback>
       </mc:AlternateContent>
-      <mc:AlternateContent xmlns:mc="http://schemas.openxmlformats.org/markup-compatibility/2006">
-        <mc:Choice xmlns:a14="http://schemas.microsoft.com/office/drawing/2010/main" Requires="a14">
+      <mc:AlternateContent xmlns:mc="http://schemas.openxmlformats.org/markup-compatibility/2006" xmlns:a14="http://schemas.microsoft.com/office/drawing/2010/main">
+        <mc:Choice Requires="a14">
           <p:sp>
             <p:nvSpPr>
               <p:cNvPr id="43" name="TextBox 42">
@@ -13177,7 +13694,7 @@
             </p:txBody>
           </p:sp>
         </mc:Choice>
-        <mc:Fallback>
+        <mc:Fallback xmlns="">
           <p:sp>
             <p:nvSpPr>
               <p:cNvPr id="43" name="TextBox 42">
@@ -13271,8 +13788,8 @@
           </a:p>
         </p:txBody>
       </p:sp>
-      <mc:AlternateContent xmlns:mc="http://schemas.openxmlformats.org/markup-compatibility/2006">
-        <mc:Choice xmlns:a14="http://schemas.microsoft.com/office/drawing/2010/main" Requires="a14">
+      <mc:AlternateContent xmlns:mc="http://schemas.openxmlformats.org/markup-compatibility/2006" xmlns:a14="http://schemas.microsoft.com/office/drawing/2010/main">
+        <mc:Choice Requires="a14">
           <p:sp>
             <p:nvSpPr>
               <p:cNvPr id="45" name="TextBox 44">
@@ -13398,7 +13915,7 @@
             </p:txBody>
           </p:sp>
         </mc:Choice>
-        <mc:Fallback>
+        <mc:Fallback xmlns="">
           <p:sp>
             <p:nvSpPr>
               <p:cNvPr id="45" name="TextBox 44">
@@ -15391,59 +15908,10 @@
       </p:pic>
       <p:sp>
         <p:nvSpPr>
-          <p:cNvPr id="17" name="Geschweifte Klammer rechts 11">
-            <a:extLst>
-              <a:ext uri="{FF2B5EF4-FFF2-40B4-BE49-F238E27FC236}">
-                <a16:creationId xmlns:a16="http://schemas.microsoft.com/office/drawing/2014/main" id="{B20FF8CF-BE93-4CFE-B335-DDE06D454FA2}"/>
-              </a:ext>
-            </a:extLst>
-          </p:cNvPr>
-          <p:cNvSpPr/>
-          <p:nvPr/>
-        </p:nvSpPr>
-        <p:spPr>
-          <a:xfrm>
-            <a:off x="9372600" y="1690688"/>
-            <a:ext cx="360000" cy="4447519"/>
-          </a:xfrm>
-          <a:prstGeom prst="rightBrace">
-            <a:avLst/>
-          </a:prstGeom>
-          <a:ln>
-            <a:solidFill>
-              <a:schemeClr val="tx1"/>
-            </a:solidFill>
-          </a:ln>
-        </p:spPr>
-        <p:style>
-          <a:lnRef idx="1">
-            <a:schemeClr val="accent1"/>
-          </a:lnRef>
-          <a:fillRef idx="0">
-            <a:schemeClr val="accent1"/>
-          </a:fillRef>
-          <a:effectRef idx="0">
-            <a:schemeClr val="accent1"/>
-          </a:effectRef>
-          <a:fontRef idx="minor">
-            <a:schemeClr val="tx1"/>
-          </a:fontRef>
-        </p:style>
-        <p:txBody>
-          <a:bodyPr rtlCol="0" anchor="ctr"/>
-          <a:lstStyle/>
-          <a:p>
-            <a:pPr algn="ctr"/>
-            <a:endParaRPr lang="de-DE"/>
-          </a:p>
-        </p:txBody>
-      </p:sp>
-      <p:sp>
-        <p:nvSpPr>
-          <p:cNvPr id="3" name="TextBox 2">
-            <a:extLst>
-              <a:ext uri="{FF2B5EF4-FFF2-40B4-BE49-F238E27FC236}">
-                <a16:creationId xmlns:a16="http://schemas.microsoft.com/office/drawing/2014/main" id="{0E002AA4-5FF2-4368-A859-0C80D3B8081E}"/>
+          <p:cNvPr id="4" name="TextBox 3">
+            <a:extLst>
+              <a:ext uri="{FF2B5EF4-FFF2-40B4-BE49-F238E27FC236}">
+                <a16:creationId xmlns:a16="http://schemas.microsoft.com/office/drawing/2014/main" id="{917F4E52-9F09-7D04-CD35-AF0BA6A1AAA0}"/>
               </a:ext>
             </a:extLst>
           </p:cNvPr>
@@ -15452,8 +15920,8 @@
         </p:nvSpPr>
         <p:spPr>
           <a:xfrm>
-            <a:off x="9779442" y="3221950"/>
-            <a:ext cx="2384372" cy="1384995"/>
+            <a:off x="9576581" y="3121223"/>
+            <a:ext cx="2227385" cy="307777"/>
           </a:xfrm>
           <a:prstGeom prst="rect">
             <a:avLst/>
@@ -15466,39 +15934,44 @@
           </a:bodyPr>
           <a:lstStyle/>
           <a:p>
-            <a:pPr marL="285750" indent="-285750">
-              <a:buFont typeface="Arial" panose="020B0604020202020204" pitchFamily="34" charset="0"/>
-              <a:buChar char="•"/>
-            </a:pPr>
             <a:r>
               <a:rPr lang="de-DE" sz="1400" dirty="0"/>
-              <a:t>Stapeln der Fehler jedes Datums bei </a:t>
-            </a:r>
-            <a:r>
-              <a:rPr lang="de-DE" sz="1400" dirty="0" err="1"/>
-              <a:t>axis</a:t>
-            </a:r>
+              <a:t>Allgemeingültige Lösung</a:t>
+            </a:r>
+          </a:p>
+        </p:txBody>
+      </p:sp>
+      <p:sp>
+        <p:nvSpPr>
+          <p:cNvPr id="8" name="TextBox 7">
+            <a:extLst>
+              <a:ext uri="{FF2B5EF4-FFF2-40B4-BE49-F238E27FC236}">
+                <a16:creationId xmlns:a16="http://schemas.microsoft.com/office/drawing/2014/main" id="{8FA8B8AE-7704-0A2F-EBD1-B7F7C8C43993}"/>
+              </a:ext>
+            </a:extLst>
+          </p:cNvPr>
+          <p:cNvSpPr txBox="1"/>
+          <p:nvPr/>
+        </p:nvSpPr>
+        <p:spPr>
+          <a:xfrm>
+            <a:off x="6695050" y="5054855"/>
+            <a:ext cx="3358661" cy="523220"/>
+          </a:xfrm>
+          <a:prstGeom prst="rect">
+            <a:avLst/>
+          </a:prstGeom>
+          <a:noFill/>
+        </p:spPr>
+        <p:txBody>
+          <a:bodyPr wrap="square" rtlCol="0">
+            <a:spAutoFit/>
+          </a:bodyPr>
+          <a:lstStyle/>
+          <a:p>
             <a:r>
               <a:rPr lang="de-DE" sz="1400" dirty="0"/>
-              <a:t>=0</a:t>
-            </a:r>
-          </a:p>
-          <a:p>
-            <a:pPr marL="285750" indent="-285750">
-              <a:buFont typeface="Arial" panose="020B0604020202020204" pitchFamily="34" charset="0"/>
-              <a:buChar char="•"/>
-            </a:pPr>
-            <a:r>
-              <a:rPr lang="de-DE" sz="1400" dirty="0"/>
-              <a:t>„Gleichzeitige“ Berechnung von batch-size Fehlern ohne explizite </a:t>
-            </a:r>
-            <a:r>
-              <a:rPr lang="de-DE" sz="1400" dirty="0" err="1"/>
-              <a:t>for</a:t>
-            </a:r>
-            <a:r>
-              <a:rPr lang="de-DE" sz="1400" dirty="0"/>
-              <a:t>-loop</a:t>
+              <a:t>Lösung für eine Multi-Class Klassifikation mit Kreuzentropie Kostenfunktion</a:t>
             </a:r>
           </a:p>
         </p:txBody>
@@ -15560,39 +16033,21 @@
                                   </p:childTnLst>
                                 </p:cTn>
                               </p:par>
-                            </p:childTnLst>
-                          </p:cTn>
-                        </p:par>
-                      </p:childTnLst>
-                    </p:cTn>
-                  </p:par>
-                  <p:par>
-                    <p:cTn id="7" fill="hold">
-                      <p:stCondLst>
-                        <p:cond delay="indefinite"/>
-                      </p:stCondLst>
-                      <p:childTnLst>
-                        <p:par>
-                          <p:cTn id="8" fill="hold">
-                            <p:stCondLst>
-                              <p:cond delay="0"/>
-                            </p:stCondLst>
-                            <p:childTnLst>
                               <p:par>
-                                <p:cTn id="9" presetID="1" presetClass="entr" presetSubtype="0" fill="hold" nodeType="clickEffect">
+                                <p:cTn id="7" presetID="1" presetClass="entr" presetSubtype="0" fill="hold" grpId="0" nodeType="withEffect">
                                   <p:stCondLst>
                                     <p:cond delay="0"/>
                                   </p:stCondLst>
                                   <p:childTnLst>
                                     <p:set>
                                       <p:cBhvr>
-                                        <p:cTn id="10" dur="1" fill="hold">
+                                        <p:cTn id="8" dur="1" fill="hold">
                                           <p:stCondLst>
                                             <p:cond delay="0"/>
                                           </p:stCondLst>
                                         </p:cTn>
                                         <p:tgtEl>
-                                          <p:spTgt spid="16"/>
+                                          <p:spTgt spid="4"/>
                                         </p:tgtEl>
                                         <p:attrNameLst>
                                           <p:attrName>style.visibility</p:attrName>
@@ -15612,32 +16067,32 @@
                     </p:cTn>
                   </p:par>
                   <p:par>
-                    <p:cTn id="11" fill="hold">
+                    <p:cTn id="9" fill="hold">
                       <p:stCondLst>
                         <p:cond delay="indefinite"/>
                       </p:stCondLst>
                       <p:childTnLst>
                         <p:par>
-                          <p:cTn id="12" fill="hold">
+                          <p:cTn id="10" fill="hold">
                             <p:stCondLst>
                               <p:cond delay="0"/>
                             </p:stCondLst>
                             <p:childTnLst>
                               <p:par>
-                                <p:cTn id="13" presetID="1" presetClass="entr" presetSubtype="0" fill="hold" grpId="0" nodeType="clickEffect">
+                                <p:cTn id="11" presetID="1" presetClass="entr" presetSubtype="0" fill="hold" nodeType="clickEffect">
                                   <p:stCondLst>
                                     <p:cond delay="0"/>
                                   </p:stCondLst>
                                   <p:childTnLst>
                                     <p:set>
                                       <p:cBhvr>
-                                        <p:cTn id="14" dur="1" fill="hold">
+                                        <p:cTn id="12" dur="1" fill="hold">
                                           <p:stCondLst>
                                             <p:cond delay="0"/>
                                           </p:stCondLst>
                                         </p:cTn>
                                         <p:tgtEl>
-                                          <p:spTgt spid="17"/>
+                                          <p:spTgt spid="16"/>
                                         </p:tgtEl>
                                         <p:attrNameLst>
                                           <p:attrName>style.visibility</p:attrName>
@@ -15651,20 +16106,20 @@
                                 </p:cTn>
                               </p:par>
                               <p:par>
-                                <p:cTn id="15" presetID="1" presetClass="entr" presetSubtype="0" fill="hold" grpId="0" nodeType="withEffect">
+                                <p:cTn id="13" presetID="1" presetClass="entr" presetSubtype="0" fill="hold" grpId="0" nodeType="withEffect">
                                   <p:stCondLst>
                                     <p:cond delay="0"/>
                                   </p:stCondLst>
                                   <p:childTnLst>
                                     <p:set>
                                       <p:cBhvr>
-                                        <p:cTn id="16" dur="1" fill="hold">
+                                        <p:cTn id="14" dur="1" fill="hold">
                                           <p:stCondLst>
                                             <p:cond delay="0"/>
                                           </p:stCondLst>
                                         </p:cTn>
                                         <p:tgtEl>
-                                          <p:spTgt spid="3"/>
+                                          <p:spTgt spid="8"/>
                                         </p:tgtEl>
                                         <p:attrNameLst>
                                           <p:attrName>style.visibility</p:attrName>
@@ -15705,8 +16160,8 @@
       </p:par>
     </p:tnLst>
     <p:bldLst>
-      <p:bldP spid="17" grpId="0" animBg="1"/>
-      <p:bldP spid="3" grpId="0"/>
+      <p:bldP spid="4" grpId="0"/>
+      <p:bldP spid="8" grpId="0"/>
     </p:bldLst>
   </p:timing>
 </p:sld>

</xml_diff>

<commit_message>
revised up to and incl. BP2.2
</commit_message>
<xml_diff>
--- a/theory/submission/result_presentation.pptx
+++ b/theory/submission/result_presentation.pptx
@@ -5,7 +5,7 @@
     <p:sldMasterId id="2147483648" r:id="rId1"/>
   </p:sldMasterIdLst>
   <p:notesMasterIdLst>
-    <p:notesMasterId r:id="rId18"/>
+    <p:notesMasterId r:id="rId20"/>
   </p:notesMasterIdLst>
   <p:sldIdLst>
     <p:sldId id="256" r:id="rId2"/>
@@ -22,8 +22,10 @@
     <p:sldId id="267" r:id="rId13"/>
     <p:sldId id="279" r:id="rId14"/>
     <p:sldId id="273" r:id="rId15"/>
-    <p:sldId id="276" r:id="rId16"/>
-    <p:sldId id="274" r:id="rId17"/>
+    <p:sldId id="281" r:id="rId16"/>
+    <p:sldId id="280" r:id="rId17"/>
+    <p:sldId id="276" r:id="rId18"/>
+    <p:sldId id="274" r:id="rId19"/>
   </p:sldIdLst>
   <p:sldSz cx="12192000" cy="6858000"/>
   <p:notesSz cx="6858000" cy="9144000"/>
@@ -212,7 +214,7 @@
           <a:p>
             <a:fld id="{8EB49EC5-088D-473F-9BFC-E2740B5DA688}" type="datetimeFigureOut">
               <a:rPr lang="de-DE" smtClean="0"/>
-              <a:t>02.05.2022</a:t>
+              <a:t>03.05.2022</a:t>
             </a:fld>
             <a:endParaRPr lang="de-DE"/>
           </a:p>
@@ -753,7 +755,7 @@
           <a:p>
             <a:fld id="{D4C12A24-BF94-4906-B274-F5BF4D611E23}" type="slidenum">
               <a:rPr lang="de-DE" smtClean="0"/>
-              <a:t>15</a:t>
+              <a:t>17</a:t>
             </a:fld>
             <a:endParaRPr lang="de-DE"/>
           </a:p>
@@ -1856,7 +1858,7 @@
           <a:p>
             <a:fld id="{E47F9164-12F9-48A6-9622-CDF71CB57A75}" type="datetimeFigureOut">
               <a:rPr lang="de-DE" smtClean="0"/>
-              <a:t>02.05.2022</a:t>
+              <a:t>03.05.2022</a:t>
             </a:fld>
             <a:endParaRPr lang="de-DE"/>
           </a:p>
@@ -2054,7 +2056,7 @@
           <a:p>
             <a:fld id="{E47F9164-12F9-48A6-9622-CDF71CB57A75}" type="datetimeFigureOut">
               <a:rPr lang="de-DE" smtClean="0"/>
-              <a:t>02.05.2022</a:t>
+              <a:t>03.05.2022</a:t>
             </a:fld>
             <a:endParaRPr lang="de-DE"/>
           </a:p>
@@ -2262,7 +2264,7 @@
           <a:p>
             <a:fld id="{E47F9164-12F9-48A6-9622-CDF71CB57A75}" type="datetimeFigureOut">
               <a:rPr lang="de-DE" smtClean="0"/>
-              <a:t>02.05.2022</a:t>
+              <a:t>03.05.2022</a:t>
             </a:fld>
             <a:endParaRPr lang="de-DE"/>
           </a:p>
@@ -2460,7 +2462,7 @@
           <a:p>
             <a:fld id="{E47F9164-12F9-48A6-9622-CDF71CB57A75}" type="datetimeFigureOut">
               <a:rPr lang="de-DE" smtClean="0"/>
-              <a:t>02.05.2022</a:t>
+              <a:t>03.05.2022</a:t>
             </a:fld>
             <a:endParaRPr lang="de-DE"/>
           </a:p>
@@ -2735,7 +2737,7 @@
           <a:p>
             <a:fld id="{E47F9164-12F9-48A6-9622-CDF71CB57A75}" type="datetimeFigureOut">
               <a:rPr lang="de-DE" smtClean="0"/>
-              <a:t>02.05.2022</a:t>
+              <a:t>03.05.2022</a:t>
             </a:fld>
             <a:endParaRPr lang="de-DE"/>
           </a:p>
@@ -3000,7 +3002,7 @@
           <a:p>
             <a:fld id="{E47F9164-12F9-48A6-9622-CDF71CB57A75}" type="datetimeFigureOut">
               <a:rPr lang="de-DE" smtClean="0"/>
-              <a:t>02.05.2022</a:t>
+              <a:t>03.05.2022</a:t>
             </a:fld>
             <a:endParaRPr lang="de-DE"/>
           </a:p>
@@ -3412,7 +3414,7 @@
           <a:p>
             <a:fld id="{E47F9164-12F9-48A6-9622-CDF71CB57A75}" type="datetimeFigureOut">
               <a:rPr lang="de-DE" smtClean="0"/>
-              <a:t>02.05.2022</a:t>
+              <a:t>03.05.2022</a:t>
             </a:fld>
             <a:endParaRPr lang="de-DE"/>
           </a:p>
@@ -3553,7 +3555,7 @@
           <a:p>
             <a:fld id="{E47F9164-12F9-48A6-9622-CDF71CB57A75}" type="datetimeFigureOut">
               <a:rPr lang="de-DE" smtClean="0"/>
-              <a:t>02.05.2022</a:t>
+              <a:t>03.05.2022</a:t>
             </a:fld>
             <a:endParaRPr lang="de-DE"/>
           </a:p>
@@ -3666,7 +3668,7 @@
           <a:p>
             <a:fld id="{E47F9164-12F9-48A6-9622-CDF71CB57A75}" type="datetimeFigureOut">
               <a:rPr lang="de-DE" smtClean="0"/>
-              <a:t>02.05.2022</a:t>
+              <a:t>03.05.2022</a:t>
             </a:fld>
             <a:endParaRPr lang="de-DE"/>
           </a:p>
@@ -3977,7 +3979,7 @@
           <a:p>
             <a:fld id="{E47F9164-12F9-48A6-9622-CDF71CB57A75}" type="datetimeFigureOut">
               <a:rPr lang="de-DE" smtClean="0"/>
-              <a:t>02.05.2022</a:t>
+              <a:t>03.05.2022</a:t>
             </a:fld>
             <a:endParaRPr lang="de-DE"/>
           </a:p>
@@ -4265,7 +4267,7 @@
           <a:p>
             <a:fld id="{E47F9164-12F9-48A6-9622-CDF71CB57A75}" type="datetimeFigureOut">
               <a:rPr lang="de-DE" smtClean="0"/>
-              <a:t>02.05.2022</a:t>
+              <a:t>03.05.2022</a:t>
             </a:fld>
             <a:endParaRPr lang="de-DE"/>
           </a:p>
@@ -4506,7 +4508,7 @@
           <a:p>
             <a:fld id="{E47F9164-12F9-48A6-9622-CDF71CB57A75}" type="datetimeFigureOut">
               <a:rPr lang="de-DE" smtClean="0"/>
-              <a:t>02.05.2022</a:t>
+              <a:t>03.05.2022</a:t>
             </a:fld>
             <a:endParaRPr lang="de-DE"/>
           </a:p>
@@ -6541,8 +6543,8 @@
           </a:p>
         </p:txBody>
       </p:sp>
-      <mc:AlternateContent xmlns:mc="http://schemas.openxmlformats.org/markup-compatibility/2006">
-        <mc:Choice xmlns:a14="http://schemas.microsoft.com/office/drawing/2010/main" Requires="a14">
+      <mc:AlternateContent xmlns:mc="http://schemas.openxmlformats.org/markup-compatibility/2006" xmlns:a14="http://schemas.microsoft.com/office/drawing/2010/main">
+        <mc:Choice Requires="a14">
           <p:sp>
             <p:nvSpPr>
               <p:cNvPr id="14" name="TextBox 13">
@@ -6697,7 +6699,7 @@
             </p:txBody>
           </p:sp>
         </mc:Choice>
-        <mc:Fallback>
+        <mc:Fallback xmlns="">
           <p:sp>
             <p:nvSpPr>
               <p:cNvPr id="14" name="TextBox 13">
@@ -7801,8 +7803,8 @@
         </p:nvSpPr>
         <p:spPr>
           <a:xfrm>
-            <a:off x="7737223" y="1933411"/>
-            <a:ext cx="1378634" cy="738664"/>
+            <a:off x="7764929" y="1933411"/>
+            <a:ext cx="1378634" cy="954107"/>
           </a:xfrm>
           <a:prstGeom prst="rect">
             <a:avLst/>
@@ -7817,7 +7819,13 @@
           <a:p>
             <a:r>
               <a:rPr lang="de-DE" sz="1400" dirty="0"/>
-              <a:t>Ableitung eines einzelnen Fehlers</a:t>
+              <a:t>Gewichts-</a:t>
+            </a:r>
+          </a:p>
+          <a:p>
+            <a:r>
+              <a:rPr lang="de-DE" sz="1400" dirty="0"/>
+              <a:t>gradient eines einzelnen Datums</a:t>
             </a:r>
           </a:p>
         </p:txBody>
@@ -8262,6 +8270,1800 @@
               <a:rPr lang="de-DE" dirty="0"/>
             </a:br>
             <a:r>
+              <a:rPr lang="de-DE" sz="2400" dirty="0"/>
+              <a:t>Biasgradient für ein einziges Datum</a:t>
+            </a:r>
+            <a:endParaRPr lang="de-DE" dirty="0"/>
+          </a:p>
+        </p:txBody>
+      </p:sp>
+      <p:pic>
+        <p:nvPicPr>
+          <p:cNvPr id="5" name="Picture 4">
+            <a:extLst>
+              <a:ext uri="{FF2B5EF4-FFF2-40B4-BE49-F238E27FC236}">
+                <a16:creationId xmlns:a16="http://schemas.microsoft.com/office/drawing/2014/main" id="{7C5657D7-0D2E-ABEE-19BB-DD13E7BDAF00}"/>
+              </a:ext>
+            </a:extLst>
+          </p:cNvPr>
+          <p:cNvPicPr>
+            <a:picLocks noChangeAspect="1"/>
+          </p:cNvPicPr>
+          <p:nvPr/>
+        </p:nvPicPr>
+        <p:blipFill rotWithShape="1">
+          <a:blip r:embed="rId2"/>
+          <a:srcRect r="68724"/>
+          <a:stretch/>
+        </p:blipFill>
+        <p:spPr>
+          <a:xfrm>
+            <a:off x="831531" y="1845437"/>
+            <a:ext cx="456105" cy="690795"/>
+          </a:xfrm>
+          <a:prstGeom prst="rect">
+            <a:avLst/>
+          </a:prstGeom>
+        </p:spPr>
+      </p:pic>
+      <p:pic>
+        <p:nvPicPr>
+          <p:cNvPr id="8" name="Picture 7">
+            <a:extLst>
+              <a:ext uri="{FF2B5EF4-FFF2-40B4-BE49-F238E27FC236}">
+                <a16:creationId xmlns:a16="http://schemas.microsoft.com/office/drawing/2014/main" id="{871F0F3A-D581-35D0-2E70-34B4D62E8685}"/>
+              </a:ext>
+            </a:extLst>
+          </p:cNvPr>
+          <p:cNvPicPr>
+            <a:picLocks noChangeAspect="1"/>
+          </p:cNvPicPr>
+          <p:nvPr/>
+        </p:nvPicPr>
+        <p:blipFill rotWithShape="1">
+          <a:blip r:embed="rId2"/>
+          <a:srcRect l="33387"/>
+          <a:stretch/>
+        </p:blipFill>
+        <p:spPr>
+          <a:xfrm>
+            <a:off x="3396343" y="1825994"/>
+            <a:ext cx="1026136" cy="729681"/>
+          </a:xfrm>
+          <a:prstGeom prst="rect">
+            <a:avLst/>
+          </a:prstGeom>
+        </p:spPr>
+      </p:pic>
+      <p:sp>
+        <p:nvSpPr>
+          <p:cNvPr id="6" name="TextBox 5">
+            <a:extLst>
+              <a:ext uri="{FF2B5EF4-FFF2-40B4-BE49-F238E27FC236}">
+                <a16:creationId xmlns:a16="http://schemas.microsoft.com/office/drawing/2014/main" id="{7AC09BF9-642F-E08C-72CE-A990CD7F71D7}"/>
+              </a:ext>
+            </a:extLst>
+          </p:cNvPr>
+          <p:cNvSpPr txBox="1"/>
+          <p:nvPr/>
+        </p:nvSpPr>
+        <p:spPr>
+          <a:xfrm>
+            <a:off x="1523161" y="1821502"/>
+            <a:ext cx="1817649" cy="738664"/>
+          </a:xfrm>
+          <a:prstGeom prst="rect">
+            <a:avLst/>
+          </a:prstGeom>
+          <a:noFill/>
+        </p:spPr>
+        <p:txBody>
+          <a:bodyPr wrap="square" rtlCol="0">
+            <a:spAutoFit/>
+          </a:bodyPr>
+          <a:lstStyle/>
+          <a:p>
+            <a:r>
+              <a:rPr lang="de-DE" sz="1400" dirty="0"/>
+              <a:t>Ableitung des Fehlers nach den Biases in Layer l </a:t>
+            </a:r>
+          </a:p>
+        </p:txBody>
+      </p:sp>
+      <p:pic>
+        <p:nvPicPr>
+          <p:cNvPr id="10" name="Picture 9">
+            <a:extLst>
+              <a:ext uri="{FF2B5EF4-FFF2-40B4-BE49-F238E27FC236}">
+                <a16:creationId xmlns:a16="http://schemas.microsoft.com/office/drawing/2014/main" id="{1C9F9E84-0810-13B9-1121-68219594C69E}"/>
+              </a:ext>
+            </a:extLst>
+          </p:cNvPr>
+          <p:cNvPicPr>
+            <a:picLocks noChangeAspect="1"/>
+          </p:cNvPicPr>
+          <p:nvPr/>
+        </p:nvPicPr>
+        <p:blipFill rotWithShape="1">
+          <a:blip r:embed="rId3"/>
+          <a:srcRect l="3886" t="16011" r="4425" b="14589"/>
+          <a:stretch/>
+        </p:blipFill>
+        <p:spPr>
+          <a:xfrm>
+            <a:off x="5624796" y="1934589"/>
+            <a:ext cx="2808841" cy="512491"/>
+          </a:xfrm>
+          <a:prstGeom prst="rect">
+            <a:avLst/>
+          </a:prstGeom>
+        </p:spPr>
+      </p:pic>
+      <p:sp>
+        <p:nvSpPr>
+          <p:cNvPr id="11" name="TextBox 10">
+            <a:extLst>
+              <a:ext uri="{FF2B5EF4-FFF2-40B4-BE49-F238E27FC236}">
+                <a16:creationId xmlns:a16="http://schemas.microsoft.com/office/drawing/2014/main" id="{DA9A835D-90FD-8AC8-0AA2-274FA0CDF9CD}"/>
+              </a:ext>
+            </a:extLst>
+          </p:cNvPr>
+          <p:cNvSpPr txBox="1"/>
+          <p:nvPr/>
+        </p:nvSpPr>
+        <p:spPr>
+          <a:xfrm>
+            <a:off x="8697418" y="1929224"/>
+            <a:ext cx="3191023" cy="523220"/>
+          </a:xfrm>
+          <a:prstGeom prst="rect">
+            <a:avLst/>
+          </a:prstGeom>
+          <a:noFill/>
+        </p:spPr>
+        <p:txBody>
+          <a:bodyPr wrap="square" rtlCol="0">
+            <a:spAutoFit/>
+          </a:bodyPr>
+          <a:lstStyle/>
+          <a:p>
+            <a:pPr marL="285750" indent="-285750">
+              <a:buFont typeface="Arial" panose="020B0604020202020204" pitchFamily="34" charset="0"/>
+              <a:buChar char="•"/>
+            </a:pPr>
+            <a:r>
+              <a:rPr lang="de-DE" sz="1400" dirty="0"/>
+              <a:t>Fehlersignal in Layer l</a:t>
+            </a:r>
+          </a:p>
+          <a:p>
+            <a:pPr marL="285750" indent="-285750">
+              <a:buFont typeface="Arial" panose="020B0604020202020204" pitchFamily="34" charset="0"/>
+              <a:buChar char="•"/>
+            </a:pPr>
+            <a:r>
+              <a:rPr lang="de-DE" sz="1400" dirty="0"/>
+              <a:t>Bereits berechnet</a:t>
+            </a:r>
+          </a:p>
+        </p:txBody>
+      </p:sp>
+      <p:pic>
+        <p:nvPicPr>
+          <p:cNvPr id="12" name="Picture 11">
+            <a:extLst>
+              <a:ext uri="{FF2B5EF4-FFF2-40B4-BE49-F238E27FC236}">
+                <a16:creationId xmlns:a16="http://schemas.microsoft.com/office/drawing/2014/main" id="{3E1290D8-7602-F2AF-1EA6-FD5D72AAD8B2}"/>
+              </a:ext>
+            </a:extLst>
+          </p:cNvPr>
+          <p:cNvPicPr>
+            <a:picLocks noChangeAspect="1"/>
+          </p:cNvPicPr>
+          <p:nvPr/>
+        </p:nvPicPr>
+        <p:blipFill rotWithShape="1">
+          <a:blip r:embed="rId2"/>
+          <a:srcRect l="70391"/>
+          <a:stretch/>
+        </p:blipFill>
+        <p:spPr>
+          <a:xfrm>
+            <a:off x="838200" y="3294802"/>
+            <a:ext cx="456106" cy="729681"/>
+          </a:xfrm>
+          <a:prstGeom prst="rect">
+            <a:avLst/>
+          </a:prstGeom>
+        </p:spPr>
+      </p:pic>
+      <p:pic>
+        <p:nvPicPr>
+          <p:cNvPr id="13" name="Picture 12">
+            <a:extLst>
+              <a:ext uri="{FF2B5EF4-FFF2-40B4-BE49-F238E27FC236}">
+                <a16:creationId xmlns:a16="http://schemas.microsoft.com/office/drawing/2014/main" id="{45B05042-3F86-2FD9-9E9A-A9815886021B}"/>
+              </a:ext>
+            </a:extLst>
+          </p:cNvPr>
+          <p:cNvPicPr>
+            <a:picLocks noChangeAspect="1"/>
+          </p:cNvPicPr>
+          <p:nvPr/>
+        </p:nvPicPr>
+        <p:blipFill rotWithShape="1">
+          <a:blip r:embed="rId2"/>
+          <a:srcRect l="31756" r="52844"/>
+          <a:stretch/>
+        </p:blipFill>
+        <p:spPr>
+          <a:xfrm>
+            <a:off x="1413164" y="3294802"/>
+            <a:ext cx="237216" cy="729681"/>
+          </a:xfrm>
+          <a:prstGeom prst="rect">
+            <a:avLst/>
+          </a:prstGeom>
+        </p:spPr>
+      </p:pic>
+      <p:pic>
+        <p:nvPicPr>
+          <p:cNvPr id="15" name="Picture 14">
+            <a:extLst>
+              <a:ext uri="{FF2B5EF4-FFF2-40B4-BE49-F238E27FC236}">
+                <a16:creationId xmlns:a16="http://schemas.microsoft.com/office/drawing/2014/main" id="{D6AF65D8-F9CC-A514-1991-A8C6F477C50A}"/>
+              </a:ext>
+            </a:extLst>
+          </p:cNvPr>
+          <p:cNvPicPr>
+            <a:picLocks noChangeAspect="1"/>
+          </p:cNvPicPr>
+          <p:nvPr/>
+        </p:nvPicPr>
+        <p:blipFill>
+          <a:blip r:embed="rId4"/>
+          <a:stretch>
+            <a:fillRect/>
+          </a:stretch>
+        </p:blipFill>
+        <p:spPr>
+          <a:xfrm>
+            <a:off x="1839486" y="3049994"/>
+            <a:ext cx="1238250" cy="1219297"/>
+          </a:xfrm>
+          <a:prstGeom prst="rect">
+            <a:avLst/>
+          </a:prstGeom>
+        </p:spPr>
+      </p:pic>
+      <p:pic>
+        <p:nvPicPr>
+          <p:cNvPr id="17" name="Picture 16">
+            <a:extLst>
+              <a:ext uri="{FF2B5EF4-FFF2-40B4-BE49-F238E27FC236}">
+                <a16:creationId xmlns:a16="http://schemas.microsoft.com/office/drawing/2014/main" id="{E4B27849-B38C-27EF-9984-28318EF44E00}"/>
+              </a:ext>
+            </a:extLst>
+          </p:cNvPr>
+          <p:cNvPicPr>
+            <a:picLocks noChangeAspect="1"/>
+          </p:cNvPicPr>
+          <p:nvPr/>
+        </p:nvPicPr>
+        <p:blipFill rotWithShape="1">
+          <a:blip r:embed="rId5"/>
+          <a:srcRect t="13272" r="1614"/>
+          <a:stretch/>
+        </p:blipFill>
+        <p:spPr>
+          <a:xfrm>
+            <a:off x="2056333" y="4789104"/>
+            <a:ext cx="3136613" cy="1325564"/>
+          </a:xfrm>
+          <a:prstGeom prst="rect">
+            <a:avLst/>
+          </a:prstGeom>
+        </p:spPr>
+      </p:pic>
+      <p:pic>
+        <p:nvPicPr>
+          <p:cNvPr id="18" name="Picture 17">
+            <a:extLst>
+              <a:ext uri="{FF2B5EF4-FFF2-40B4-BE49-F238E27FC236}">
+                <a16:creationId xmlns:a16="http://schemas.microsoft.com/office/drawing/2014/main" id="{285F94E9-3113-1CE1-8A2B-D80C78CF0010}"/>
+              </a:ext>
+            </a:extLst>
+          </p:cNvPr>
+          <p:cNvPicPr>
+            <a:picLocks noChangeAspect="1"/>
+          </p:cNvPicPr>
+          <p:nvPr/>
+        </p:nvPicPr>
+        <p:blipFill rotWithShape="1">
+          <a:blip r:embed="rId2"/>
+          <a:srcRect l="46632"/>
+          <a:stretch/>
+        </p:blipFill>
+        <p:spPr>
+          <a:xfrm>
+            <a:off x="831531" y="5106489"/>
+            <a:ext cx="778293" cy="690795"/>
+          </a:xfrm>
+          <a:prstGeom prst="rect">
+            <a:avLst/>
+          </a:prstGeom>
+        </p:spPr>
+      </p:pic>
+      <p:pic>
+        <p:nvPicPr>
+          <p:cNvPr id="19" name="Picture 18">
+            <a:extLst>
+              <a:ext uri="{FF2B5EF4-FFF2-40B4-BE49-F238E27FC236}">
+                <a16:creationId xmlns:a16="http://schemas.microsoft.com/office/drawing/2014/main" id="{9C5183E1-CAEA-884B-C787-705121A6D972}"/>
+              </a:ext>
+            </a:extLst>
+          </p:cNvPr>
+          <p:cNvPicPr>
+            <a:picLocks noChangeAspect="1"/>
+          </p:cNvPicPr>
+          <p:nvPr/>
+        </p:nvPicPr>
+        <p:blipFill rotWithShape="1">
+          <a:blip r:embed="rId2"/>
+          <a:srcRect l="29782" r="52844"/>
+          <a:stretch/>
+        </p:blipFill>
+        <p:spPr>
+          <a:xfrm>
+            <a:off x="1643539" y="5087046"/>
+            <a:ext cx="267629" cy="729681"/>
+          </a:xfrm>
+          <a:prstGeom prst="rect">
+            <a:avLst/>
+          </a:prstGeom>
+        </p:spPr>
+      </p:pic>
+      <p:pic>
+        <p:nvPicPr>
+          <p:cNvPr id="20" name="Picture 19">
+            <a:extLst>
+              <a:ext uri="{FF2B5EF4-FFF2-40B4-BE49-F238E27FC236}">
+                <a16:creationId xmlns:a16="http://schemas.microsoft.com/office/drawing/2014/main" id="{5D885032-5521-BCD8-9DE6-E3F9BD5D4311}"/>
+              </a:ext>
+            </a:extLst>
+          </p:cNvPr>
+          <p:cNvPicPr>
+            <a:picLocks noChangeAspect="1"/>
+          </p:cNvPicPr>
+          <p:nvPr/>
+        </p:nvPicPr>
+        <p:blipFill rotWithShape="1">
+          <a:blip r:embed="rId2"/>
+          <a:srcRect l="29782" r="52844"/>
+          <a:stretch/>
+        </p:blipFill>
+        <p:spPr>
+          <a:xfrm>
+            <a:off x="5299538" y="5087046"/>
+            <a:ext cx="267629" cy="729681"/>
+          </a:xfrm>
+          <a:prstGeom prst="rect">
+            <a:avLst/>
+          </a:prstGeom>
+        </p:spPr>
+      </p:pic>
+      <p:pic>
+        <p:nvPicPr>
+          <p:cNvPr id="21" name="Picture 20">
+            <a:extLst>
+              <a:ext uri="{FF2B5EF4-FFF2-40B4-BE49-F238E27FC236}">
+                <a16:creationId xmlns:a16="http://schemas.microsoft.com/office/drawing/2014/main" id="{27565577-DF47-3F50-BC1E-902B0BAAD92F}"/>
+              </a:ext>
+            </a:extLst>
+          </p:cNvPr>
+          <p:cNvPicPr>
+            <a:picLocks noChangeAspect="1"/>
+          </p:cNvPicPr>
+          <p:nvPr/>
+        </p:nvPicPr>
+        <p:blipFill rotWithShape="1">
+          <a:blip r:embed="rId3"/>
+          <a:srcRect l="26062" t="16011" r="4425" b="14589"/>
+          <a:stretch/>
+        </p:blipFill>
+        <p:spPr>
+          <a:xfrm>
+            <a:off x="5713433" y="5195641"/>
+            <a:ext cx="2129481" cy="512491"/>
+          </a:xfrm>
+          <a:prstGeom prst="rect">
+            <a:avLst/>
+          </a:prstGeom>
+        </p:spPr>
+      </p:pic>
+      <p:sp>
+        <p:nvSpPr>
+          <p:cNvPr id="3" name="TextBox 2">
+            <a:extLst>
+              <a:ext uri="{FF2B5EF4-FFF2-40B4-BE49-F238E27FC236}">
+                <a16:creationId xmlns:a16="http://schemas.microsoft.com/office/drawing/2014/main" id="{1F3A17EC-79BA-206C-AC91-970AF1F9B677}"/>
+              </a:ext>
+            </a:extLst>
+          </p:cNvPr>
+          <p:cNvSpPr txBox="1"/>
+          <p:nvPr/>
+        </p:nvSpPr>
+        <p:spPr>
+          <a:xfrm>
+            <a:off x="8138566" y="5190276"/>
+            <a:ext cx="3372592" cy="523220"/>
+          </a:xfrm>
+          <a:prstGeom prst="rect">
+            <a:avLst/>
+          </a:prstGeom>
+          <a:noFill/>
+        </p:spPr>
+        <p:txBody>
+          <a:bodyPr wrap="square" rtlCol="0">
+            <a:spAutoFit/>
+          </a:bodyPr>
+          <a:lstStyle/>
+          <a:p>
+            <a:r>
+              <a:rPr lang="de-DE" sz="1400" dirty="0"/>
+              <a:t>Der Biasgradient ist schlichtweg gleich dem Fehlersignal!</a:t>
+            </a:r>
+          </a:p>
+        </p:txBody>
+      </p:sp>
+    </p:spTree>
+    <p:extLst>
+      <p:ext uri="{BB962C8B-B14F-4D97-AF65-F5344CB8AC3E}">
+        <p14:creationId xmlns:p14="http://schemas.microsoft.com/office/powerpoint/2010/main" val="3713829249"/>
+      </p:ext>
+    </p:extLst>
+  </p:cSld>
+  <p:clrMapOvr>
+    <a:masterClrMapping/>
+  </p:clrMapOvr>
+  <p:timing>
+    <p:tnLst>
+      <p:par>
+        <p:cTn id="1" dur="indefinite" restart="never" nodeType="tmRoot">
+          <p:childTnLst>
+            <p:seq concurrent="1" nextAc="seek">
+              <p:cTn id="2" dur="indefinite" nodeType="mainSeq">
+                <p:childTnLst>
+                  <p:par>
+                    <p:cTn id="3" fill="hold">
+                      <p:stCondLst>
+                        <p:cond delay="indefinite"/>
+                      </p:stCondLst>
+                      <p:childTnLst>
+                        <p:par>
+                          <p:cTn id="4" fill="hold">
+                            <p:stCondLst>
+                              <p:cond delay="0"/>
+                            </p:stCondLst>
+                            <p:childTnLst>
+                              <p:par>
+                                <p:cTn id="5" presetID="1" presetClass="entr" presetSubtype="0" fill="hold" nodeType="clickEffect">
+                                  <p:stCondLst>
+                                    <p:cond delay="0"/>
+                                  </p:stCondLst>
+                                  <p:childTnLst>
+                                    <p:set>
+                                      <p:cBhvr>
+                                        <p:cTn id="6" dur="1" fill="hold">
+                                          <p:stCondLst>
+                                            <p:cond delay="0"/>
+                                          </p:stCondLst>
+                                        </p:cTn>
+                                        <p:tgtEl>
+                                          <p:spTgt spid="5"/>
+                                        </p:tgtEl>
+                                        <p:attrNameLst>
+                                          <p:attrName>style.visibility</p:attrName>
+                                        </p:attrNameLst>
+                                      </p:cBhvr>
+                                      <p:to>
+                                        <p:strVal val="visible"/>
+                                      </p:to>
+                                    </p:set>
+                                  </p:childTnLst>
+                                </p:cTn>
+                              </p:par>
+                              <p:par>
+                                <p:cTn id="7" presetID="1" presetClass="entr" presetSubtype="0" fill="hold" grpId="0" nodeType="withEffect">
+                                  <p:stCondLst>
+                                    <p:cond delay="0"/>
+                                  </p:stCondLst>
+                                  <p:childTnLst>
+                                    <p:set>
+                                      <p:cBhvr>
+                                        <p:cTn id="8" dur="1" fill="hold">
+                                          <p:stCondLst>
+                                            <p:cond delay="0"/>
+                                          </p:stCondLst>
+                                        </p:cTn>
+                                        <p:tgtEl>
+                                          <p:spTgt spid="6"/>
+                                        </p:tgtEl>
+                                        <p:attrNameLst>
+                                          <p:attrName>style.visibility</p:attrName>
+                                        </p:attrNameLst>
+                                      </p:cBhvr>
+                                      <p:to>
+                                        <p:strVal val="visible"/>
+                                      </p:to>
+                                    </p:set>
+                                  </p:childTnLst>
+                                </p:cTn>
+                              </p:par>
+                            </p:childTnLst>
+                          </p:cTn>
+                        </p:par>
+                      </p:childTnLst>
+                    </p:cTn>
+                  </p:par>
+                  <p:par>
+                    <p:cTn id="9" fill="hold">
+                      <p:stCondLst>
+                        <p:cond delay="indefinite"/>
+                      </p:stCondLst>
+                      <p:childTnLst>
+                        <p:par>
+                          <p:cTn id="10" fill="hold">
+                            <p:stCondLst>
+                              <p:cond delay="0"/>
+                            </p:stCondLst>
+                            <p:childTnLst>
+                              <p:par>
+                                <p:cTn id="11" presetID="1" presetClass="entr" presetSubtype="0" fill="hold" nodeType="clickEffect">
+                                  <p:stCondLst>
+                                    <p:cond delay="0"/>
+                                  </p:stCondLst>
+                                  <p:childTnLst>
+                                    <p:set>
+                                      <p:cBhvr>
+                                        <p:cTn id="12" dur="1" fill="hold">
+                                          <p:stCondLst>
+                                            <p:cond delay="0"/>
+                                          </p:stCondLst>
+                                        </p:cTn>
+                                        <p:tgtEl>
+                                          <p:spTgt spid="8"/>
+                                        </p:tgtEl>
+                                        <p:attrNameLst>
+                                          <p:attrName>style.visibility</p:attrName>
+                                        </p:attrNameLst>
+                                      </p:cBhvr>
+                                      <p:to>
+                                        <p:strVal val="visible"/>
+                                      </p:to>
+                                    </p:set>
+                                  </p:childTnLst>
+                                </p:cTn>
+                              </p:par>
+                            </p:childTnLst>
+                          </p:cTn>
+                        </p:par>
+                      </p:childTnLst>
+                    </p:cTn>
+                  </p:par>
+                  <p:par>
+                    <p:cTn id="13" fill="hold">
+                      <p:stCondLst>
+                        <p:cond delay="indefinite"/>
+                      </p:stCondLst>
+                      <p:childTnLst>
+                        <p:par>
+                          <p:cTn id="14" fill="hold">
+                            <p:stCondLst>
+                              <p:cond delay="0"/>
+                            </p:stCondLst>
+                            <p:childTnLst>
+                              <p:par>
+                                <p:cTn id="15" presetID="1" presetClass="entr" presetSubtype="0" fill="hold" nodeType="clickEffect">
+                                  <p:stCondLst>
+                                    <p:cond delay="0"/>
+                                  </p:stCondLst>
+                                  <p:childTnLst>
+                                    <p:set>
+                                      <p:cBhvr>
+                                        <p:cTn id="16" dur="1" fill="hold">
+                                          <p:stCondLst>
+                                            <p:cond delay="0"/>
+                                          </p:stCondLst>
+                                        </p:cTn>
+                                        <p:tgtEl>
+                                          <p:spTgt spid="10"/>
+                                        </p:tgtEl>
+                                        <p:attrNameLst>
+                                          <p:attrName>style.visibility</p:attrName>
+                                        </p:attrNameLst>
+                                      </p:cBhvr>
+                                      <p:to>
+                                        <p:strVal val="visible"/>
+                                      </p:to>
+                                    </p:set>
+                                  </p:childTnLst>
+                                </p:cTn>
+                              </p:par>
+                              <p:par>
+                                <p:cTn id="17" presetID="1" presetClass="entr" presetSubtype="0" fill="hold" grpId="0" nodeType="withEffect">
+                                  <p:stCondLst>
+                                    <p:cond delay="0"/>
+                                  </p:stCondLst>
+                                  <p:childTnLst>
+                                    <p:set>
+                                      <p:cBhvr>
+                                        <p:cTn id="18" dur="1" fill="hold">
+                                          <p:stCondLst>
+                                            <p:cond delay="0"/>
+                                          </p:stCondLst>
+                                        </p:cTn>
+                                        <p:tgtEl>
+                                          <p:spTgt spid="11"/>
+                                        </p:tgtEl>
+                                        <p:attrNameLst>
+                                          <p:attrName>style.visibility</p:attrName>
+                                        </p:attrNameLst>
+                                      </p:cBhvr>
+                                      <p:to>
+                                        <p:strVal val="visible"/>
+                                      </p:to>
+                                    </p:set>
+                                  </p:childTnLst>
+                                </p:cTn>
+                              </p:par>
+                            </p:childTnLst>
+                          </p:cTn>
+                        </p:par>
+                      </p:childTnLst>
+                    </p:cTn>
+                  </p:par>
+                  <p:par>
+                    <p:cTn id="19" fill="hold">
+                      <p:stCondLst>
+                        <p:cond delay="indefinite"/>
+                      </p:stCondLst>
+                      <p:childTnLst>
+                        <p:par>
+                          <p:cTn id="20" fill="hold">
+                            <p:stCondLst>
+                              <p:cond delay="0"/>
+                            </p:stCondLst>
+                            <p:childTnLst>
+                              <p:par>
+                                <p:cTn id="21" presetID="1" presetClass="entr" presetSubtype="0" fill="hold" nodeType="clickEffect">
+                                  <p:stCondLst>
+                                    <p:cond delay="0"/>
+                                  </p:stCondLst>
+                                  <p:childTnLst>
+                                    <p:set>
+                                      <p:cBhvr>
+                                        <p:cTn id="22" dur="1" fill="hold">
+                                          <p:stCondLst>
+                                            <p:cond delay="0"/>
+                                          </p:stCondLst>
+                                        </p:cTn>
+                                        <p:tgtEl>
+                                          <p:spTgt spid="12"/>
+                                        </p:tgtEl>
+                                        <p:attrNameLst>
+                                          <p:attrName>style.visibility</p:attrName>
+                                        </p:attrNameLst>
+                                      </p:cBhvr>
+                                      <p:to>
+                                        <p:strVal val="visible"/>
+                                      </p:to>
+                                    </p:set>
+                                  </p:childTnLst>
+                                </p:cTn>
+                              </p:par>
+                              <p:par>
+                                <p:cTn id="23" presetID="1" presetClass="entr" presetSubtype="0" fill="hold" nodeType="withEffect">
+                                  <p:stCondLst>
+                                    <p:cond delay="0"/>
+                                  </p:stCondLst>
+                                  <p:childTnLst>
+                                    <p:set>
+                                      <p:cBhvr>
+                                        <p:cTn id="24" dur="1" fill="hold">
+                                          <p:stCondLst>
+                                            <p:cond delay="0"/>
+                                          </p:stCondLst>
+                                        </p:cTn>
+                                        <p:tgtEl>
+                                          <p:spTgt spid="13"/>
+                                        </p:tgtEl>
+                                        <p:attrNameLst>
+                                          <p:attrName>style.visibility</p:attrName>
+                                        </p:attrNameLst>
+                                      </p:cBhvr>
+                                      <p:to>
+                                        <p:strVal val="visible"/>
+                                      </p:to>
+                                    </p:set>
+                                  </p:childTnLst>
+                                </p:cTn>
+                              </p:par>
+                              <p:par>
+                                <p:cTn id="25" presetID="1" presetClass="entr" presetSubtype="0" fill="hold" nodeType="withEffect">
+                                  <p:stCondLst>
+                                    <p:cond delay="0"/>
+                                  </p:stCondLst>
+                                  <p:childTnLst>
+                                    <p:set>
+                                      <p:cBhvr>
+                                        <p:cTn id="26" dur="1" fill="hold">
+                                          <p:stCondLst>
+                                            <p:cond delay="0"/>
+                                          </p:stCondLst>
+                                        </p:cTn>
+                                        <p:tgtEl>
+                                          <p:spTgt spid="15"/>
+                                        </p:tgtEl>
+                                        <p:attrNameLst>
+                                          <p:attrName>style.visibility</p:attrName>
+                                        </p:attrNameLst>
+                                      </p:cBhvr>
+                                      <p:to>
+                                        <p:strVal val="visible"/>
+                                      </p:to>
+                                    </p:set>
+                                  </p:childTnLst>
+                                </p:cTn>
+                              </p:par>
+                            </p:childTnLst>
+                          </p:cTn>
+                        </p:par>
+                      </p:childTnLst>
+                    </p:cTn>
+                  </p:par>
+                  <p:par>
+                    <p:cTn id="27" fill="hold">
+                      <p:stCondLst>
+                        <p:cond delay="indefinite"/>
+                      </p:stCondLst>
+                      <p:childTnLst>
+                        <p:par>
+                          <p:cTn id="28" fill="hold">
+                            <p:stCondLst>
+                              <p:cond delay="0"/>
+                            </p:stCondLst>
+                            <p:childTnLst>
+                              <p:par>
+                                <p:cTn id="29" presetID="1" presetClass="entr" presetSubtype="0" fill="hold" nodeType="clickEffect">
+                                  <p:stCondLst>
+                                    <p:cond delay="0"/>
+                                  </p:stCondLst>
+                                  <p:childTnLst>
+                                    <p:set>
+                                      <p:cBhvr>
+                                        <p:cTn id="30" dur="1" fill="hold">
+                                          <p:stCondLst>
+                                            <p:cond delay="0"/>
+                                          </p:stCondLst>
+                                        </p:cTn>
+                                        <p:tgtEl>
+                                          <p:spTgt spid="18"/>
+                                        </p:tgtEl>
+                                        <p:attrNameLst>
+                                          <p:attrName>style.visibility</p:attrName>
+                                        </p:attrNameLst>
+                                      </p:cBhvr>
+                                      <p:to>
+                                        <p:strVal val="visible"/>
+                                      </p:to>
+                                    </p:set>
+                                  </p:childTnLst>
+                                </p:cTn>
+                              </p:par>
+                              <p:par>
+                                <p:cTn id="31" presetID="1" presetClass="entr" presetSubtype="0" fill="hold" nodeType="withEffect">
+                                  <p:stCondLst>
+                                    <p:cond delay="0"/>
+                                  </p:stCondLst>
+                                  <p:childTnLst>
+                                    <p:set>
+                                      <p:cBhvr>
+                                        <p:cTn id="32" dur="1" fill="hold">
+                                          <p:stCondLst>
+                                            <p:cond delay="0"/>
+                                          </p:stCondLst>
+                                        </p:cTn>
+                                        <p:tgtEl>
+                                          <p:spTgt spid="19"/>
+                                        </p:tgtEl>
+                                        <p:attrNameLst>
+                                          <p:attrName>style.visibility</p:attrName>
+                                        </p:attrNameLst>
+                                      </p:cBhvr>
+                                      <p:to>
+                                        <p:strVal val="visible"/>
+                                      </p:to>
+                                    </p:set>
+                                  </p:childTnLst>
+                                </p:cTn>
+                              </p:par>
+                              <p:par>
+                                <p:cTn id="33" presetID="1" presetClass="entr" presetSubtype="0" fill="hold" nodeType="withEffect">
+                                  <p:stCondLst>
+                                    <p:cond delay="0"/>
+                                  </p:stCondLst>
+                                  <p:childTnLst>
+                                    <p:set>
+                                      <p:cBhvr>
+                                        <p:cTn id="34" dur="1" fill="hold">
+                                          <p:stCondLst>
+                                            <p:cond delay="0"/>
+                                          </p:stCondLst>
+                                        </p:cTn>
+                                        <p:tgtEl>
+                                          <p:spTgt spid="17"/>
+                                        </p:tgtEl>
+                                        <p:attrNameLst>
+                                          <p:attrName>style.visibility</p:attrName>
+                                        </p:attrNameLst>
+                                      </p:cBhvr>
+                                      <p:to>
+                                        <p:strVal val="visible"/>
+                                      </p:to>
+                                    </p:set>
+                                  </p:childTnLst>
+                                </p:cTn>
+                              </p:par>
+                              <p:par>
+                                <p:cTn id="35" presetID="1" presetClass="entr" presetSubtype="0" fill="hold" nodeType="withEffect">
+                                  <p:stCondLst>
+                                    <p:cond delay="0"/>
+                                  </p:stCondLst>
+                                  <p:childTnLst>
+                                    <p:set>
+                                      <p:cBhvr>
+                                        <p:cTn id="36" dur="1" fill="hold">
+                                          <p:stCondLst>
+                                            <p:cond delay="0"/>
+                                          </p:stCondLst>
+                                        </p:cTn>
+                                        <p:tgtEl>
+                                          <p:spTgt spid="20"/>
+                                        </p:tgtEl>
+                                        <p:attrNameLst>
+                                          <p:attrName>style.visibility</p:attrName>
+                                        </p:attrNameLst>
+                                      </p:cBhvr>
+                                      <p:to>
+                                        <p:strVal val="visible"/>
+                                      </p:to>
+                                    </p:set>
+                                  </p:childTnLst>
+                                </p:cTn>
+                              </p:par>
+                              <p:par>
+                                <p:cTn id="37" presetID="1" presetClass="entr" presetSubtype="0" fill="hold" nodeType="withEffect">
+                                  <p:stCondLst>
+                                    <p:cond delay="0"/>
+                                  </p:stCondLst>
+                                  <p:childTnLst>
+                                    <p:set>
+                                      <p:cBhvr>
+                                        <p:cTn id="38" dur="1" fill="hold">
+                                          <p:stCondLst>
+                                            <p:cond delay="0"/>
+                                          </p:stCondLst>
+                                        </p:cTn>
+                                        <p:tgtEl>
+                                          <p:spTgt spid="21"/>
+                                        </p:tgtEl>
+                                        <p:attrNameLst>
+                                          <p:attrName>style.visibility</p:attrName>
+                                        </p:attrNameLst>
+                                      </p:cBhvr>
+                                      <p:to>
+                                        <p:strVal val="visible"/>
+                                      </p:to>
+                                    </p:set>
+                                  </p:childTnLst>
+                                </p:cTn>
+                              </p:par>
+                            </p:childTnLst>
+                          </p:cTn>
+                        </p:par>
+                      </p:childTnLst>
+                    </p:cTn>
+                  </p:par>
+                  <p:par>
+                    <p:cTn id="39" fill="hold">
+                      <p:stCondLst>
+                        <p:cond delay="indefinite"/>
+                      </p:stCondLst>
+                      <p:childTnLst>
+                        <p:par>
+                          <p:cTn id="40" fill="hold">
+                            <p:stCondLst>
+                              <p:cond delay="0"/>
+                            </p:stCondLst>
+                            <p:childTnLst>
+                              <p:par>
+                                <p:cTn id="41" presetID="1" presetClass="entr" presetSubtype="0" fill="hold" grpId="0" nodeType="clickEffect">
+                                  <p:stCondLst>
+                                    <p:cond delay="0"/>
+                                  </p:stCondLst>
+                                  <p:childTnLst>
+                                    <p:set>
+                                      <p:cBhvr>
+                                        <p:cTn id="42" dur="1" fill="hold">
+                                          <p:stCondLst>
+                                            <p:cond delay="0"/>
+                                          </p:stCondLst>
+                                        </p:cTn>
+                                        <p:tgtEl>
+                                          <p:spTgt spid="3"/>
+                                        </p:tgtEl>
+                                        <p:attrNameLst>
+                                          <p:attrName>style.visibility</p:attrName>
+                                        </p:attrNameLst>
+                                      </p:cBhvr>
+                                      <p:to>
+                                        <p:strVal val="visible"/>
+                                      </p:to>
+                                    </p:set>
+                                  </p:childTnLst>
+                                </p:cTn>
+                              </p:par>
+                            </p:childTnLst>
+                          </p:cTn>
+                        </p:par>
+                      </p:childTnLst>
+                    </p:cTn>
+                  </p:par>
+                </p:childTnLst>
+              </p:cTn>
+              <p:prevCondLst>
+                <p:cond evt="onPrev" delay="0">
+                  <p:tgtEl>
+                    <p:sldTgt/>
+                  </p:tgtEl>
+                </p:cond>
+              </p:prevCondLst>
+              <p:nextCondLst>
+                <p:cond evt="onNext" delay="0">
+                  <p:tgtEl>
+                    <p:sldTgt/>
+                  </p:tgtEl>
+                </p:cond>
+              </p:nextCondLst>
+            </p:seq>
+          </p:childTnLst>
+        </p:cTn>
+      </p:par>
+    </p:tnLst>
+    <p:bldLst>
+      <p:bldP spid="6" grpId="0"/>
+      <p:bldP spid="11" grpId="0"/>
+      <p:bldP spid="3" grpId="0"/>
+    </p:bldLst>
+  </p:timing>
+</p:sld>
+</file>
+
+<file path=ppt/slides/slide15.xml><?xml version="1.0" encoding="utf-8"?>
+<p:sld xmlns:a="http://schemas.openxmlformats.org/drawingml/2006/main" xmlns:r="http://schemas.openxmlformats.org/officeDocument/2006/relationships" xmlns:p="http://schemas.openxmlformats.org/presentationml/2006/main">
+  <p:cSld>
+    <p:spTree>
+      <p:nvGrpSpPr>
+        <p:cNvPr id="1" name=""/>
+        <p:cNvGrpSpPr/>
+        <p:nvPr/>
+      </p:nvGrpSpPr>
+      <p:grpSpPr>
+        <a:xfrm>
+          <a:off x="0" y="0"/>
+          <a:ext cx="0" cy="0"/>
+          <a:chOff x="0" y="0"/>
+          <a:chExt cx="0" cy="0"/>
+        </a:xfrm>
+      </p:grpSpPr>
+      <p:sp>
+        <p:nvSpPr>
+          <p:cNvPr id="2" name="Titel 1">
+            <a:extLst>
+              <a:ext uri="{FF2B5EF4-FFF2-40B4-BE49-F238E27FC236}">
+                <a16:creationId xmlns:a16="http://schemas.microsoft.com/office/drawing/2014/main" id="{2911F67F-327B-4C51-B9E3-A1D3BCC720A5}"/>
+              </a:ext>
+            </a:extLst>
+          </p:cNvPr>
+          <p:cNvSpPr>
+            <a:spLocks noGrp="1"/>
+          </p:cNvSpPr>
+          <p:nvPr>
+            <p:ph type="title"/>
+          </p:nvPr>
+        </p:nvSpPr>
+        <p:spPr/>
+        <p:txBody>
+          <a:bodyPr>
+            <a:normAutofit/>
+          </a:bodyPr>
+          <a:lstStyle/>
+          <a:p>
+            <a:r>
+              <a:rPr lang="de-DE" dirty="0"/>
+              <a:t>Mathematische Herleitungen</a:t>
+            </a:r>
+            <a:br>
+              <a:rPr lang="de-DE" dirty="0"/>
+            </a:br>
+            <a:r>
+              <a:rPr lang="de-DE" sz="2400" dirty="0"/>
+              <a:t>Biasgradient für ein Batch von Daten</a:t>
+            </a:r>
+            <a:endParaRPr lang="de-DE" dirty="0"/>
+          </a:p>
+        </p:txBody>
+      </p:sp>
+      <p:pic>
+        <p:nvPicPr>
+          <p:cNvPr id="3" name="Picture 2">
+            <a:extLst>
+              <a:ext uri="{FF2B5EF4-FFF2-40B4-BE49-F238E27FC236}">
+                <a16:creationId xmlns:a16="http://schemas.microsoft.com/office/drawing/2014/main" id="{2B7B690B-9781-2337-E8AA-EEB1C64C5CB0}"/>
+              </a:ext>
+            </a:extLst>
+          </p:cNvPr>
+          <p:cNvPicPr>
+            <a:picLocks noChangeAspect="1"/>
+          </p:cNvPicPr>
+          <p:nvPr/>
+        </p:nvPicPr>
+        <p:blipFill rotWithShape="1">
+          <a:blip r:embed="rId2"/>
+          <a:srcRect l="2760" r="75959"/>
+          <a:stretch/>
+        </p:blipFill>
+        <p:spPr>
+          <a:xfrm>
+            <a:off x="712519" y="1829526"/>
+            <a:ext cx="447304" cy="759465"/>
+          </a:xfrm>
+          <a:prstGeom prst="rect">
+            <a:avLst/>
+          </a:prstGeom>
+        </p:spPr>
+      </p:pic>
+      <p:pic>
+        <p:nvPicPr>
+          <p:cNvPr id="4" name="Picture 3">
+            <a:extLst>
+              <a:ext uri="{FF2B5EF4-FFF2-40B4-BE49-F238E27FC236}">
+                <a16:creationId xmlns:a16="http://schemas.microsoft.com/office/drawing/2014/main" id="{8177ED3F-9166-0C40-9AC4-9B4C256883E5}"/>
+              </a:ext>
+            </a:extLst>
+          </p:cNvPr>
+          <p:cNvPicPr>
+            <a:picLocks noChangeAspect="1"/>
+          </p:cNvPicPr>
+          <p:nvPr/>
+        </p:nvPicPr>
+        <p:blipFill rotWithShape="1">
+          <a:blip r:embed="rId2"/>
+          <a:srcRect l="25829" r="7128"/>
+          <a:stretch/>
+        </p:blipFill>
+        <p:spPr>
+          <a:xfrm>
+            <a:off x="3903024" y="1829526"/>
+            <a:ext cx="1409205" cy="759465"/>
+          </a:xfrm>
+          <a:prstGeom prst="rect">
+            <a:avLst/>
+          </a:prstGeom>
+        </p:spPr>
+      </p:pic>
+      <p:sp>
+        <p:nvSpPr>
+          <p:cNvPr id="5" name="TextBox 4">
+            <a:extLst>
+              <a:ext uri="{FF2B5EF4-FFF2-40B4-BE49-F238E27FC236}">
+                <a16:creationId xmlns:a16="http://schemas.microsoft.com/office/drawing/2014/main" id="{5877D65E-A316-A457-867A-A80F0E3E75C2}"/>
+              </a:ext>
+            </a:extLst>
+          </p:cNvPr>
+          <p:cNvSpPr txBox="1"/>
+          <p:nvPr/>
+        </p:nvSpPr>
+        <p:spPr>
+          <a:xfrm>
+            <a:off x="1421081" y="1947648"/>
+            <a:ext cx="2379023" cy="523220"/>
+          </a:xfrm>
+          <a:prstGeom prst="rect">
+            <a:avLst/>
+          </a:prstGeom>
+          <a:noFill/>
+        </p:spPr>
+        <p:txBody>
+          <a:bodyPr wrap="square" rtlCol="0">
+            <a:spAutoFit/>
+          </a:bodyPr>
+          <a:lstStyle/>
+          <a:p>
+            <a:r>
+              <a:rPr lang="de-DE" sz="1400" dirty="0"/>
+              <a:t>Ableitung der Kostenfunktion nach den Biases in Layer l</a:t>
+            </a:r>
+          </a:p>
+        </p:txBody>
+      </p:sp>
+      <p:pic>
+        <p:nvPicPr>
+          <p:cNvPr id="6" name="Picture 5">
+            <a:extLst>
+              <a:ext uri="{FF2B5EF4-FFF2-40B4-BE49-F238E27FC236}">
+                <a16:creationId xmlns:a16="http://schemas.microsoft.com/office/drawing/2014/main" id="{52A4C117-15AD-43B7-B9EA-8BAA32DC049A}"/>
+              </a:ext>
+            </a:extLst>
+          </p:cNvPr>
+          <p:cNvPicPr>
+            <a:picLocks noChangeAspect="1"/>
+          </p:cNvPicPr>
+          <p:nvPr/>
+        </p:nvPicPr>
+        <p:blipFill rotWithShape="1">
+          <a:blip r:embed="rId2"/>
+          <a:srcRect l="69049" r="7128"/>
+          <a:stretch/>
+        </p:blipFill>
+        <p:spPr>
+          <a:xfrm>
+            <a:off x="6954981" y="1829526"/>
+            <a:ext cx="500744" cy="759465"/>
+          </a:xfrm>
+          <a:prstGeom prst="rect">
+            <a:avLst/>
+          </a:prstGeom>
+        </p:spPr>
+      </p:pic>
+      <p:pic>
+        <p:nvPicPr>
+          <p:cNvPr id="7" name="Picture 6">
+            <a:extLst>
+              <a:ext uri="{FF2B5EF4-FFF2-40B4-BE49-F238E27FC236}">
+                <a16:creationId xmlns:a16="http://schemas.microsoft.com/office/drawing/2014/main" id="{E3CF055E-D7C9-B872-5D9C-0FF020BDD11E}"/>
+              </a:ext>
+            </a:extLst>
+          </p:cNvPr>
+          <p:cNvPicPr>
+            <a:picLocks noChangeAspect="1"/>
+          </p:cNvPicPr>
+          <p:nvPr/>
+        </p:nvPicPr>
+        <p:blipFill rotWithShape="1">
+          <a:blip r:embed="rId2"/>
+          <a:srcRect l="25829" r="65226"/>
+          <a:stretch/>
+        </p:blipFill>
+        <p:spPr>
+          <a:xfrm>
+            <a:off x="9258380" y="1829526"/>
+            <a:ext cx="188026" cy="759465"/>
+          </a:xfrm>
+          <a:prstGeom prst="rect">
+            <a:avLst/>
+          </a:prstGeom>
+        </p:spPr>
+      </p:pic>
+      <p:pic>
+        <p:nvPicPr>
+          <p:cNvPr id="9" name="Picture 8">
+            <a:extLst>
+              <a:ext uri="{FF2B5EF4-FFF2-40B4-BE49-F238E27FC236}">
+                <a16:creationId xmlns:a16="http://schemas.microsoft.com/office/drawing/2014/main" id="{83D8D8CA-6C5B-4BD4-1BA4-29D0951AB1CF}"/>
+              </a:ext>
+            </a:extLst>
+          </p:cNvPr>
+          <p:cNvPicPr>
+            <a:picLocks noChangeAspect="1"/>
+          </p:cNvPicPr>
+          <p:nvPr/>
+        </p:nvPicPr>
+        <p:blipFill rotWithShape="1">
+          <a:blip r:embed="rId3"/>
+          <a:srcRect l="7602" t="2085" b="4097"/>
+          <a:stretch/>
+        </p:blipFill>
+        <p:spPr>
+          <a:xfrm>
+            <a:off x="9588907" y="1662993"/>
+            <a:ext cx="374488" cy="1092530"/>
+          </a:xfrm>
+          <a:prstGeom prst="rect">
+            <a:avLst/>
+          </a:prstGeom>
+        </p:spPr>
+      </p:pic>
+      <p:sp>
+        <p:nvSpPr>
+          <p:cNvPr id="10" name="TextBox 9">
+            <a:extLst>
+              <a:ext uri="{FF2B5EF4-FFF2-40B4-BE49-F238E27FC236}">
+                <a16:creationId xmlns:a16="http://schemas.microsoft.com/office/drawing/2014/main" id="{B8257153-4CA9-FC98-3011-392780C5ECFC}"/>
+              </a:ext>
+            </a:extLst>
+          </p:cNvPr>
+          <p:cNvSpPr txBox="1"/>
+          <p:nvPr/>
+        </p:nvSpPr>
+        <p:spPr>
+          <a:xfrm>
+            <a:off x="7675415" y="1732205"/>
+            <a:ext cx="1440464" cy="954107"/>
+          </a:xfrm>
+          <a:prstGeom prst="rect">
+            <a:avLst/>
+          </a:prstGeom>
+          <a:noFill/>
+        </p:spPr>
+        <p:txBody>
+          <a:bodyPr wrap="square" rtlCol="0">
+            <a:spAutoFit/>
+          </a:bodyPr>
+          <a:lstStyle/>
+          <a:p>
+            <a:pPr algn="l"/>
+            <a:r>
+              <a:rPr lang="de-DE" sz="1400" dirty="0"/>
+              <a:t>Biasgradient eines einzelnen Datums</a:t>
+            </a:r>
+          </a:p>
+          <a:p>
+            <a:pPr algn="l"/>
+            <a:endParaRPr lang="de-DE" sz="1400" dirty="0"/>
+          </a:p>
+        </p:txBody>
+      </p:sp>
+      <p:pic>
+        <p:nvPicPr>
+          <p:cNvPr id="11" name="Picture 10">
+            <a:extLst>
+              <a:ext uri="{FF2B5EF4-FFF2-40B4-BE49-F238E27FC236}">
+                <a16:creationId xmlns:a16="http://schemas.microsoft.com/office/drawing/2014/main" id="{70D22BFF-2DA5-F4E1-D154-8D01D5F4B706}"/>
+              </a:ext>
+            </a:extLst>
+          </p:cNvPr>
+          <p:cNvPicPr>
+            <a:picLocks noChangeAspect="1"/>
+          </p:cNvPicPr>
+          <p:nvPr/>
+        </p:nvPicPr>
+        <p:blipFill rotWithShape="1">
+          <a:blip r:embed="rId2"/>
+          <a:srcRect l="2760" r="63812"/>
+          <a:stretch/>
+        </p:blipFill>
+        <p:spPr>
+          <a:xfrm>
+            <a:off x="712519" y="4058562"/>
+            <a:ext cx="702624" cy="759465"/>
+          </a:xfrm>
+          <a:prstGeom prst="rect">
+            <a:avLst/>
+          </a:prstGeom>
+        </p:spPr>
+      </p:pic>
+      <p:pic>
+        <p:nvPicPr>
+          <p:cNvPr id="13" name="Picture 12">
+            <a:extLst>
+              <a:ext uri="{FF2B5EF4-FFF2-40B4-BE49-F238E27FC236}">
+                <a16:creationId xmlns:a16="http://schemas.microsoft.com/office/drawing/2014/main" id="{5E34EDAA-27D2-3D64-9AF1-3F6FD6166F21}"/>
+              </a:ext>
+            </a:extLst>
+          </p:cNvPr>
+          <p:cNvPicPr>
+            <a:picLocks noChangeAspect="1"/>
+          </p:cNvPicPr>
+          <p:nvPr/>
+        </p:nvPicPr>
+        <p:blipFill rotWithShape="1">
+          <a:blip r:embed="rId4"/>
+          <a:srcRect l="28286" t="3447" r="7575" b="15100"/>
+          <a:stretch/>
+        </p:blipFill>
+        <p:spPr>
+          <a:xfrm>
+            <a:off x="1666510" y="3429000"/>
+            <a:ext cx="4372130" cy="2018589"/>
+          </a:xfrm>
+          <a:prstGeom prst="rect">
+            <a:avLst/>
+          </a:prstGeom>
+        </p:spPr>
+      </p:pic>
+      <p:sp>
+        <p:nvSpPr>
+          <p:cNvPr id="14" name="TextBox 13">
+            <a:extLst>
+              <a:ext uri="{FF2B5EF4-FFF2-40B4-BE49-F238E27FC236}">
+                <a16:creationId xmlns:a16="http://schemas.microsoft.com/office/drawing/2014/main" id="{CB348F16-B21B-5A4E-7781-60F0B49F6B71}"/>
+              </a:ext>
+            </a:extLst>
+          </p:cNvPr>
+          <p:cNvSpPr txBox="1"/>
+          <p:nvPr/>
+        </p:nvSpPr>
+        <p:spPr>
+          <a:xfrm>
+            <a:off x="6263463" y="4068962"/>
+            <a:ext cx="2739614" cy="738664"/>
+          </a:xfrm>
+          <a:prstGeom prst="rect">
+            <a:avLst/>
+          </a:prstGeom>
+          <a:noFill/>
+        </p:spPr>
+        <p:txBody>
+          <a:bodyPr wrap="square" rtlCol="0">
+            <a:spAutoFit/>
+          </a:bodyPr>
+          <a:lstStyle/>
+          <a:p>
+            <a:r>
+              <a:rPr lang="de-DE" sz="1400" dirty="0"/>
+              <a:t>Das Mittel wird über alle Elemente entlang der Tiefendimension (</a:t>
+            </a:r>
+            <a:r>
+              <a:rPr lang="de-DE" sz="1400" dirty="0" err="1"/>
+              <a:t>axis</a:t>
+            </a:r>
+            <a:r>
+              <a:rPr lang="de-DE" sz="1400" dirty="0"/>
+              <a:t>=0) gebildet</a:t>
+            </a:r>
+          </a:p>
+        </p:txBody>
+      </p:sp>
+    </p:spTree>
+    <p:extLst>
+      <p:ext uri="{BB962C8B-B14F-4D97-AF65-F5344CB8AC3E}">
+        <p14:creationId xmlns:p14="http://schemas.microsoft.com/office/powerpoint/2010/main" val="838620978"/>
+      </p:ext>
+    </p:extLst>
+  </p:cSld>
+  <p:clrMapOvr>
+    <a:masterClrMapping/>
+  </p:clrMapOvr>
+  <p:timing>
+    <p:tnLst>
+      <p:par>
+        <p:cTn id="1" dur="indefinite" restart="never" nodeType="tmRoot">
+          <p:childTnLst>
+            <p:seq concurrent="1" nextAc="seek">
+              <p:cTn id="2" dur="indefinite" nodeType="mainSeq">
+                <p:childTnLst>
+                  <p:par>
+                    <p:cTn id="3" fill="hold">
+                      <p:stCondLst>
+                        <p:cond delay="indefinite"/>
+                      </p:stCondLst>
+                      <p:childTnLst>
+                        <p:par>
+                          <p:cTn id="4" fill="hold">
+                            <p:stCondLst>
+                              <p:cond delay="0"/>
+                            </p:stCondLst>
+                            <p:childTnLst>
+                              <p:par>
+                                <p:cTn id="5" presetID="1" presetClass="entr" presetSubtype="0" fill="hold" nodeType="clickEffect">
+                                  <p:stCondLst>
+                                    <p:cond delay="0"/>
+                                  </p:stCondLst>
+                                  <p:childTnLst>
+                                    <p:set>
+                                      <p:cBhvr>
+                                        <p:cTn id="6" dur="1" fill="hold">
+                                          <p:stCondLst>
+                                            <p:cond delay="0"/>
+                                          </p:stCondLst>
+                                        </p:cTn>
+                                        <p:tgtEl>
+                                          <p:spTgt spid="3"/>
+                                        </p:tgtEl>
+                                        <p:attrNameLst>
+                                          <p:attrName>style.visibility</p:attrName>
+                                        </p:attrNameLst>
+                                      </p:cBhvr>
+                                      <p:to>
+                                        <p:strVal val="visible"/>
+                                      </p:to>
+                                    </p:set>
+                                  </p:childTnLst>
+                                </p:cTn>
+                              </p:par>
+                              <p:par>
+                                <p:cTn id="7" presetID="1" presetClass="entr" presetSubtype="0" fill="hold" grpId="0" nodeType="withEffect">
+                                  <p:stCondLst>
+                                    <p:cond delay="0"/>
+                                  </p:stCondLst>
+                                  <p:childTnLst>
+                                    <p:set>
+                                      <p:cBhvr>
+                                        <p:cTn id="8" dur="1" fill="hold">
+                                          <p:stCondLst>
+                                            <p:cond delay="0"/>
+                                          </p:stCondLst>
+                                        </p:cTn>
+                                        <p:tgtEl>
+                                          <p:spTgt spid="5"/>
+                                        </p:tgtEl>
+                                        <p:attrNameLst>
+                                          <p:attrName>style.visibility</p:attrName>
+                                        </p:attrNameLst>
+                                      </p:cBhvr>
+                                      <p:to>
+                                        <p:strVal val="visible"/>
+                                      </p:to>
+                                    </p:set>
+                                  </p:childTnLst>
+                                </p:cTn>
+                              </p:par>
+                            </p:childTnLst>
+                          </p:cTn>
+                        </p:par>
+                      </p:childTnLst>
+                    </p:cTn>
+                  </p:par>
+                  <p:par>
+                    <p:cTn id="9" fill="hold">
+                      <p:stCondLst>
+                        <p:cond delay="indefinite"/>
+                      </p:stCondLst>
+                      <p:childTnLst>
+                        <p:par>
+                          <p:cTn id="10" fill="hold">
+                            <p:stCondLst>
+                              <p:cond delay="0"/>
+                            </p:stCondLst>
+                            <p:childTnLst>
+                              <p:par>
+                                <p:cTn id="11" presetID="1" presetClass="entr" presetSubtype="0" fill="hold" nodeType="clickEffect">
+                                  <p:stCondLst>
+                                    <p:cond delay="0"/>
+                                  </p:stCondLst>
+                                  <p:childTnLst>
+                                    <p:set>
+                                      <p:cBhvr>
+                                        <p:cTn id="12" dur="1" fill="hold">
+                                          <p:stCondLst>
+                                            <p:cond delay="0"/>
+                                          </p:stCondLst>
+                                        </p:cTn>
+                                        <p:tgtEl>
+                                          <p:spTgt spid="4"/>
+                                        </p:tgtEl>
+                                        <p:attrNameLst>
+                                          <p:attrName>style.visibility</p:attrName>
+                                        </p:attrNameLst>
+                                      </p:cBhvr>
+                                      <p:to>
+                                        <p:strVal val="visible"/>
+                                      </p:to>
+                                    </p:set>
+                                  </p:childTnLst>
+                                </p:cTn>
+                              </p:par>
+                            </p:childTnLst>
+                          </p:cTn>
+                        </p:par>
+                      </p:childTnLst>
+                    </p:cTn>
+                  </p:par>
+                  <p:par>
+                    <p:cTn id="13" fill="hold">
+                      <p:stCondLst>
+                        <p:cond delay="indefinite"/>
+                      </p:stCondLst>
+                      <p:childTnLst>
+                        <p:par>
+                          <p:cTn id="14" fill="hold">
+                            <p:stCondLst>
+                              <p:cond delay="0"/>
+                            </p:stCondLst>
+                            <p:childTnLst>
+                              <p:par>
+                                <p:cTn id="15" presetID="1" presetClass="entr" presetSubtype="0" fill="hold" nodeType="clickEffect">
+                                  <p:stCondLst>
+                                    <p:cond delay="0"/>
+                                  </p:stCondLst>
+                                  <p:childTnLst>
+                                    <p:set>
+                                      <p:cBhvr>
+                                        <p:cTn id="16" dur="1" fill="hold">
+                                          <p:stCondLst>
+                                            <p:cond delay="0"/>
+                                          </p:stCondLst>
+                                        </p:cTn>
+                                        <p:tgtEl>
+                                          <p:spTgt spid="6"/>
+                                        </p:tgtEl>
+                                        <p:attrNameLst>
+                                          <p:attrName>style.visibility</p:attrName>
+                                        </p:attrNameLst>
+                                      </p:cBhvr>
+                                      <p:to>
+                                        <p:strVal val="visible"/>
+                                      </p:to>
+                                    </p:set>
+                                  </p:childTnLst>
+                                </p:cTn>
+                              </p:par>
+                              <p:par>
+                                <p:cTn id="17" presetID="1" presetClass="entr" presetSubtype="0" fill="hold" nodeType="withEffect">
+                                  <p:stCondLst>
+                                    <p:cond delay="0"/>
+                                  </p:stCondLst>
+                                  <p:childTnLst>
+                                    <p:set>
+                                      <p:cBhvr>
+                                        <p:cTn id="18" dur="1" fill="hold">
+                                          <p:stCondLst>
+                                            <p:cond delay="0"/>
+                                          </p:stCondLst>
+                                        </p:cTn>
+                                        <p:tgtEl>
+                                          <p:spTgt spid="7"/>
+                                        </p:tgtEl>
+                                        <p:attrNameLst>
+                                          <p:attrName>style.visibility</p:attrName>
+                                        </p:attrNameLst>
+                                      </p:cBhvr>
+                                      <p:to>
+                                        <p:strVal val="visible"/>
+                                      </p:to>
+                                    </p:set>
+                                  </p:childTnLst>
+                                </p:cTn>
+                              </p:par>
+                              <p:par>
+                                <p:cTn id="19" presetID="1" presetClass="entr" presetSubtype="0" fill="hold" nodeType="withEffect">
+                                  <p:stCondLst>
+                                    <p:cond delay="0"/>
+                                  </p:stCondLst>
+                                  <p:childTnLst>
+                                    <p:set>
+                                      <p:cBhvr>
+                                        <p:cTn id="20" dur="1" fill="hold">
+                                          <p:stCondLst>
+                                            <p:cond delay="0"/>
+                                          </p:stCondLst>
+                                        </p:cTn>
+                                        <p:tgtEl>
+                                          <p:spTgt spid="9"/>
+                                        </p:tgtEl>
+                                        <p:attrNameLst>
+                                          <p:attrName>style.visibility</p:attrName>
+                                        </p:attrNameLst>
+                                      </p:cBhvr>
+                                      <p:to>
+                                        <p:strVal val="visible"/>
+                                      </p:to>
+                                    </p:set>
+                                  </p:childTnLst>
+                                </p:cTn>
+                              </p:par>
+                              <p:par>
+                                <p:cTn id="21" presetID="1" presetClass="entr" presetSubtype="0" fill="hold" grpId="0" nodeType="withEffect">
+                                  <p:stCondLst>
+                                    <p:cond delay="0"/>
+                                  </p:stCondLst>
+                                  <p:childTnLst>
+                                    <p:set>
+                                      <p:cBhvr>
+                                        <p:cTn id="22" dur="1" fill="hold">
+                                          <p:stCondLst>
+                                            <p:cond delay="0"/>
+                                          </p:stCondLst>
+                                        </p:cTn>
+                                        <p:tgtEl>
+                                          <p:spTgt spid="10"/>
+                                        </p:tgtEl>
+                                        <p:attrNameLst>
+                                          <p:attrName>style.visibility</p:attrName>
+                                        </p:attrNameLst>
+                                      </p:cBhvr>
+                                      <p:to>
+                                        <p:strVal val="visible"/>
+                                      </p:to>
+                                    </p:set>
+                                  </p:childTnLst>
+                                </p:cTn>
+                              </p:par>
+                            </p:childTnLst>
+                          </p:cTn>
+                        </p:par>
+                      </p:childTnLst>
+                    </p:cTn>
+                  </p:par>
+                  <p:par>
+                    <p:cTn id="23" fill="hold">
+                      <p:stCondLst>
+                        <p:cond delay="indefinite"/>
+                      </p:stCondLst>
+                      <p:childTnLst>
+                        <p:par>
+                          <p:cTn id="24" fill="hold">
+                            <p:stCondLst>
+                              <p:cond delay="0"/>
+                            </p:stCondLst>
+                            <p:childTnLst>
+                              <p:par>
+                                <p:cTn id="25" presetID="1" presetClass="entr" presetSubtype="0" fill="hold" nodeType="clickEffect">
+                                  <p:stCondLst>
+                                    <p:cond delay="0"/>
+                                  </p:stCondLst>
+                                  <p:childTnLst>
+                                    <p:set>
+                                      <p:cBhvr>
+                                        <p:cTn id="26" dur="1" fill="hold">
+                                          <p:stCondLst>
+                                            <p:cond delay="0"/>
+                                          </p:stCondLst>
+                                        </p:cTn>
+                                        <p:tgtEl>
+                                          <p:spTgt spid="11"/>
+                                        </p:tgtEl>
+                                        <p:attrNameLst>
+                                          <p:attrName>style.visibility</p:attrName>
+                                        </p:attrNameLst>
+                                      </p:cBhvr>
+                                      <p:to>
+                                        <p:strVal val="visible"/>
+                                      </p:to>
+                                    </p:set>
+                                  </p:childTnLst>
+                                </p:cTn>
+                              </p:par>
+                              <p:par>
+                                <p:cTn id="27" presetID="1" presetClass="entr" presetSubtype="0" fill="hold" nodeType="withEffect">
+                                  <p:stCondLst>
+                                    <p:cond delay="0"/>
+                                  </p:stCondLst>
+                                  <p:childTnLst>
+                                    <p:set>
+                                      <p:cBhvr>
+                                        <p:cTn id="28" dur="1" fill="hold">
+                                          <p:stCondLst>
+                                            <p:cond delay="0"/>
+                                          </p:stCondLst>
+                                        </p:cTn>
+                                        <p:tgtEl>
+                                          <p:spTgt spid="13"/>
+                                        </p:tgtEl>
+                                        <p:attrNameLst>
+                                          <p:attrName>style.visibility</p:attrName>
+                                        </p:attrNameLst>
+                                      </p:cBhvr>
+                                      <p:to>
+                                        <p:strVal val="visible"/>
+                                      </p:to>
+                                    </p:set>
+                                  </p:childTnLst>
+                                </p:cTn>
+                              </p:par>
+                              <p:par>
+                                <p:cTn id="29" presetID="1" presetClass="entr" presetSubtype="0" fill="hold" grpId="0" nodeType="withEffect">
+                                  <p:stCondLst>
+                                    <p:cond delay="0"/>
+                                  </p:stCondLst>
+                                  <p:childTnLst>
+                                    <p:set>
+                                      <p:cBhvr>
+                                        <p:cTn id="30" dur="1" fill="hold">
+                                          <p:stCondLst>
+                                            <p:cond delay="0"/>
+                                          </p:stCondLst>
+                                        </p:cTn>
+                                        <p:tgtEl>
+                                          <p:spTgt spid="14"/>
+                                        </p:tgtEl>
+                                        <p:attrNameLst>
+                                          <p:attrName>style.visibility</p:attrName>
+                                        </p:attrNameLst>
+                                      </p:cBhvr>
+                                      <p:to>
+                                        <p:strVal val="visible"/>
+                                      </p:to>
+                                    </p:set>
+                                  </p:childTnLst>
+                                </p:cTn>
+                              </p:par>
+                            </p:childTnLst>
+                          </p:cTn>
+                        </p:par>
+                      </p:childTnLst>
+                    </p:cTn>
+                  </p:par>
+                </p:childTnLst>
+              </p:cTn>
+              <p:prevCondLst>
+                <p:cond evt="onPrev" delay="0">
+                  <p:tgtEl>
+                    <p:sldTgt/>
+                  </p:tgtEl>
+                </p:cond>
+              </p:prevCondLst>
+              <p:nextCondLst>
+                <p:cond evt="onNext" delay="0">
+                  <p:tgtEl>
+                    <p:sldTgt/>
+                  </p:tgtEl>
+                </p:cond>
+              </p:nextCondLst>
+            </p:seq>
+          </p:childTnLst>
+        </p:cTn>
+      </p:par>
+    </p:tnLst>
+    <p:bldLst>
+      <p:bldP spid="5" grpId="0"/>
+      <p:bldP spid="10" grpId="0"/>
+      <p:bldP spid="14" grpId="0"/>
+    </p:bldLst>
+  </p:timing>
+</p:sld>
+</file>
+
+<file path=ppt/slides/slide16.xml><?xml version="1.0" encoding="utf-8"?>
+<p:sld xmlns:a="http://schemas.openxmlformats.org/drawingml/2006/main" xmlns:r="http://schemas.openxmlformats.org/officeDocument/2006/relationships" xmlns:p="http://schemas.openxmlformats.org/presentationml/2006/main">
+  <p:cSld>
+    <p:spTree>
+      <p:nvGrpSpPr>
+        <p:cNvPr id="1" name=""/>
+        <p:cNvGrpSpPr/>
+        <p:nvPr/>
+      </p:nvGrpSpPr>
+      <p:grpSpPr>
+        <a:xfrm>
+          <a:off x="0" y="0"/>
+          <a:ext cx="0" cy="0"/>
+          <a:chOff x="0" y="0"/>
+          <a:chExt cx="0" cy="0"/>
+        </a:xfrm>
+      </p:grpSpPr>
+      <p:sp>
+        <p:nvSpPr>
+          <p:cNvPr id="2" name="Titel 1">
+            <a:extLst>
+              <a:ext uri="{FF2B5EF4-FFF2-40B4-BE49-F238E27FC236}">
+                <a16:creationId xmlns:a16="http://schemas.microsoft.com/office/drawing/2014/main" id="{2911F67F-327B-4C51-B9E3-A1D3BCC720A5}"/>
+              </a:ext>
+            </a:extLst>
+          </p:cNvPr>
+          <p:cNvSpPr>
+            <a:spLocks noGrp="1"/>
+          </p:cNvSpPr>
+          <p:nvPr>
+            <p:ph type="title"/>
+          </p:nvPr>
+        </p:nvSpPr>
+        <p:spPr/>
+        <p:txBody>
+          <a:bodyPr>
+            <a:normAutofit/>
+          </a:bodyPr>
+          <a:lstStyle/>
+          <a:p>
+            <a:r>
+              <a:rPr lang="de-DE" dirty="0"/>
+              <a:t>Mathematische Herleitungen</a:t>
+            </a:r>
+            <a:br>
+              <a:rPr lang="de-DE" dirty="0"/>
+            </a:br>
+            <a:r>
               <a:rPr lang="de-DE" sz="2400" dirty="0" err="1"/>
               <a:t>Stochastic</a:t>
             </a:r>
@@ -8366,7 +10168,7 @@
     </p:spTree>
     <p:extLst>
       <p:ext uri="{BB962C8B-B14F-4D97-AF65-F5344CB8AC3E}">
-        <p14:creationId xmlns:p14="http://schemas.microsoft.com/office/powerpoint/2010/main" val="3713829249"/>
+        <p14:creationId xmlns:p14="http://schemas.microsoft.com/office/powerpoint/2010/main" val="2709567436"/>
       </p:ext>
     </p:extLst>
   </p:cSld>
@@ -8376,7 +10178,7 @@
 </p:sld>
 </file>
 
-<file path=ppt/slides/slide15.xml><?xml version="1.0" encoding="utf-8"?>
+<file path=ppt/slides/slide17.xml><?xml version="1.0" encoding="utf-8"?>
 <p:sld xmlns:a="http://schemas.openxmlformats.org/drawingml/2006/main" xmlns:r="http://schemas.openxmlformats.org/officeDocument/2006/relationships" xmlns:p="http://schemas.openxmlformats.org/presentationml/2006/main">
   <p:cSld>
     <p:spTree>
@@ -8447,7 +10249,7 @@
 </p:sld>
 </file>
 
-<file path=ppt/slides/slide16.xml><?xml version="1.0" encoding="utf-8"?>
+<file path=ppt/slides/slide18.xml><?xml version="1.0" encoding="utf-8"?>
 <p:sld xmlns:a="http://schemas.openxmlformats.org/drawingml/2006/main" xmlns:r="http://schemas.openxmlformats.org/officeDocument/2006/relationships" xmlns:p="http://schemas.openxmlformats.org/presentationml/2006/main">
   <p:cSld>
     <p:spTree>
@@ -17842,7 +19644,21 @@
       </a:bgFillStyleLst>
     </a:fmtScheme>
   </a:themeElements>
-  <a:objectDefaults/>
+  <a:objectDefaults>
+    <a:txDef>
+      <a:spPr>
+        <a:noFill/>
+      </a:spPr>
+      <a:bodyPr wrap="square" rtlCol="0">
+        <a:spAutoFit/>
+      </a:bodyPr>
+      <a:lstStyle>
+        <a:defPPr algn="l">
+          <a:defRPr sz="1400" dirty="0" smtClean="0"/>
+        </a:defPPr>
+      </a:lstStyle>
+    </a:txDef>
+  </a:objectDefaults>
   <a:extraClrSchemeLst/>
   <a:extLst>
     <a:ext uri="{05A4C25C-085E-4340-85A3-A5531E510DB2}">

</xml_diff>

<commit_message>
revised gradient descent section
</commit_message>
<xml_diff>
--- a/theory/submission/result_presentation.pptx
+++ b/theory/submission/result_presentation.pptx
@@ -10064,12 +10064,8 @@
               <a:rPr lang="de-DE" dirty="0"/>
             </a:br>
             <a:r>
-              <a:rPr lang="de-DE" sz="2400" dirty="0" err="1"/>
-              <a:t>Stochastic</a:t>
-            </a:r>
-            <a:r>
               <a:rPr lang="de-DE" sz="2400" dirty="0"/>
-              <a:t> Gradient Descent</a:t>
+              <a:t>Lernen mittels Stochastic Gradient Descent</a:t>
             </a:r>
             <a:endParaRPr lang="de-DE" dirty="0"/>
           </a:p>
@@ -10089,46 +10085,15 @@
           </p:cNvPicPr>
           <p:nvPr/>
         </p:nvPicPr>
-        <p:blipFill>
+        <p:blipFill rotWithShape="1">
           <a:blip r:embed="rId2"/>
-          <a:stretch>
-            <a:fillRect/>
-          </a:stretch>
+          <a:srcRect l="1117" t="20561" r="5254"/>
+          <a:stretch/>
         </p:blipFill>
         <p:spPr>
           <a:xfrm>
-            <a:off x="4123445" y="2245832"/>
-            <a:ext cx="2942566" cy="917347"/>
-          </a:xfrm>
-          <a:prstGeom prst="rect">
-            <a:avLst/>
-          </a:prstGeom>
-        </p:spPr>
-      </p:pic>
-      <p:pic>
-        <p:nvPicPr>
-          <p:cNvPr id="7" name="Grafik 6">
-            <a:extLst>
-              <a:ext uri="{FF2B5EF4-FFF2-40B4-BE49-F238E27FC236}">
-                <a16:creationId xmlns:a16="http://schemas.microsoft.com/office/drawing/2014/main" id="{FAF08FC7-1ECB-489E-ADD8-DB00419A9244}"/>
-              </a:ext>
-            </a:extLst>
-          </p:cNvPr>
-          <p:cNvPicPr>
-            <a:picLocks noChangeAspect="1"/>
-          </p:cNvPicPr>
-          <p:nvPr/>
-        </p:nvPicPr>
-        <p:blipFill>
-          <a:blip r:embed="rId3"/>
-          <a:stretch>
-            <a:fillRect/>
-          </a:stretch>
-        </p:blipFill>
-        <p:spPr>
-          <a:xfrm>
-            <a:off x="4404140" y="4091720"/>
-            <a:ext cx="2456205" cy="708393"/>
+            <a:off x="560876" y="2358517"/>
+            <a:ext cx="2755075" cy="728737"/>
           </a:xfrm>
           <a:prstGeom prst="rect">
             <a:avLst/>
@@ -10149,22 +10114,492 @@
           </p:cNvPicPr>
           <p:nvPr/>
         </p:nvPicPr>
+        <p:blipFill rotWithShape="1">
+          <a:blip r:embed="rId3"/>
+          <a:srcRect r="5648"/>
+          <a:stretch/>
+        </p:blipFill>
+        <p:spPr>
+          <a:xfrm>
+            <a:off x="560876" y="5761395"/>
+            <a:ext cx="1822106" cy="397412"/>
+          </a:xfrm>
+          <a:prstGeom prst="rect">
+            <a:avLst/>
+          </a:prstGeom>
+        </p:spPr>
+      </p:pic>
+      <mc:AlternateContent xmlns:mc="http://schemas.openxmlformats.org/markup-compatibility/2006">
+        <mc:Choice xmlns:a14="http://schemas.microsoft.com/office/drawing/2010/main" Requires="a14">
+          <p:sp>
+            <p:nvSpPr>
+              <p:cNvPr id="3" name="TextBox 2">
+                <a:extLst>
+                  <a:ext uri="{FF2B5EF4-FFF2-40B4-BE49-F238E27FC236}">
+                    <a16:creationId xmlns:a16="http://schemas.microsoft.com/office/drawing/2014/main" id="{02F18588-FA14-9E6A-5264-83F5231F1997}"/>
+                  </a:ext>
+                </a:extLst>
+              </p:cNvPr>
+              <p:cNvSpPr txBox="1"/>
+              <p:nvPr/>
+            </p:nvSpPr>
+            <p:spPr>
+              <a:xfrm>
+                <a:off x="5767444" y="2245832"/>
+                <a:ext cx="6231813" cy="954107"/>
+              </a:xfrm>
+              <a:prstGeom prst="rect">
+                <a:avLst/>
+              </a:prstGeom>
+              <a:noFill/>
+            </p:spPr>
+            <p:txBody>
+              <a:bodyPr wrap="square" rtlCol="0">
+                <a:spAutoFit/>
+              </a:bodyPr>
+              <a:lstStyle/>
+              <a:p>
+                <a:pPr marL="285750" indent="-285750" algn="l">
+                  <a:buFont typeface="Arial" panose="020B0604020202020204" pitchFamily="34" charset="0"/>
+                  <a:buChar char="•"/>
+                </a:pPr>
+                <a:r>
+                  <a:rPr lang="de-DE" sz="1400" dirty="0"/>
+                  <a:t>Parameter und Gradienten zum Schritt </a:t>
+                </a:r>
+                <a14:m>
+                  <m:oMath xmlns:m="http://schemas.openxmlformats.org/officeDocument/2006/math">
+                    <m:r>
+                      <a:rPr lang="de-DE" sz="1400" b="0" i="1" smtClean="0">
+                        <a:latin typeface="Cambria Math" panose="02040503050406030204" pitchFamily="18" charset="0"/>
+                      </a:rPr>
+                      <m:t>𝑠</m:t>
+                    </m:r>
+                    <m:r>
+                      <a:rPr lang="de-DE" sz="1400" b="0" i="1" smtClean="0">
+                        <a:latin typeface="Cambria Math" panose="02040503050406030204" pitchFamily="18" charset="0"/>
+                      </a:rPr>
+                      <m:t>−1</m:t>
+                    </m:r>
+                  </m:oMath>
+                </a14:m>
+                <a:r>
+                  <a:rPr lang="de-DE" sz="1400" dirty="0"/>
+                  <a:t> sind die „aktuellen“ Parameter </a:t>
+                </a:r>
+              </a:p>
+              <a:p>
+                <a:pPr marL="285750" indent="-285750">
+                  <a:buFont typeface="Arial" panose="020B0604020202020204" pitchFamily="34" charset="0"/>
+                  <a:buChar char="•"/>
+                </a:pPr>
+                <a:r>
+                  <a:rPr lang="de-DE" sz="1400" dirty="0"/>
+                  <a:t>Parameter und Gradienten zum Schritt </a:t>
+                </a:r>
+                <a14:m>
+                  <m:oMath xmlns:m="http://schemas.openxmlformats.org/officeDocument/2006/math">
+                    <m:r>
+                      <a:rPr lang="de-DE" sz="1400" b="0" i="1" smtClean="0">
+                        <a:latin typeface="Cambria Math" panose="02040503050406030204" pitchFamily="18" charset="0"/>
+                      </a:rPr>
+                      <m:t>𝑠</m:t>
+                    </m:r>
+                  </m:oMath>
+                </a14:m>
+                <a:r>
+                  <a:rPr lang="de-DE" sz="1400" dirty="0"/>
+                  <a:t> sind die „neuen“ Parameter </a:t>
+                </a:r>
+              </a:p>
+              <a:p>
+                <a:pPr marL="285750" indent="-285750">
+                  <a:buFont typeface="Arial" panose="020B0604020202020204" pitchFamily="34" charset="0"/>
+                  <a:buChar char="•"/>
+                </a:pPr>
+                <a:r>
+                  <a:rPr lang="de-DE" sz="1400" dirty="0"/>
+                  <a:t>Negative Gradienten zeigen in die Richtung des stärksten Gefälles</a:t>
+                </a:r>
+              </a:p>
+              <a:p>
+                <a:pPr marL="285750" indent="-285750">
+                  <a:buFont typeface="Arial" panose="020B0604020202020204" pitchFamily="34" charset="0"/>
+                  <a:buChar char="•"/>
+                </a:pPr>
+                <a14:m>
+                  <m:oMath xmlns:m="http://schemas.openxmlformats.org/officeDocument/2006/math">
+                    <m:r>
+                      <a:rPr lang="de-DE" sz="1400" b="0" i="1" smtClean="0">
+                        <a:latin typeface="Cambria Math" panose="02040503050406030204" pitchFamily="18" charset="0"/>
+                      </a:rPr>
+                      <m:t>𝜆</m:t>
+                    </m:r>
+                  </m:oMath>
+                </a14:m>
+                <a:r>
+                  <a:rPr lang="de-DE" sz="1400" dirty="0"/>
+                  <a:t> bestimmt die Schrittgröße in Richtung des stärksten Gefälles</a:t>
+                </a:r>
+              </a:p>
+            </p:txBody>
+          </p:sp>
+        </mc:Choice>
+        <mc:Fallback>
+          <p:sp>
+            <p:nvSpPr>
+              <p:cNvPr id="3" name="TextBox 2">
+                <a:extLst>
+                  <a:ext uri="{FF2B5EF4-FFF2-40B4-BE49-F238E27FC236}">
+                    <a16:creationId xmlns:a16="http://schemas.microsoft.com/office/drawing/2014/main" id="{02F18588-FA14-9E6A-5264-83F5231F1997}"/>
+                  </a:ext>
+                </a:extLst>
+              </p:cNvPr>
+              <p:cNvSpPr txBox="1">
+                <a:spLocks noRot="1" noChangeAspect="1" noMove="1" noResize="1" noEditPoints="1" noAdjustHandles="1" noChangeArrowheads="1" noChangeShapeType="1" noTextEdit="1"/>
+              </p:cNvSpPr>
+              <p:nvPr/>
+            </p:nvSpPr>
+            <p:spPr>
+              <a:xfrm>
+                <a:off x="5767444" y="2245832"/>
+                <a:ext cx="6231813" cy="954107"/>
+              </a:xfrm>
+              <a:prstGeom prst="rect">
+                <a:avLst/>
+              </a:prstGeom>
+              <a:blipFill>
+                <a:blip r:embed="rId4"/>
+                <a:stretch>
+                  <a:fillRect l="-98" t="-637" b="-5732"/>
+                </a:stretch>
+              </a:blipFill>
+            </p:spPr>
+            <p:txBody>
+              <a:bodyPr/>
+              <a:lstStyle/>
+              <a:p>
+                <a:r>
+                  <a:rPr lang="de-DE">
+                    <a:noFill/>
+                  </a:rPr>
+                  <a:t> </a:t>
+                </a:r>
+              </a:p>
+            </p:txBody>
+          </p:sp>
+        </mc:Fallback>
+      </mc:AlternateContent>
+      <p:pic>
+        <p:nvPicPr>
+          <p:cNvPr id="6" name="Picture 5">
+            <a:extLst>
+              <a:ext uri="{FF2B5EF4-FFF2-40B4-BE49-F238E27FC236}">
+                <a16:creationId xmlns:a16="http://schemas.microsoft.com/office/drawing/2014/main" id="{7B3450F5-73BA-2141-B1BF-C97F121806CF}"/>
+              </a:ext>
+            </a:extLst>
+          </p:cNvPr>
+          <p:cNvPicPr>
+            <a:picLocks noChangeAspect="1"/>
+          </p:cNvPicPr>
+          <p:nvPr/>
+        </p:nvPicPr>
+        <p:blipFill rotWithShape="1">
+          <a:blip r:embed="rId5"/>
+          <a:srcRect l="8005" t="8530" r="6194" b="11279"/>
+          <a:stretch/>
+        </p:blipFill>
+        <p:spPr>
+          <a:xfrm>
+            <a:off x="560876" y="3891697"/>
+            <a:ext cx="2177142" cy="658675"/>
+          </a:xfrm>
+          <a:prstGeom prst="rect">
+            <a:avLst/>
+          </a:prstGeom>
+        </p:spPr>
+      </p:pic>
+      <p:pic>
+        <p:nvPicPr>
+          <p:cNvPr id="10" name="Picture 9" descr="Chart, surface chart&#10;&#10;Description automatically generated">
+            <a:extLst>
+              <a:ext uri="{FF2B5EF4-FFF2-40B4-BE49-F238E27FC236}">
+                <a16:creationId xmlns:a16="http://schemas.microsoft.com/office/drawing/2014/main" id="{2613F875-1776-C0BA-878F-17C862BAF89E}"/>
+              </a:ext>
+            </a:extLst>
+          </p:cNvPr>
+          <p:cNvPicPr>
+            <a:picLocks noChangeAspect="1"/>
+          </p:cNvPicPr>
+          <p:nvPr/>
+        </p:nvPicPr>
         <p:blipFill>
-          <a:blip r:embed="rId4"/>
+          <a:blip r:embed="rId6">
+            <a:extLst>
+              <a:ext uri="{28A0092B-C50C-407E-A947-70E740481C1C}">
+                <a14:useLocalDpi xmlns:a14="http://schemas.microsoft.com/office/drawing/2010/main" val="0"/>
+              </a:ext>
+            </a:extLst>
+          </a:blip>
           <a:stretch>
             <a:fillRect/>
           </a:stretch>
         </p:blipFill>
         <p:spPr>
           <a:xfrm>
-            <a:off x="4816337" y="5529948"/>
-            <a:ext cx="1931174" cy="397412"/>
+            <a:off x="5767444" y="3355470"/>
+            <a:ext cx="2596692" cy="1731128"/>
           </a:xfrm>
           <a:prstGeom prst="rect">
             <a:avLst/>
           </a:prstGeom>
         </p:spPr>
       </p:pic>
+      <mc:AlternateContent xmlns:mc="http://schemas.openxmlformats.org/markup-compatibility/2006">
+        <mc:Choice xmlns:a14="http://schemas.microsoft.com/office/drawing/2010/main" Requires="a14">
+          <p:sp>
+            <p:nvSpPr>
+              <p:cNvPr id="11" name="TextBox 10">
+                <a:extLst>
+                  <a:ext uri="{FF2B5EF4-FFF2-40B4-BE49-F238E27FC236}">
+                    <a16:creationId xmlns:a16="http://schemas.microsoft.com/office/drawing/2014/main" id="{99D676D6-ED1B-5C42-9D08-E0DA04371718}"/>
+                  </a:ext>
+                </a:extLst>
+              </p:cNvPr>
+              <p:cNvSpPr txBox="1"/>
+              <p:nvPr/>
+            </p:nvSpPr>
+            <p:spPr>
+              <a:xfrm>
+                <a:off x="5767444" y="5375326"/>
+                <a:ext cx="3732811" cy="1169551"/>
+              </a:xfrm>
+              <a:prstGeom prst="rect">
+                <a:avLst/>
+              </a:prstGeom>
+              <a:noFill/>
+            </p:spPr>
+            <p:txBody>
+              <a:bodyPr wrap="square" rtlCol="0">
+                <a:spAutoFit/>
+              </a:bodyPr>
+              <a:lstStyle/>
+              <a:p>
+                <a:pPr marL="285750" indent="-285750" algn="l">
+                  <a:buFont typeface="Arial" panose="020B0604020202020204" pitchFamily="34" charset="0"/>
+                  <a:buChar char="•"/>
+                </a:pPr>
+                <a:r>
+                  <a:rPr lang="de-DE" sz="1400" dirty="0"/>
+                  <a:t>Die Anzahl an Gradient Descent Schritten </a:t>
+                </a:r>
+                <a14:m>
+                  <m:oMath xmlns:m="http://schemas.openxmlformats.org/officeDocument/2006/math">
+                    <m:r>
+                      <a:rPr lang="de-DE" sz="1400" b="0" i="1" smtClean="0">
+                        <a:latin typeface="Cambria Math" panose="02040503050406030204" pitchFamily="18" charset="0"/>
+                      </a:rPr>
+                      <m:t>𝑆</m:t>
+                    </m:r>
+                  </m:oMath>
+                </a14:m>
+                <a:r>
+                  <a:rPr lang="de-DE" sz="1400" dirty="0"/>
+                  <a:t> pro Epoche ist </a:t>
+                </a:r>
+                <a14:m>
+                  <m:oMath xmlns:m="http://schemas.openxmlformats.org/officeDocument/2006/math">
+                    <m:r>
+                      <a:rPr lang="de-DE" sz="1400" b="0" i="1" smtClean="0">
+                        <a:latin typeface="Cambria Math" panose="02040503050406030204" pitchFamily="18" charset="0"/>
+                      </a:rPr>
+                      <m:t>𝑁</m:t>
+                    </m:r>
+                    <m:r>
+                      <a:rPr lang="de-DE" sz="1400" b="0" i="1" smtClean="0">
+                        <a:latin typeface="Cambria Math" panose="02040503050406030204" pitchFamily="18" charset="0"/>
+                      </a:rPr>
+                      <m:t>/</m:t>
+                    </m:r>
+                    <m:r>
+                      <a:rPr lang="de-DE" sz="1400" b="0" i="1" smtClean="0">
+                        <a:latin typeface="Cambria Math" panose="02040503050406030204" pitchFamily="18" charset="0"/>
+                      </a:rPr>
+                      <m:t>𝑀</m:t>
+                    </m:r>
+                  </m:oMath>
+                </a14:m>
+                <a:r>
+                  <a:rPr lang="de-DE" sz="1400" dirty="0"/>
+                  <a:t> aufgerundet zum nächsten Integer</a:t>
+                </a:r>
+              </a:p>
+              <a:p>
+                <a:pPr marL="285750" indent="-285750" algn="l">
+                  <a:buFont typeface="Arial" panose="020B0604020202020204" pitchFamily="34" charset="0"/>
+                  <a:buChar char="•"/>
+                </a:pPr>
+                <a:r>
+                  <a:rPr lang="de-DE" sz="1400" dirty="0"/>
+                  <a:t>Aufrunden ist notwendig um alle Daten des Trainingsdatensatzes zu durchlaufen</a:t>
+                </a:r>
+              </a:p>
+            </p:txBody>
+          </p:sp>
+        </mc:Choice>
+        <mc:Fallback>
+          <p:sp>
+            <p:nvSpPr>
+              <p:cNvPr id="11" name="TextBox 10">
+                <a:extLst>
+                  <a:ext uri="{FF2B5EF4-FFF2-40B4-BE49-F238E27FC236}">
+                    <a16:creationId xmlns:a16="http://schemas.microsoft.com/office/drawing/2014/main" id="{99D676D6-ED1B-5C42-9D08-E0DA04371718}"/>
+                  </a:ext>
+                </a:extLst>
+              </p:cNvPr>
+              <p:cNvSpPr txBox="1">
+                <a:spLocks noRot="1" noChangeAspect="1" noMove="1" noResize="1" noEditPoints="1" noAdjustHandles="1" noChangeArrowheads="1" noChangeShapeType="1" noTextEdit="1"/>
+              </p:cNvSpPr>
+              <p:nvPr/>
+            </p:nvSpPr>
+            <p:spPr>
+              <a:xfrm>
+                <a:off x="5767444" y="5375326"/>
+                <a:ext cx="3732811" cy="1169551"/>
+              </a:xfrm>
+              <a:prstGeom prst="rect">
+                <a:avLst/>
+              </a:prstGeom>
+              <a:blipFill>
+                <a:blip r:embed="rId7"/>
+                <a:stretch>
+                  <a:fillRect l="-163" t="-1042" b="-4167"/>
+                </a:stretch>
+              </a:blipFill>
+            </p:spPr>
+            <p:txBody>
+              <a:bodyPr/>
+              <a:lstStyle/>
+              <a:p>
+                <a:r>
+                  <a:rPr lang="de-DE">
+                    <a:noFill/>
+                  </a:rPr>
+                  <a:t> </a:t>
+                </a:r>
+              </a:p>
+            </p:txBody>
+          </p:sp>
+        </mc:Fallback>
+      </mc:AlternateContent>
+      <p:sp>
+        <p:nvSpPr>
+          <p:cNvPr id="12" name="TextBox 11">
+            <a:extLst>
+              <a:ext uri="{FF2B5EF4-FFF2-40B4-BE49-F238E27FC236}">
+                <a16:creationId xmlns:a16="http://schemas.microsoft.com/office/drawing/2014/main" id="{7E48CF80-5B41-22F0-934C-265A956DE2C3}"/>
+              </a:ext>
+            </a:extLst>
+          </p:cNvPr>
+          <p:cNvSpPr txBox="1"/>
+          <p:nvPr/>
+        </p:nvSpPr>
+        <p:spPr>
+          <a:xfrm>
+            <a:off x="3546766" y="2568997"/>
+            <a:ext cx="1468581" cy="307777"/>
+          </a:xfrm>
+          <a:prstGeom prst="rect">
+            <a:avLst/>
+          </a:prstGeom>
+          <a:noFill/>
+        </p:spPr>
+        <p:txBody>
+          <a:bodyPr wrap="square" rtlCol="0">
+            <a:spAutoFit/>
+          </a:bodyPr>
+          <a:lstStyle/>
+          <a:p>
+            <a:pPr algn="l"/>
+            <a:r>
+              <a:rPr lang="de-DE" sz="1400" dirty="0"/>
+              <a:t>Gewicht-Updates</a:t>
+            </a:r>
+          </a:p>
+        </p:txBody>
+      </p:sp>
+      <p:sp>
+        <p:nvSpPr>
+          <p:cNvPr id="13" name="TextBox 12">
+            <a:extLst>
+              <a:ext uri="{FF2B5EF4-FFF2-40B4-BE49-F238E27FC236}">
+                <a16:creationId xmlns:a16="http://schemas.microsoft.com/office/drawing/2014/main" id="{CFB847CD-D812-983E-0450-07DEF8C5D20B}"/>
+              </a:ext>
+            </a:extLst>
+          </p:cNvPr>
+          <p:cNvSpPr txBox="1"/>
+          <p:nvPr/>
+        </p:nvSpPr>
+        <p:spPr>
+          <a:xfrm>
+            <a:off x="3040088" y="4067146"/>
+            <a:ext cx="1904010" cy="307777"/>
+          </a:xfrm>
+          <a:prstGeom prst="rect">
+            <a:avLst/>
+          </a:prstGeom>
+          <a:noFill/>
+        </p:spPr>
+        <p:txBody>
+          <a:bodyPr wrap="square" rtlCol="0">
+            <a:spAutoFit/>
+          </a:bodyPr>
+          <a:lstStyle/>
+          <a:p>
+            <a:pPr algn="l"/>
+            <a:r>
+              <a:rPr lang="de-DE" sz="1400" dirty="0"/>
+              <a:t>Bias-Updates</a:t>
+            </a:r>
+          </a:p>
+        </p:txBody>
+      </p:sp>
+      <p:sp>
+        <p:nvSpPr>
+          <p:cNvPr id="14" name="TextBox 13">
+            <a:extLst>
+              <a:ext uri="{FF2B5EF4-FFF2-40B4-BE49-F238E27FC236}">
+                <a16:creationId xmlns:a16="http://schemas.microsoft.com/office/drawing/2014/main" id="{E69ACA13-FEA0-AE01-77A8-C4C120A0D55B}"/>
+              </a:ext>
+            </a:extLst>
+          </p:cNvPr>
+          <p:cNvSpPr txBox="1"/>
+          <p:nvPr/>
+        </p:nvSpPr>
+        <p:spPr>
+          <a:xfrm>
+            <a:off x="2652158" y="5806213"/>
+            <a:ext cx="2394857" cy="307777"/>
+          </a:xfrm>
+          <a:prstGeom prst="rect">
+            <a:avLst/>
+          </a:prstGeom>
+          <a:noFill/>
+        </p:spPr>
+        <p:txBody>
+          <a:bodyPr wrap="square" rtlCol="0">
+            <a:spAutoFit/>
+          </a:bodyPr>
+          <a:lstStyle/>
+          <a:p>
+            <a:pPr algn="l"/>
+            <a:r>
+              <a:rPr lang="de-DE" sz="1400" dirty="0"/>
+              <a:t>Anzahl an Update-Schritten</a:t>
+            </a:r>
+          </a:p>
+        </p:txBody>
+      </p:sp>
     </p:spTree>
     <p:extLst>
       <p:ext uri="{BB962C8B-B14F-4D97-AF65-F5344CB8AC3E}">

</xml_diff>

<commit_message>
WIP: Explaining learning algorithm
</commit_message>
<xml_diff>
--- a/theory/submission/result_presentation.pptx
+++ b/theory/submission/result_presentation.pptx
@@ -1663,7 +1663,7 @@
             </a:pPr>
             <a:r>
               <a:rPr lang="de-DE" sz="1200" dirty="0"/>
-              <a:t>Auf Dimensionen eingehen</a:t>
+              <a:t>Erklären wie das Fehlersignal zurück-propagiert wird</a:t>
             </a:r>
           </a:p>
           <a:p>
@@ -5157,7 +5157,7 @@
         </p:blipFill>
         <p:spPr>
           <a:xfrm>
-            <a:off x="838200" y="5934519"/>
+            <a:off x="838200" y="6041384"/>
             <a:ext cx="2495843" cy="512491"/>
           </a:xfrm>
           <a:prstGeom prst="rect">
@@ -5386,8 +5386,8 @@
         </p:nvSpPr>
         <p:spPr>
           <a:xfrm>
-            <a:off x="3488789" y="6086630"/>
-            <a:ext cx="2288344" cy="307777"/>
+            <a:off x="3488789" y="5820576"/>
+            <a:ext cx="3311814" cy="954107"/>
           </a:xfrm>
           <a:prstGeom prst="rect">
             <a:avLst/>
@@ -5402,7 +5402,7 @@
           <a:p>
             <a:r>
               <a:rPr lang="de-DE" sz="1400" dirty="0"/>
-              <a:t>Alle Terme zusammengefasst</a:t>
+              <a:t>Wenn Fehlersignal am Output Layer berechnet wurde, kann das Fehlersignal bis zum 1. Hidden Layer zurück-propagiert werden</a:t>
             </a:r>
           </a:p>
         </p:txBody>
@@ -10665,12 +10665,784 @@
             </a:br>
             <a:r>
               <a:rPr lang="de-DE" sz="2400" dirty="0"/>
-              <a:t>Backpropagation Algorithmus</a:t>
+              <a:t>Lern-Algorithmus</a:t>
             </a:r>
             <a:endParaRPr lang="de-DE" dirty="0"/>
           </a:p>
         </p:txBody>
       </p:sp>
+      <p:pic>
+        <p:nvPicPr>
+          <p:cNvPr id="8" name="Grafik 5">
+            <a:extLst>
+              <a:ext uri="{FF2B5EF4-FFF2-40B4-BE49-F238E27FC236}">
+                <a16:creationId xmlns:a16="http://schemas.microsoft.com/office/drawing/2014/main" id="{0A84D6E5-DB15-22CE-8533-10A8052532C0}"/>
+              </a:ext>
+            </a:extLst>
+          </p:cNvPr>
+          <p:cNvPicPr>
+            <a:picLocks noChangeAspect="1"/>
+          </p:cNvPicPr>
+          <p:nvPr/>
+        </p:nvPicPr>
+        <p:blipFill rotWithShape="1">
+          <a:blip r:embed="rId3"/>
+          <a:srcRect r="5338"/>
+          <a:stretch/>
+        </p:blipFill>
+        <p:spPr>
+          <a:xfrm>
+            <a:off x="2979992" y="1916200"/>
+            <a:ext cx="1654063" cy="490989"/>
+          </a:xfrm>
+          <a:prstGeom prst="rect">
+            <a:avLst/>
+          </a:prstGeom>
+        </p:spPr>
+      </p:pic>
+      <p:pic>
+        <p:nvPicPr>
+          <p:cNvPr id="9" name="Grafik 13">
+            <a:extLst>
+              <a:ext uri="{FF2B5EF4-FFF2-40B4-BE49-F238E27FC236}">
+                <a16:creationId xmlns:a16="http://schemas.microsoft.com/office/drawing/2014/main" id="{14D7FDC3-5B36-FB80-3776-9B870A8FFCD0}"/>
+              </a:ext>
+            </a:extLst>
+          </p:cNvPr>
+          <p:cNvPicPr>
+            <a:picLocks noChangeAspect="1"/>
+          </p:cNvPicPr>
+          <p:nvPr/>
+        </p:nvPicPr>
+        <p:blipFill rotWithShape="1">
+          <a:blip r:embed="rId4"/>
+          <a:srcRect r="8083"/>
+          <a:stretch/>
+        </p:blipFill>
+        <p:spPr>
+          <a:xfrm>
+            <a:off x="5364707" y="1969765"/>
+            <a:ext cx="883224" cy="421689"/>
+          </a:xfrm>
+          <a:prstGeom prst="rect">
+            <a:avLst/>
+          </a:prstGeom>
+        </p:spPr>
+      </p:pic>
+      <p:pic>
+        <p:nvPicPr>
+          <p:cNvPr id="10" name="Grafik 17">
+            <a:extLst>
+              <a:ext uri="{FF2B5EF4-FFF2-40B4-BE49-F238E27FC236}">
+                <a16:creationId xmlns:a16="http://schemas.microsoft.com/office/drawing/2014/main" id="{01C0948B-AAEB-FA81-7497-5ED2F3120BC2}"/>
+              </a:ext>
+            </a:extLst>
+          </p:cNvPr>
+          <p:cNvPicPr>
+            <a:picLocks noChangeAspect="1"/>
+          </p:cNvPicPr>
+          <p:nvPr/>
+        </p:nvPicPr>
+        <p:blipFill rotWithShape="1">
+          <a:blip r:embed="rId5"/>
+          <a:srcRect l="45124"/>
+          <a:stretch/>
+        </p:blipFill>
+        <p:spPr>
+          <a:xfrm>
+            <a:off x="7105402" y="1390828"/>
+            <a:ext cx="1637916" cy="1346184"/>
+          </a:xfrm>
+          <a:prstGeom prst="rect">
+            <a:avLst/>
+          </a:prstGeom>
+        </p:spPr>
+      </p:pic>
+      <p:pic>
+        <p:nvPicPr>
+          <p:cNvPr id="11" name="Picture 10">
+            <a:extLst>
+              <a:ext uri="{FF2B5EF4-FFF2-40B4-BE49-F238E27FC236}">
+                <a16:creationId xmlns:a16="http://schemas.microsoft.com/office/drawing/2014/main" id="{AE6099C6-0044-007B-9765-D87B56DE0B89}"/>
+              </a:ext>
+            </a:extLst>
+          </p:cNvPr>
+          <p:cNvPicPr>
+            <a:picLocks noChangeAspect="1"/>
+          </p:cNvPicPr>
+          <p:nvPr/>
+        </p:nvPicPr>
+        <p:blipFill rotWithShape="1">
+          <a:blip r:embed="rId6"/>
+          <a:srcRect r="52338"/>
+          <a:stretch/>
+        </p:blipFill>
+        <p:spPr>
+          <a:xfrm>
+            <a:off x="9256920" y="1770500"/>
+            <a:ext cx="1913060" cy="713090"/>
+          </a:xfrm>
+          <a:prstGeom prst="rect">
+            <a:avLst/>
+          </a:prstGeom>
+        </p:spPr>
+      </p:pic>
+      <p:sp>
+        <p:nvSpPr>
+          <p:cNvPr id="12" name="TextBox 11">
+            <a:extLst>
+              <a:ext uri="{FF2B5EF4-FFF2-40B4-BE49-F238E27FC236}">
+                <a16:creationId xmlns:a16="http://schemas.microsoft.com/office/drawing/2014/main" id="{3BC72AB6-F7A3-C807-9627-BB671E8D264B}"/>
+              </a:ext>
+            </a:extLst>
+          </p:cNvPr>
+          <p:cNvSpPr txBox="1"/>
+          <p:nvPr/>
+        </p:nvSpPr>
+        <p:spPr>
+          <a:xfrm>
+            <a:off x="566057" y="2026722"/>
+            <a:ext cx="2826327" cy="307777"/>
+          </a:xfrm>
+          <a:prstGeom prst="rect">
+            <a:avLst/>
+          </a:prstGeom>
+          <a:noFill/>
+        </p:spPr>
+        <p:txBody>
+          <a:bodyPr wrap="square" rtlCol="0">
+            <a:spAutoFit/>
+          </a:bodyPr>
+          <a:lstStyle/>
+          <a:p>
+            <a:pPr algn="l"/>
+            <a:r>
+              <a:rPr lang="de-DE" sz="1400" dirty="0"/>
+              <a:t>1. Forwardpropagation</a:t>
+            </a:r>
+          </a:p>
+        </p:txBody>
+      </p:sp>
+      <p:sp>
+        <p:nvSpPr>
+          <p:cNvPr id="15" name="Arrow: Right 14">
+            <a:extLst>
+              <a:ext uri="{FF2B5EF4-FFF2-40B4-BE49-F238E27FC236}">
+                <a16:creationId xmlns:a16="http://schemas.microsoft.com/office/drawing/2014/main" id="{0FEAAC86-34B6-00DB-54DB-9F9B0CCDF4DC}"/>
+              </a:ext>
+            </a:extLst>
+          </p:cNvPr>
+          <p:cNvSpPr/>
+          <p:nvPr/>
+        </p:nvSpPr>
+        <p:spPr>
+          <a:xfrm>
+            <a:off x="4876800" y="2063920"/>
+            <a:ext cx="380010" cy="208225"/>
+          </a:xfrm>
+          <a:prstGeom prst="rightArrow">
+            <a:avLst/>
+          </a:prstGeom>
+          <a:solidFill>
+            <a:schemeClr val="tx1"/>
+          </a:solidFill>
+          <a:ln>
+            <a:noFill/>
+          </a:ln>
+        </p:spPr>
+        <p:style>
+          <a:lnRef idx="2">
+            <a:schemeClr val="accent1">
+              <a:shade val="50000"/>
+            </a:schemeClr>
+          </a:lnRef>
+          <a:fillRef idx="1">
+            <a:schemeClr val="accent1"/>
+          </a:fillRef>
+          <a:effectRef idx="0">
+            <a:schemeClr val="accent1"/>
+          </a:effectRef>
+          <a:fontRef idx="minor">
+            <a:schemeClr val="lt1"/>
+          </a:fontRef>
+        </p:style>
+        <p:txBody>
+          <a:bodyPr rtlCol="0" anchor="ctr"/>
+          <a:lstStyle/>
+          <a:p>
+            <a:pPr algn="ctr"/>
+            <a:endParaRPr lang="de-DE"/>
+          </a:p>
+        </p:txBody>
+      </p:sp>
+      <p:sp>
+        <p:nvSpPr>
+          <p:cNvPr id="16" name="Arrow: Right 15">
+            <a:extLst>
+              <a:ext uri="{FF2B5EF4-FFF2-40B4-BE49-F238E27FC236}">
+                <a16:creationId xmlns:a16="http://schemas.microsoft.com/office/drawing/2014/main" id="{6DA6BD97-89D3-3A84-6EA9-2ACDC5D647CC}"/>
+              </a:ext>
+            </a:extLst>
+          </p:cNvPr>
+          <p:cNvSpPr/>
+          <p:nvPr/>
+        </p:nvSpPr>
+        <p:spPr>
+          <a:xfrm>
+            <a:off x="6524446" y="2076496"/>
+            <a:ext cx="380010" cy="208225"/>
+          </a:xfrm>
+          <a:prstGeom prst="rightArrow">
+            <a:avLst/>
+          </a:prstGeom>
+          <a:solidFill>
+            <a:schemeClr val="tx1"/>
+          </a:solidFill>
+          <a:ln>
+            <a:noFill/>
+          </a:ln>
+        </p:spPr>
+        <p:style>
+          <a:lnRef idx="2">
+            <a:schemeClr val="accent1">
+              <a:shade val="50000"/>
+            </a:schemeClr>
+          </a:lnRef>
+          <a:fillRef idx="1">
+            <a:schemeClr val="accent1"/>
+          </a:fillRef>
+          <a:effectRef idx="0">
+            <a:schemeClr val="accent1"/>
+          </a:effectRef>
+          <a:fontRef idx="minor">
+            <a:schemeClr val="lt1"/>
+          </a:fontRef>
+        </p:style>
+        <p:txBody>
+          <a:bodyPr rtlCol="0" anchor="ctr"/>
+          <a:lstStyle/>
+          <a:p>
+            <a:pPr algn="ctr"/>
+            <a:endParaRPr lang="de-DE"/>
+          </a:p>
+        </p:txBody>
+      </p:sp>
+      <p:sp>
+        <p:nvSpPr>
+          <p:cNvPr id="17" name="Arrow: Right 16">
+            <a:extLst>
+              <a:ext uri="{FF2B5EF4-FFF2-40B4-BE49-F238E27FC236}">
+                <a16:creationId xmlns:a16="http://schemas.microsoft.com/office/drawing/2014/main" id="{92498E1F-AB38-8B1F-7506-B7972AE05E07}"/>
+              </a:ext>
+            </a:extLst>
+          </p:cNvPr>
+          <p:cNvSpPr/>
+          <p:nvPr/>
+        </p:nvSpPr>
+        <p:spPr>
+          <a:xfrm>
+            <a:off x="8719278" y="2057581"/>
+            <a:ext cx="380010" cy="208225"/>
+          </a:xfrm>
+          <a:prstGeom prst="rightArrow">
+            <a:avLst/>
+          </a:prstGeom>
+          <a:solidFill>
+            <a:schemeClr val="tx1"/>
+          </a:solidFill>
+          <a:ln>
+            <a:noFill/>
+          </a:ln>
+        </p:spPr>
+        <p:style>
+          <a:lnRef idx="2">
+            <a:schemeClr val="accent1">
+              <a:shade val="50000"/>
+            </a:schemeClr>
+          </a:lnRef>
+          <a:fillRef idx="1">
+            <a:schemeClr val="accent1"/>
+          </a:fillRef>
+          <a:effectRef idx="0">
+            <a:schemeClr val="accent1"/>
+          </a:effectRef>
+          <a:fontRef idx="minor">
+            <a:schemeClr val="lt1"/>
+          </a:fontRef>
+        </p:style>
+        <p:txBody>
+          <a:bodyPr rtlCol="0" anchor="ctr"/>
+          <a:lstStyle/>
+          <a:p>
+            <a:pPr algn="ctr"/>
+            <a:endParaRPr lang="de-DE"/>
+          </a:p>
+        </p:txBody>
+      </p:sp>
+      <p:pic>
+        <p:nvPicPr>
+          <p:cNvPr id="19" name="Picture 18">
+            <a:extLst>
+              <a:ext uri="{FF2B5EF4-FFF2-40B4-BE49-F238E27FC236}">
+                <a16:creationId xmlns:a16="http://schemas.microsoft.com/office/drawing/2014/main" id="{7517C175-69B3-4D53-521F-358876867965}"/>
+              </a:ext>
+            </a:extLst>
+          </p:cNvPr>
+          <p:cNvPicPr>
+            <a:picLocks noChangeAspect="1"/>
+          </p:cNvPicPr>
+          <p:nvPr/>
+        </p:nvPicPr>
+        <p:blipFill>
+          <a:blip r:embed="rId7"/>
+          <a:stretch>
+            <a:fillRect/>
+          </a:stretch>
+        </p:blipFill>
+        <p:spPr>
+          <a:xfrm>
+            <a:off x="3426959" y="2753536"/>
+            <a:ext cx="628317" cy="421689"/>
+          </a:xfrm>
+          <a:prstGeom prst="rect">
+            <a:avLst/>
+          </a:prstGeom>
+        </p:spPr>
+      </p:pic>
+      <p:sp>
+        <p:nvSpPr>
+          <p:cNvPr id="20" name="TextBox 19">
+            <a:extLst>
+              <a:ext uri="{FF2B5EF4-FFF2-40B4-BE49-F238E27FC236}">
+                <a16:creationId xmlns:a16="http://schemas.microsoft.com/office/drawing/2014/main" id="{E6316188-06D0-F37C-2745-6B9403686DED}"/>
+              </a:ext>
+            </a:extLst>
+          </p:cNvPr>
+          <p:cNvSpPr txBox="1"/>
+          <p:nvPr/>
+        </p:nvSpPr>
+        <p:spPr>
+          <a:xfrm>
+            <a:off x="566057" y="2823942"/>
+            <a:ext cx="2565070" cy="307777"/>
+          </a:xfrm>
+          <a:prstGeom prst="rect">
+            <a:avLst/>
+          </a:prstGeom>
+          <a:noFill/>
+        </p:spPr>
+        <p:txBody>
+          <a:bodyPr wrap="square" rtlCol="0">
+            <a:spAutoFit/>
+          </a:bodyPr>
+          <a:lstStyle/>
+          <a:p>
+            <a:pPr algn="l"/>
+            <a:r>
+              <a:rPr lang="de-DE" sz="1400" dirty="0"/>
+              <a:t>2. Fehlersignal am Output Layer</a:t>
+            </a:r>
+          </a:p>
+        </p:txBody>
+      </p:sp>
+      <mc:AlternateContent xmlns:mc="http://schemas.openxmlformats.org/markup-compatibility/2006">
+        <mc:Choice xmlns:a14="http://schemas.microsoft.com/office/drawing/2010/main" Requires="a14">
+          <p:sp>
+            <p:nvSpPr>
+              <p:cNvPr id="21" name="TextBox 20">
+                <a:extLst>
+                  <a:ext uri="{FF2B5EF4-FFF2-40B4-BE49-F238E27FC236}">
+                    <a16:creationId xmlns:a16="http://schemas.microsoft.com/office/drawing/2014/main" id="{42677E59-BFE2-AEB2-64DF-C2104BA3EA63}"/>
+                  </a:ext>
+                </a:extLst>
+              </p:cNvPr>
+              <p:cNvSpPr txBox="1"/>
+              <p:nvPr/>
+            </p:nvSpPr>
+            <p:spPr>
+              <a:xfrm>
+                <a:off x="566057" y="3578531"/>
+                <a:ext cx="3406092" cy="523220"/>
+              </a:xfrm>
+              <a:prstGeom prst="rect">
+                <a:avLst/>
+              </a:prstGeom>
+              <a:noFill/>
+            </p:spPr>
+            <p:txBody>
+              <a:bodyPr wrap="square" rtlCol="0">
+                <a:spAutoFit/>
+              </a:bodyPr>
+              <a:lstStyle/>
+              <a:p>
+                <a:pPr algn="l"/>
+                <a:r>
+                  <a:rPr lang="de-DE" sz="1400" dirty="0"/>
+                  <a:t>3. Fehlersignal bei jedem Hidden Layer</a:t>
+                </a:r>
+              </a:p>
+              <a:p>
+                <a:pPr algn="l"/>
+                <a:r>
+                  <a:rPr lang="de-DE" sz="1400" dirty="0"/>
+                  <a:t> </a:t>
+                </a:r>
+                <a14:m>
+                  <m:oMath xmlns:m="http://schemas.openxmlformats.org/officeDocument/2006/math">
+                    <m:r>
+                      <a:rPr lang="de-DE" sz="1400" b="0" i="1" smtClean="0">
+                        <a:latin typeface="Cambria Math" panose="02040503050406030204" pitchFamily="18" charset="0"/>
+                      </a:rPr>
+                      <m:t>𝑙</m:t>
+                    </m:r>
+                    <m:r>
+                      <a:rPr lang="de-DE" sz="1400" b="0" i="1" smtClean="0">
+                        <a:latin typeface="Cambria Math" panose="02040503050406030204" pitchFamily="18" charset="0"/>
+                      </a:rPr>
+                      <m:t>=</m:t>
+                    </m:r>
+                    <m:d>
+                      <m:dPr>
+                        <m:ctrlPr>
+                          <a:rPr lang="de-DE" sz="1400" b="0" i="1" smtClean="0">
+                            <a:latin typeface="Cambria Math" panose="02040503050406030204" pitchFamily="18" charset="0"/>
+                          </a:rPr>
+                        </m:ctrlPr>
+                      </m:dPr>
+                      <m:e>
+                        <m:r>
+                          <a:rPr lang="de-DE" sz="1400" b="0" i="1" smtClean="0">
+                            <a:latin typeface="Cambria Math" panose="02040503050406030204" pitchFamily="18" charset="0"/>
+                          </a:rPr>
+                          <m:t>𝐿</m:t>
+                        </m:r>
+                        <m:r>
+                          <a:rPr lang="de-DE" sz="1400" b="0" i="1" smtClean="0">
+                            <a:latin typeface="Cambria Math" panose="02040503050406030204" pitchFamily="18" charset="0"/>
+                          </a:rPr>
+                          <m:t>−1</m:t>
+                        </m:r>
+                      </m:e>
+                    </m:d>
+                    <m:r>
+                      <a:rPr lang="de-DE" sz="1400" b="0" i="1" smtClean="0">
+                        <a:latin typeface="Cambria Math" panose="02040503050406030204" pitchFamily="18" charset="0"/>
+                      </a:rPr>
+                      <m:t>, </m:t>
+                    </m:r>
+                    <m:d>
+                      <m:dPr>
+                        <m:ctrlPr>
+                          <a:rPr lang="de-DE" sz="1400" b="0" i="1" smtClean="0">
+                            <a:latin typeface="Cambria Math" panose="02040503050406030204" pitchFamily="18" charset="0"/>
+                          </a:rPr>
+                        </m:ctrlPr>
+                      </m:dPr>
+                      <m:e>
+                        <m:r>
+                          <a:rPr lang="de-DE" sz="1400" b="0" i="1" smtClean="0">
+                            <a:latin typeface="Cambria Math" panose="02040503050406030204" pitchFamily="18" charset="0"/>
+                          </a:rPr>
+                          <m:t>𝐿</m:t>
+                        </m:r>
+                        <m:r>
+                          <a:rPr lang="de-DE" sz="1400" b="0" i="1" smtClean="0">
+                            <a:latin typeface="Cambria Math" panose="02040503050406030204" pitchFamily="18" charset="0"/>
+                          </a:rPr>
+                          <m:t>−2</m:t>
+                        </m:r>
+                      </m:e>
+                    </m:d>
+                    <m:r>
+                      <a:rPr lang="de-DE" sz="1400" b="0" i="1" smtClean="0">
+                        <a:latin typeface="Cambria Math" panose="02040503050406030204" pitchFamily="18" charset="0"/>
+                      </a:rPr>
+                      <m:t>, …, 1</m:t>
+                    </m:r>
+                  </m:oMath>
+                </a14:m>
+                <a:endParaRPr lang="de-DE" sz="1400" dirty="0"/>
+              </a:p>
+            </p:txBody>
+          </p:sp>
+        </mc:Choice>
+        <mc:Fallback>
+          <p:sp>
+            <p:nvSpPr>
+              <p:cNvPr id="21" name="TextBox 20">
+                <a:extLst>
+                  <a:ext uri="{FF2B5EF4-FFF2-40B4-BE49-F238E27FC236}">
+                    <a16:creationId xmlns:a16="http://schemas.microsoft.com/office/drawing/2014/main" id="{42677E59-BFE2-AEB2-64DF-C2104BA3EA63}"/>
+                  </a:ext>
+                </a:extLst>
+              </p:cNvPr>
+              <p:cNvSpPr txBox="1">
+                <a:spLocks noRot="1" noChangeAspect="1" noMove="1" noResize="1" noEditPoints="1" noAdjustHandles="1" noChangeArrowheads="1" noChangeShapeType="1" noTextEdit="1"/>
+              </p:cNvSpPr>
+              <p:nvPr/>
+            </p:nvSpPr>
+            <p:spPr>
+              <a:xfrm>
+                <a:off x="566057" y="3578531"/>
+                <a:ext cx="3406092" cy="523220"/>
+              </a:xfrm>
+              <a:prstGeom prst="rect">
+                <a:avLst/>
+              </a:prstGeom>
+              <a:blipFill>
+                <a:blip r:embed="rId8"/>
+                <a:stretch>
+                  <a:fillRect l="-537" t="-2326"/>
+                </a:stretch>
+              </a:blipFill>
+            </p:spPr>
+            <p:txBody>
+              <a:bodyPr/>
+              <a:lstStyle/>
+              <a:p>
+                <a:r>
+                  <a:rPr lang="de-DE">
+                    <a:noFill/>
+                  </a:rPr>
+                  <a:t> </a:t>
+                </a:r>
+              </a:p>
+            </p:txBody>
+          </p:sp>
+        </mc:Fallback>
+      </mc:AlternateContent>
+      <mc:AlternateContent xmlns:mc="http://schemas.openxmlformats.org/markup-compatibility/2006">
+        <mc:Choice xmlns:a14="http://schemas.microsoft.com/office/drawing/2010/main" Requires="a14">
+          <p:sp>
+            <p:nvSpPr>
+              <p:cNvPr id="22" name="TextBox 21">
+                <a:extLst>
+                  <a:ext uri="{FF2B5EF4-FFF2-40B4-BE49-F238E27FC236}">
+                    <a16:creationId xmlns:a16="http://schemas.microsoft.com/office/drawing/2014/main" id="{EE1ACD2D-9CC3-D8DF-49EE-C773B3DB0CC3}"/>
+                  </a:ext>
+                </a:extLst>
+              </p:cNvPr>
+              <p:cNvSpPr txBox="1"/>
+              <p:nvPr/>
+            </p:nvSpPr>
+            <p:spPr>
+              <a:xfrm>
+                <a:off x="668977" y="4421579"/>
+                <a:ext cx="3760519" cy="523220"/>
+              </a:xfrm>
+              <a:prstGeom prst="rect">
+                <a:avLst/>
+              </a:prstGeom>
+              <a:noFill/>
+            </p:spPr>
+            <p:txBody>
+              <a:bodyPr wrap="square" rtlCol="0">
+                <a:spAutoFit/>
+              </a:bodyPr>
+              <a:lstStyle/>
+              <a:p>
+                <a:pPr algn="l"/>
+                <a:r>
+                  <a:rPr lang="de-DE" sz="1400" dirty="0"/>
+                  <a:t>4. Gradienten bei jedem Hidden Layer</a:t>
+                </a:r>
+              </a:p>
+              <a:p>
+                <a:pPr algn="l"/>
+                <a:r>
+                  <a:rPr lang="de-DE" sz="1400" dirty="0"/>
+                  <a:t> </a:t>
+                </a:r>
+                <a14:m>
+                  <m:oMath xmlns:m="http://schemas.openxmlformats.org/officeDocument/2006/math">
+                    <m:r>
+                      <a:rPr lang="de-DE" sz="1400" b="0" i="1" smtClean="0">
+                        <a:latin typeface="Cambria Math" panose="02040503050406030204" pitchFamily="18" charset="0"/>
+                      </a:rPr>
+                      <m:t>𝑙</m:t>
+                    </m:r>
+                    <m:r>
+                      <a:rPr lang="de-DE" sz="1400" b="0" i="1" smtClean="0">
+                        <a:latin typeface="Cambria Math" panose="02040503050406030204" pitchFamily="18" charset="0"/>
+                      </a:rPr>
+                      <m:t>=</m:t>
+                    </m:r>
+                    <m:d>
+                      <m:dPr>
+                        <m:ctrlPr>
+                          <a:rPr lang="de-DE" sz="1400" b="0" i="1" smtClean="0">
+                            <a:latin typeface="Cambria Math" panose="02040503050406030204" pitchFamily="18" charset="0"/>
+                          </a:rPr>
+                        </m:ctrlPr>
+                      </m:dPr>
+                      <m:e>
+                        <m:r>
+                          <a:rPr lang="de-DE" sz="1400" b="0" i="1" smtClean="0">
+                            <a:latin typeface="Cambria Math" panose="02040503050406030204" pitchFamily="18" charset="0"/>
+                          </a:rPr>
+                          <m:t>𝐿</m:t>
+                        </m:r>
+                        <m:r>
+                          <a:rPr lang="de-DE" sz="1400" b="0" i="1" smtClean="0">
+                            <a:latin typeface="Cambria Math" panose="02040503050406030204" pitchFamily="18" charset="0"/>
+                          </a:rPr>
+                          <m:t>−1</m:t>
+                        </m:r>
+                      </m:e>
+                    </m:d>
+                    <m:r>
+                      <a:rPr lang="de-DE" sz="1400" b="0" i="1" smtClean="0">
+                        <a:latin typeface="Cambria Math" panose="02040503050406030204" pitchFamily="18" charset="0"/>
+                      </a:rPr>
+                      <m:t>, </m:t>
+                    </m:r>
+                    <m:d>
+                      <m:dPr>
+                        <m:ctrlPr>
+                          <a:rPr lang="de-DE" sz="1400" b="0" i="1" smtClean="0">
+                            <a:latin typeface="Cambria Math" panose="02040503050406030204" pitchFamily="18" charset="0"/>
+                          </a:rPr>
+                        </m:ctrlPr>
+                      </m:dPr>
+                      <m:e>
+                        <m:r>
+                          <a:rPr lang="de-DE" sz="1400" b="0" i="1" smtClean="0">
+                            <a:latin typeface="Cambria Math" panose="02040503050406030204" pitchFamily="18" charset="0"/>
+                          </a:rPr>
+                          <m:t>𝐿</m:t>
+                        </m:r>
+                        <m:r>
+                          <a:rPr lang="de-DE" sz="1400" b="0" i="1" smtClean="0">
+                            <a:latin typeface="Cambria Math" panose="02040503050406030204" pitchFamily="18" charset="0"/>
+                          </a:rPr>
+                          <m:t>−2</m:t>
+                        </m:r>
+                      </m:e>
+                    </m:d>
+                    <m:r>
+                      <a:rPr lang="de-DE" sz="1400" b="0" i="1" smtClean="0">
+                        <a:latin typeface="Cambria Math" panose="02040503050406030204" pitchFamily="18" charset="0"/>
+                      </a:rPr>
+                      <m:t>, …, 1</m:t>
+                    </m:r>
+                  </m:oMath>
+                </a14:m>
+                <a:endParaRPr lang="de-DE" sz="1400" dirty="0"/>
+              </a:p>
+            </p:txBody>
+          </p:sp>
+        </mc:Choice>
+        <mc:Fallback>
+          <p:sp>
+            <p:nvSpPr>
+              <p:cNvPr id="22" name="TextBox 21">
+                <a:extLst>
+                  <a:ext uri="{FF2B5EF4-FFF2-40B4-BE49-F238E27FC236}">
+                    <a16:creationId xmlns:a16="http://schemas.microsoft.com/office/drawing/2014/main" id="{EE1ACD2D-9CC3-D8DF-49EE-C773B3DB0CC3}"/>
+                  </a:ext>
+                </a:extLst>
+              </p:cNvPr>
+              <p:cNvSpPr txBox="1">
+                <a:spLocks noRot="1" noChangeAspect="1" noMove="1" noResize="1" noEditPoints="1" noAdjustHandles="1" noChangeArrowheads="1" noChangeShapeType="1" noTextEdit="1"/>
+              </p:cNvSpPr>
+              <p:nvPr/>
+            </p:nvSpPr>
+            <p:spPr>
+              <a:xfrm>
+                <a:off x="668977" y="4421579"/>
+                <a:ext cx="3760519" cy="523220"/>
+              </a:xfrm>
+              <a:prstGeom prst="rect">
+                <a:avLst/>
+              </a:prstGeom>
+              <a:blipFill>
+                <a:blip r:embed="rId9"/>
+                <a:stretch>
+                  <a:fillRect l="-486" t="-1163"/>
+                </a:stretch>
+              </a:blipFill>
+            </p:spPr>
+            <p:txBody>
+              <a:bodyPr/>
+              <a:lstStyle/>
+              <a:p>
+                <a:r>
+                  <a:rPr lang="de-DE">
+                    <a:noFill/>
+                  </a:rPr>
+                  <a:t> </a:t>
+                </a:r>
+              </a:p>
+            </p:txBody>
+          </p:sp>
+        </mc:Fallback>
+      </mc:AlternateContent>
+      <p:sp>
+        <p:nvSpPr>
+          <p:cNvPr id="23" name="TextBox 22">
+            <a:extLst>
+              <a:ext uri="{FF2B5EF4-FFF2-40B4-BE49-F238E27FC236}">
+                <a16:creationId xmlns:a16="http://schemas.microsoft.com/office/drawing/2014/main" id="{36FF1B49-A230-4FEA-27B9-0B64D2AAAA56}"/>
+              </a:ext>
+            </a:extLst>
+          </p:cNvPr>
+          <p:cNvSpPr txBox="1"/>
+          <p:nvPr/>
+        </p:nvSpPr>
+        <p:spPr>
+          <a:xfrm>
+            <a:off x="736270" y="5423065"/>
+            <a:ext cx="3863439" cy="307777"/>
+          </a:xfrm>
+          <a:prstGeom prst="rect">
+            <a:avLst/>
+          </a:prstGeom>
+          <a:noFill/>
+        </p:spPr>
+        <p:txBody>
+          <a:bodyPr wrap="square" rtlCol="0">
+            <a:spAutoFit/>
+          </a:bodyPr>
+          <a:lstStyle/>
+          <a:p>
+            <a:pPr algn="l"/>
+            <a:r>
+              <a:rPr lang="de-DE" sz="1400" dirty="0"/>
+              <a:t>5. Parameter Updates</a:t>
+            </a:r>
+          </a:p>
+        </p:txBody>
+      </p:sp>
+      <p:pic>
+        <p:nvPicPr>
+          <p:cNvPr id="24" name="Picture 23">
+            <a:extLst>
+              <a:ext uri="{FF2B5EF4-FFF2-40B4-BE49-F238E27FC236}">
+                <a16:creationId xmlns:a16="http://schemas.microsoft.com/office/drawing/2014/main" id="{F0C95B2F-8929-E42F-964E-6391E22D4817}"/>
+              </a:ext>
+            </a:extLst>
+          </p:cNvPr>
+          <p:cNvPicPr>
+            <a:picLocks noChangeAspect="1"/>
+          </p:cNvPicPr>
+          <p:nvPr/>
+        </p:nvPicPr>
+        <p:blipFill>
+          <a:blip r:embed="rId10"/>
+          <a:stretch>
+            <a:fillRect/>
+          </a:stretch>
+        </p:blipFill>
+        <p:spPr>
+          <a:xfrm>
+            <a:off x="3807023" y="3630876"/>
+            <a:ext cx="470095" cy="270305"/>
+          </a:xfrm>
+          <a:prstGeom prst="rect">
+            <a:avLst/>
+          </a:prstGeom>
+        </p:spPr>
+      </p:pic>
     </p:spTree>
     <p:extLst>
       <p:ext uri="{BB962C8B-B14F-4D97-AF65-F5344CB8AC3E}">
@@ -10681,6 +11453,84 @@
   <p:clrMapOvr>
     <a:masterClrMapping/>
   </p:clrMapOvr>
+  <p:timing>
+    <p:tnLst>
+      <p:par>
+        <p:cTn id="1" dur="indefinite" restart="never" nodeType="tmRoot">
+          <p:childTnLst>
+            <p:seq concurrent="1" nextAc="seek">
+              <p:cTn id="2" dur="indefinite" nodeType="mainSeq">
+                <p:childTnLst>
+                  <p:par>
+                    <p:cTn id="3" fill="hold">
+                      <p:stCondLst>
+                        <p:cond delay="indefinite"/>
+                        <p:cond evt="onBegin" delay="0">
+                          <p:tn val="2"/>
+                        </p:cond>
+                      </p:stCondLst>
+                      <p:childTnLst>
+                        <p:par>
+                          <p:cTn id="4" fill="hold">
+                            <p:stCondLst>
+                              <p:cond delay="0"/>
+                            </p:stCondLst>
+                            <p:childTnLst>
+                              <p:par>
+                                <p:cTn id="5" presetID="1" presetClass="entr" presetSubtype="0" fill="hold" nodeType="withEffect">
+                                  <p:stCondLst>
+                                    <p:cond delay="0"/>
+                                  </p:stCondLst>
+                                  <p:childTnLst>
+                                    <p:set>
+                                      <p:cBhvr>
+                                        <p:cTn id="6" dur="1" fill="hold">
+                                          <p:stCondLst>
+                                            <p:cond delay="0"/>
+                                          </p:stCondLst>
+                                        </p:cTn>
+                                        <p:tgtEl>
+                                          <p:spTgt spid="24"/>
+                                        </p:tgtEl>
+                                        <p:attrNameLst>
+                                          <p:attrName>style.visibility</p:attrName>
+                                        </p:attrNameLst>
+                                      </p:cBhvr>
+                                      <p:to>
+                                        <p:strVal val="visible"/>
+                                      </p:to>
+                                    </p:set>
+                                  </p:childTnLst>
+                                </p:cTn>
+                              </p:par>
+                            </p:childTnLst>
+                          </p:cTn>
+                        </p:par>
+                      </p:childTnLst>
+                    </p:cTn>
+                  </p:par>
+                </p:childTnLst>
+              </p:cTn>
+              <p:prevCondLst>
+                <p:cond evt="onPrev" delay="0">
+                  <p:tgtEl>
+                    <p:sldTgt/>
+                  </p:tgtEl>
+                </p:cond>
+              </p:prevCondLst>
+              <p:nextCondLst>
+                <p:cond evt="onNext" delay="0">
+                  <p:tgtEl>
+                    <p:sldTgt/>
+                  </p:tgtEl>
+                </p:cond>
+              </p:nextCondLst>
+            </p:seq>
+          </p:childTnLst>
+        </p:cTn>
+      </p:par>
+    </p:tnLst>
+  </p:timing>
 </p:sld>
 </file>
 
@@ -10962,7 +11812,7 @@
             <a:pPr lvl="1"/>
             <a:r>
               <a:rPr lang="de-DE" dirty="0"/>
-              <a:t>Backpropagation Algorithmus</a:t>
+              <a:t>Lern-Algorithmus</a:t>
             </a:r>
           </a:p>
           <a:p>

</xml_diff>

<commit_message>
- added improvement suggestions - added numerical stability amendments
</commit_message>
<xml_diff>
--- a/theory/submission/result_presentation.pptx
+++ b/theory/submission/result_presentation.pptx
@@ -5,7 +5,7 @@
     <p:sldMasterId id="2147483648" r:id="rId1"/>
   </p:sldMasterIdLst>
   <p:notesMasterIdLst>
-    <p:notesMasterId r:id="rId21"/>
+    <p:notesMasterId r:id="rId24"/>
   </p:notesMasterIdLst>
   <p:sldIdLst>
     <p:sldId id="256" r:id="rId2"/>
@@ -27,6 +27,9 @@
     <p:sldId id="276" r:id="rId18"/>
     <p:sldId id="282" r:id="rId19"/>
     <p:sldId id="274" r:id="rId20"/>
+    <p:sldId id="283" r:id="rId21"/>
+    <p:sldId id="284" r:id="rId22"/>
+    <p:sldId id="285" r:id="rId23"/>
   </p:sldIdLst>
   <p:sldSz cx="12192000" cy="6858000"/>
   <p:notesSz cx="6858000" cy="9144000"/>
@@ -825,7 +828,7 @@
               <a:t>S = Anzahl an Batches = Anzahl an Gradient Descent </a:t>
             </a:r>
             <a:r>
-              <a:rPr lang="de-DE"/>
+              <a:rPr lang="de-DE" dirty="0" err="1"/>
               <a:t>Stjeps</a:t>
             </a:r>
             <a:endParaRPr lang="de-DE" dirty="0"/>
@@ -859,6 +862,118 @@
     <p:extLst>
       <p:ext uri="{BB962C8B-B14F-4D97-AF65-F5344CB8AC3E}">
         <p14:creationId xmlns:p14="http://schemas.microsoft.com/office/powerpoint/2010/main" val="708119455"/>
+      </p:ext>
+    </p:extLst>
+  </p:cSld>
+  <p:clrMapOvr>
+    <a:masterClrMapping/>
+  </p:clrMapOvr>
+</p:notes>
+</file>
+
+<file path=ppt/notesSlides/notesSlide13.xml><?xml version="1.0" encoding="utf-8"?>
+<p:notes xmlns:a="http://schemas.openxmlformats.org/drawingml/2006/main" xmlns:r="http://schemas.openxmlformats.org/officeDocument/2006/relationships" xmlns:p="http://schemas.openxmlformats.org/presentationml/2006/main">
+  <p:cSld>
+    <p:spTree>
+      <p:nvGrpSpPr>
+        <p:cNvPr id="1" name=""/>
+        <p:cNvGrpSpPr/>
+        <p:nvPr/>
+      </p:nvGrpSpPr>
+      <p:grpSpPr>
+        <a:xfrm>
+          <a:off x="0" y="0"/>
+          <a:ext cx="0" cy="0"/>
+          <a:chOff x="0" y="0"/>
+          <a:chExt cx="0" cy="0"/>
+        </a:xfrm>
+      </p:grpSpPr>
+      <p:sp>
+        <p:nvSpPr>
+          <p:cNvPr id="2" name="Slide Image Placeholder 1"/>
+          <p:cNvSpPr>
+            <a:spLocks noGrp="1" noRot="1" noChangeAspect="1"/>
+          </p:cNvSpPr>
+          <p:nvPr>
+            <p:ph type="sldImg"/>
+          </p:nvPr>
+        </p:nvSpPr>
+        <p:spPr/>
+      </p:sp>
+      <p:sp>
+        <p:nvSpPr>
+          <p:cNvPr id="3" name="Notes Placeholder 2"/>
+          <p:cNvSpPr>
+            <a:spLocks noGrp="1"/>
+          </p:cNvSpPr>
+          <p:nvPr>
+            <p:ph type="body" idx="1"/>
+          </p:nvPr>
+        </p:nvSpPr>
+        <p:spPr/>
+        <p:txBody>
+          <a:bodyPr/>
+          <a:lstStyle/>
+          <a:p>
+            <a:pPr marL="171450" indent="-171450">
+              <a:buFont typeface="Arial" panose="020B0604020202020204" pitchFamily="34" charset="0"/>
+              <a:buChar char="•"/>
+            </a:pPr>
+            <a:r>
+              <a:rPr lang="de-DE" dirty="0"/>
+              <a:t>Stochastic Gradient Descent mit Momentum heißt, dass die aktuellen Gradienten ein </a:t>
+            </a:r>
+            <a:r>
+              <a:rPr lang="de-DE" dirty="0" err="1"/>
+              <a:t>Exponential</a:t>
+            </a:r>
+            <a:r>
+              <a:rPr lang="de-DE" dirty="0"/>
+              <a:t> Moving Average aller bisherigen Gradienten ist </a:t>
+            </a:r>
+            <a:r>
+              <a:rPr lang="de-DE" dirty="0">
+                <a:sym typeface="Wingdings" panose="05000000000000000000" pitchFamily="2" charset="2"/>
+              </a:rPr>
+              <a:t> Glätten der Gradienten um „direkter“ zum lokalen Minimum zu konvergieren</a:t>
+            </a:r>
+          </a:p>
+          <a:p>
+            <a:pPr marL="171450" indent="-171450">
+              <a:buFont typeface="Arial" panose="020B0604020202020204" pitchFamily="34" charset="0"/>
+              <a:buChar char="•"/>
+            </a:pPr>
+            <a:endParaRPr lang="de-DE" dirty="0"/>
+          </a:p>
+        </p:txBody>
+      </p:sp>
+      <p:sp>
+        <p:nvSpPr>
+          <p:cNvPr id="4" name="Slide Number Placeholder 3"/>
+          <p:cNvSpPr>
+            <a:spLocks noGrp="1"/>
+          </p:cNvSpPr>
+          <p:nvPr>
+            <p:ph type="sldNum" sz="quarter" idx="5"/>
+          </p:nvPr>
+        </p:nvSpPr>
+        <p:spPr/>
+        <p:txBody>
+          <a:bodyPr/>
+          <a:lstStyle/>
+          <a:p>
+            <a:fld id="{D4C12A24-BF94-4906-B274-F5BF4D611E23}" type="slidenum">
+              <a:rPr lang="de-DE" smtClean="0"/>
+              <a:t>22</a:t>
+            </a:fld>
+            <a:endParaRPr lang="de-DE"/>
+          </a:p>
+        </p:txBody>
+      </p:sp>
+    </p:spTree>
+    <p:extLst>
+      <p:ext uri="{BB962C8B-B14F-4D97-AF65-F5344CB8AC3E}">
+        <p14:creationId xmlns:p14="http://schemas.microsoft.com/office/powerpoint/2010/main" val="655830409"/>
       </p:ext>
     </p:extLst>
   </p:cSld>
@@ -13368,7 +13483,7 @@
             </p:nvSpPr>
             <p:spPr>
               <a:xfrm>
-                <a:off x="407951" y="2194042"/>
+                <a:off x="981885" y="2194042"/>
                 <a:ext cx="3205875" cy="523220"/>
               </a:xfrm>
               <a:prstGeom prst="rect">
@@ -13473,7 +13588,7 @@
             </p:nvSpPr>
             <p:spPr>
               <a:xfrm>
-                <a:off x="407951" y="2194042"/>
+                <a:off x="981885" y="2194042"/>
                 <a:ext cx="3205875" cy="523220"/>
               </a:xfrm>
               <a:prstGeom prst="rect">
@@ -13517,7 +13632,7 @@
             </p:nvSpPr>
             <p:spPr>
               <a:xfrm>
-                <a:off x="407952" y="5197503"/>
+                <a:off x="981886" y="5197503"/>
                 <a:ext cx="3171827" cy="523220"/>
               </a:xfrm>
               <a:prstGeom prst="rect">
@@ -13622,7 +13737,7 @@
             </p:nvSpPr>
             <p:spPr>
               <a:xfrm>
-                <a:off x="407952" y="5197503"/>
+                <a:off x="981886" y="5197503"/>
                 <a:ext cx="3171827" cy="523220"/>
               </a:xfrm>
               <a:prstGeom prst="rect">
@@ -13671,7 +13786,7 @@
         </p:blipFill>
         <p:spPr>
           <a:xfrm>
-            <a:off x="4078758" y="2144063"/>
+            <a:off x="4652692" y="2144063"/>
             <a:ext cx="1940667" cy="623178"/>
           </a:xfrm>
           <a:prstGeom prst="rect">
@@ -13700,7 +13815,7 @@
         </p:blipFill>
         <p:spPr>
           <a:xfrm>
-            <a:off x="6162471" y="1864291"/>
+            <a:off x="6736405" y="1864291"/>
             <a:ext cx="3035029" cy="1182722"/>
           </a:xfrm>
           <a:prstGeom prst="rect">
@@ -13724,7 +13839,7 @@
             </p:nvSpPr>
             <p:spPr>
               <a:xfrm>
-                <a:off x="407951" y="3674088"/>
+                <a:off x="981885" y="3674088"/>
                 <a:ext cx="2977275" cy="523220"/>
               </a:xfrm>
               <a:prstGeom prst="rect">
@@ -13829,7 +13944,7 @@
             </p:nvSpPr>
             <p:spPr>
               <a:xfrm>
-                <a:off x="407951" y="3674088"/>
+                <a:off x="981885" y="3674088"/>
                 <a:ext cx="2977275" cy="523220"/>
               </a:xfrm>
               <a:prstGeom prst="rect">
@@ -13878,7 +13993,7 @@
         </p:blipFill>
         <p:spPr>
           <a:xfrm>
-            <a:off x="4078758" y="3638557"/>
+            <a:off x="4652692" y="3638557"/>
             <a:ext cx="1712070" cy="594283"/>
           </a:xfrm>
           <a:prstGeom prst="rect">
@@ -13907,7 +14022,7 @@
         </p:blipFill>
         <p:spPr>
           <a:xfrm>
-            <a:off x="5907119" y="3680347"/>
+            <a:off x="6481053" y="3680347"/>
             <a:ext cx="564202" cy="510702"/>
           </a:xfrm>
           <a:prstGeom prst="rect">
@@ -13936,7 +14051,7 @@
         </p:blipFill>
         <p:spPr>
           <a:xfrm>
-            <a:off x="4078758" y="5088222"/>
+            <a:off x="4652692" y="5088222"/>
             <a:ext cx="2968931" cy="741782"/>
           </a:xfrm>
           <a:prstGeom prst="rect">
@@ -13965,7 +14080,7 @@
         </p:blipFill>
         <p:spPr>
           <a:xfrm>
-            <a:off x="7631349" y="5079191"/>
+            <a:off x="8205283" y="5079191"/>
             <a:ext cx="2607012" cy="759844"/>
           </a:xfrm>
           <a:prstGeom prst="rect">
@@ -14360,6 +14475,14 @@
               <a:rPr lang="de-DE" dirty="0"/>
               <a:t>Implementierung in Python</a:t>
             </a:r>
+            <a:br>
+              <a:rPr lang="de-DE" dirty="0"/>
+            </a:br>
+            <a:r>
+              <a:rPr lang="de-DE" sz="2400" dirty="0"/>
+              <a:t>Demoanwendung</a:t>
+            </a:r>
+            <a:endParaRPr lang="de-DE" dirty="0"/>
           </a:p>
         </p:txBody>
       </p:sp>
@@ -14389,98 +14512,6 @@
                 <a:hlinkClick r:id="rId2"/>
               </a:rPr>
               <a:t>Beispielanwendung MNIST Digit Classification</a:t>
-            </a:r>
-            <a:endParaRPr lang="de-DE" dirty="0"/>
-          </a:p>
-          <a:p>
-            <a:r>
-              <a:rPr lang="de-DE" dirty="0"/>
-              <a:t>Aufbau von </a:t>
-            </a:r>
-            <a:r>
-              <a:rPr lang="de-DE" dirty="0" err="1">
-                <a:hlinkClick r:id="rId3"/>
-              </a:rPr>
-              <a:t>src</a:t>
-            </a:r>
-            <a:r>
-              <a:rPr lang="de-DE" dirty="0">
-                <a:hlinkClick r:id="rId3"/>
-              </a:rPr>
-              <a:t>/</a:t>
-            </a:r>
-            <a:r>
-              <a:rPr lang="de-DE" dirty="0" err="1">
-                <a:hlinkClick r:id="rId3"/>
-              </a:rPr>
-              <a:t>lib</a:t>
-            </a:r>
-            <a:endParaRPr lang="de-DE" dirty="0"/>
-          </a:p>
-          <a:p>
-            <a:r>
-              <a:rPr lang="de-DE" dirty="0"/>
-              <a:t>Erklärung von </a:t>
-            </a:r>
-            <a:r>
-              <a:rPr lang="de-DE" dirty="0" err="1">
-                <a:hlinkClick r:id="rId2"/>
-              </a:rPr>
-              <a:t>SequentialModel</a:t>
-            </a:r>
-            <a:r>
-              <a:rPr lang="de-DE" dirty="0"/>
-              <a:t> Klasse</a:t>
-            </a:r>
-          </a:p>
-          <a:p>
-            <a:r>
-              <a:rPr lang="de-DE" dirty="0"/>
-              <a:t>Erklärung von </a:t>
-            </a:r>
-            <a:r>
-              <a:rPr lang="de-DE" dirty="0" err="1">
-                <a:hlinkClick r:id="rId4"/>
-              </a:rPr>
-              <a:t>Dense</a:t>
-            </a:r>
-            <a:r>
-              <a:rPr lang="de-DE" dirty="0">
-                <a:hlinkClick r:id="rId4"/>
-              </a:rPr>
-              <a:t> Layer</a:t>
-            </a:r>
-            <a:r>
-              <a:rPr lang="de-DE" dirty="0"/>
-              <a:t> Klasse</a:t>
-            </a:r>
-          </a:p>
-          <a:p>
-            <a:r>
-              <a:rPr lang="de-DE" dirty="0"/>
-              <a:t>Erklärung von </a:t>
-            </a:r>
-            <a:r>
-              <a:rPr lang="de-DE" dirty="0">
-                <a:hlinkClick r:id="rId5"/>
-              </a:rPr>
-              <a:t>Aktivierungsfunktionen</a:t>
-            </a:r>
-            <a:r>
-              <a:rPr lang="de-DE" dirty="0"/>
-              <a:t>, insbesondere die Anpassungen für numerische Stabilität </a:t>
-            </a:r>
-          </a:p>
-          <a:p>
-            <a:r>
-              <a:rPr lang="de-DE" dirty="0"/>
-              <a:t>Tests erklären, insbesondere </a:t>
-            </a:r>
-            <a:r>
-              <a:rPr lang="de-DE" dirty="0" err="1">
-                <a:hlinkClick r:id="rId6"/>
-              </a:rPr>
-              <a:t>test_model</a:t>
             </a:r>
             <a:endParaRPr lang="de-DE" dirty="0"/>
           </a:p>
@@ -14563,7 +14594,7 @@
         <p:spPr/>
         <p:txBody>
           <a:bodyPr>
-            <a:normAutofit lnSpcReduction="10000"/>
+            <a:normAutofit/>
           </a:bodyPr>
           <a:lstStyle/>
           <a:p>
@@ -14616,22 +14647,18 @@
             <a:pPr lvl="1"/>
             <a:r>
               <a:rPr lang="de-DE" dirty="0"/>
-              <a:t>Common </a:t>
-            </a:r>
-            <a:r>
-              <a:rPr lang="de-DE" dirty="0" err="1"/>
-              <a:t>Pitfalls</a:t>
-            </a:r>
-            <a:endParaRPr lang="de-DE" dirty="0"/>
+              <a:t>Backpropagation Tests</a:t>
+            </a:r>
           </a:p>
           <a:p>
             <a:pPr lvl="1"/>
             <a:r>
               <a:rPr lang="de-DE" dirty="0"/>
-              <a:t>Tipps &amp; Tricks</a:t>
-            </a:r>
-          </a:p>
-          <a:p>
+              <a:t>Numerische Stabilität in Aktivierungsfunktionen</a:t>
+            </a:r>
+          </a:p>
+          <a:p>
+            <a:pPr lvl="1"/>
             <a:r>
               <a:rPr lang="de-DE" dirty="0"/>
               <a:t>Verbesserungsmöglichkeiten</a:t>
@@ -14643,6 +14670,1496 @@
     <p:extLst>
       <p:ext uri="{BB962C8B-B14F-4D97-AF65-F5344CB8AC3E}">
         <p14:creationId xmlns:p14="http://schemas.microsoft.com/office/powerpoint/2010/main" val="2326574477"/>
+      </p:ext>
+    </p:extLst>
+  </p:cSld>
+  <p:clrMapOvr>
+    <a:masterClrMapping/>
+  </p:clrMapOvr>
+</p:sld>
+</file>
+
+<file path=ppt/slides/slide20.xml><?xml version="1.0" encoding="utf-8"?>
+<p:sld xmlns:a="http://schemas.openxmlformats.org/drawingml/2006/main" xmlns:r="http://schemas.openxmlformats.org/officeDocument/2006/relationships" xmlns:p="http://schemas.openxmlformats.org/presentationml/2006/main">
+  <p:cSld>
+    <p:spTree>
+      <p:nvGrpSpPr>
+        <p:cNvPr id="1" name=""/>
+        <p:cNvGrpSpPr/>
+        <p:nvPr/>
+      </p:nvGrpSpPr>
+      <p:grpSpPr>
+        <a:xfrm>
+          <a:off x="0" y="0"/>
+          <a:ext cx="0" cy="0"/>
+          <a:chOff x="0" y="0"/>
+          <a:chExt cx="0" cy="0"/>
+        </a:xfrm>
+      </p:grpSpPr>
+      <p:sp>
+        <p:nvSpPr>
+          <p:cNvPr id="2" name="Titel 1">
+            <a:extLst>
+              <a:ext uri="{FF2B5EF4-FFF2-40B4-BE49-F238E27FC236}">
+                <a16:creationId xmlns:a16="http://schemas.microsoft.com/office/drawing/2014/main" id="{29FA37A3-FF5A-44AB-8DF3-1148A58E43F7}"/>
+              </a:ext>
+            </a:extLst>
+          </p:cNvPr>
+          <p:cNvSpPr>
+            <a:spLocks noGrp="1"/>
+          </p:cNvSpPr>
+          <p:nvPr>
+            <p:ph type="title"/>
+          </p:nvPr>
+        </p:nvSpPr>
+        <p:spPr/>
+        <p:txBody>
+          <a:bodyPr/>
+          <a:lstStyle/>
+          <a:p>
+            <a:r>
+              <a:rPr lang="de-DE" dirty="0"/>
+              <a:t>Implementierung in Python</a:t>
+            </a:r>
+            <a:br>
+              <a:rPr lang="de-DE" dirty="0"/>
+            </a:br>
+            <a:r>
+              <a:rPr lang="de-DE" sz="2400" dirty="0"/>
+              <a:t>Backpropagation Test</a:t>
+            </a:r>
+            <a:endParaRPr lang="de-DE" dirty="0"/>
+          </a:p>
+        </p:txBody>
+      </p:sp>
+      <p:sp>
+        <p:nvSpPr>
+          <p:cNvPr id="3" name="Inhaltsplatzhalter 2">
+            <a:extLst>
+              <a:ext uri="{FF2B5EF4-FFF2-40B4-BE49-F238E27FC236}">
+                <a16:creationId xmlns:a16="http://schemas.microsoft.com/office/drawing/2014/main" id="{D2D4F1E2-9CD7-4555-B49C-3581844978A5}"/>
+              </a:ext>
+            </a:extLst>
+          </p:cNvPr>
+          <p:cNvSpPr>
+            <a:spLocks noGrp="1"/>
+          </p:cNvSpPr>
+          <p:nvPr>
+            <p:ph idx="1"/>
+          </p:nvPr>
+        </p:nvSpPr>
+        <p:spPr>
+          <a:xfrm>
+            <a:off x="838200" y="1825625"/>
+            <a:ext cx="3814823" cy="4351338"/>
+          </a:xfrm>
+        </p:spPr>
+        <p:txBody>
+          <a:bodyPr>
+            <a:normAutofit/>
+          </a:bodyPr>
+          <a:lstStyle/>
+          <a:p>
+            <a:r>
+              <a:rPr lang="de-DE" sz="1800" dirty="0"/>
+              <a:t>Tests, dass der Backpropagation Algorithmus die partiellen Ableitungen richtig berechnet (</a:t>
+            </a:r>
+            <a:r>
+              <a:rPr lang="de-DE" sz="1800" dirty="0" err="1">
+                <a:hlinkClick r:id="rId2"/>
+              </a:rPr>
+              <a:t>test_model</a:t>
+            </a:r>
+            <a:r>
+              <a:rPr lang="de-DE" sz="1800" dirty="0"/>
+              <a:t>)</a:t>
+            </a:r>
+          </a:p>
+          <a:p>
+            <a:r>
+              <a:rPr lang="de-DE" sz="1800" dirty="0"/>
+              <a:t>Beispielnetzwerk mit folgender Architektur:</a:t>
+            </a:r>
+          </a:p>
+          <a:p>
+            <a:pPr lvl="1"/>
+            <a:r>
+              <a:rPr lang="de-DE" sz="1100" dirty="0"/>
+              <a:t>3 Input Neuronen</a:t>
+            </a:r>
+          </a:p>
+          <a:p>
+            <a:pPr lvl="1"/>
+            <a:r>
+              <a:rPr lang="de-DE" sz="1100" dirty="0"/>
+              <a:t>2 Neuronen im Hidden Layer</a:t>
+            </a:r>
+          </a:p>
+          <a:p>
+            <a:pPr lvl="1"/>
+            <a:r>
+              <a:rPr lang="de-DE" sz="1100" dirty="0"/>
+              <a:t>2 Neuronen im Output Layer</a:t>
+            </a:r>
+            <a:endParaRPr lang="de-DE" sz="1800" dirty="0"/>
+          </a:p>
+          <a:p>
+            <a:r>
+              <a:rPr lang="de-DE" sz="1800" dirty="0"/>
+              <a:t>Zufällig initialisierte Eingangsneuronen</a:t>
+            </a:r>
+          </a:p>
+          <a:p>
+            <a:r>
+              <a:rPr lang="de-DE" sz="1800" dirty="0"/>
+              <a:t>Gradienten manuell ausgerechnet und mit Backpropagation Ergebnissen verglichen</a:t>
+            </a:r>
+          </a:p>
+        </p:txBody>
+      </p:sp>
+      <p:pic>
+        <p:nvPicPr>
+          <p:cNvPr id="5" name="Picture 4">
+            <a:extLst>
+              <a:ext uri="{FF2B5EF4-FFF2-40B4-BE49-F238E27FC236}">
+                <a16:creationId xmlns:a16="http://schemas.microsoft.com/office/drawing/2014/main" id="{87FC3623-B834-C5F1-36F4-29CBA7552723}"/>
+              </a:ext>
+            </a:extLst>
+          </p:cNvPr>
+          <p:cNvPicPr>
+            <a:picLocks noChangeAspect="1"/>
+          </p:cNvPicPr>
+          <p:nvPr/>
+        </p:nvPicPr>
+        <p:blipFill rotWithShape="1">
+          <a:blip r:embed="rId3"/>
+          <a:srcRect l="5051" b="10062"/>
+          <a:stretch/>
+        </p:blipFill>
+        <p:spPr>
+          <a:xfrm>
+            <a:off x="5399523" y="1760138"/>
+            <a:ext cx="2803606" cy="925190"/>
+          </a:xfrm>
+          <a:prstGeom prst="rect">
+            <a:avLst/>
+          </a:prstGeom>
+        </p:spPr>
+      </p:pic>
+      <p:pic>
+        <p:nvPicPr>
+          <p:cNvPr id="7" name="Picture 6">
+            <a:extLst>
+              <a:ext uri="{FF2B5EF4-FFF2-40B4-BE49-F238E27FC236}">
+                <a16:creationId xmlns:a16="http://schemas.microsoft.com/office/drawing/2014/main" id="{6C1EB7EF-9136-E309-4111-B3055C33068D}"/>
+              </a:ext>
+            </a:extLst>
+          </p:cNvPr>
+          <p:cNvPicPr>
+            <a:picLocks noChangeAspect="1"/>
+          </p:cNvPicPr>
+          <p:nvPr/>
+        </p:nvPicPr>
+        <p:blipFill>
+          <a:blip r:embed="rId4"/>
+          <a:stretch>
+            <a:fillRect/>
+          </a:stretch>
+        </p:blipFill>
+        <p:spPr>
+          <a:xfrm>
+            <a:off x="5399523" y="3039581"/>
+            <a:ext cx="2495550" cy="809625"/>
+          </a:xfrm>
+          <a:prstGeom prst="rect">
+            <a:avLst/>
+          </a:prstGeom>
+        </p:spPr>
+      </p:pic>
+      <p:pic>
+        <p:nvPicPr>
+          <p:cNvPr id="9" name="Picture 8">
+            <a:extLst>
+              <a:ext uri="{FF2B5EF4-FFF2-40B4-BE49-F238E27FC236}">
+                <a16:creationId xmlns:a16="http://schemas.microsoft.com/office/drawing/2014/main" id="{EFC87DA0-6A97-77D0-B849-3989B4EE4FB5}"/>
+              </a:ext>
+            </a:extLst>
+          </p:cNvPr>
+          <p:cNvPicPr>
+            <a:picLocks noChangeAspect="1"/>
+          </p:cNvPicPr>
+          <p:nvPr/>
+        </p:nvPicPr>
+        <p:blipFill>
+          <a:blip r:embed="rId5"/>
+          <a:stretch>
+            <a:fillRect/>
+          </a:stretch>
+        </p:blipFill>
+        <p:spPr>
+          <a:xfrm>
+            <a:off x="5399523" y="4203459"/>
+            <a:ext cx="3800475" cy="828675"/>
+          </a:xfrm>
+          <a:prstGeom prst="rect">
+            <a:avLst/>
+          </a:prstGeom>
+        </p:spPr>
+      </p:pic>
+      <p:pic>
+        <p:nvPicPr>
+          <p:cNvPr id="11" name="Picture 10">
+            <a:extLst>
+              <a:ext uri="{FF2B5EF4-FFF2-40B4-BE49-F238E27FC236}">
+                <a16:creationId xmlns:a16="http://schemas.microsoft.com/office/drawing/2014/main" id="{061D3227-6B57-78E9-2D41-CF42C8D613FF}"/>
+              </a:ext>
+            </a:extLst>
+          </p:cNvPr>
+          <p:cNvPicPr>
+            <a:picLocks noChangeAspect="1"/>
+          </p:cNvPicPr>
+          <p:nvPr/>
+        </p:nvPicPr>
+        <p:blipFill>
+          <a:blip r:embed="rId6"/>
+          <a:stretch>
+            <a:fillRect/>
+          </a:stretch>
+        </p:blipFill>
+        <p:spPr>
+          <a:xfrm>
+            <a:off x="5399523" y="5386388"/>
+            <a:ext cx="3505200" cy="790575"/>
+          </a:xfrm>
+          <a:prstGeom prst="rect">
+            <a:avLst/>
+          </a:prstGeom>
+        </p:spPr>
+      </p:pic>
+      <p:sp>
+        <p:nvSpPr>
+          <p:cNvPr id="12" name="TextBox 11">
+            <a:extLst>
+              <a:ext uri="{FF2B5EF4-FFF2-40B4-BE49-F238E27FC236}">
+                <a16:creationId xmlns:a16="http://schemas.microsoft.com/office/drawing/2014/main" id="{623CF95F-1E58-0710-F896-5A422904230D}"/>
+              </a:ext>
+            </a:extLst>
+          </p:cNvPr>
+          <p:cNvSpPr txBox="1"/>
+          <p:nvPr/>
+        </p:nvSpPr>
+        <p:spPr>
+          <a:xfrm>
+            <a:off x="9514393" y="1961123"/>
+            <a:ext cx="2257063" cy="523220"/>
+          </a:xfrm>
+          <a:prstGeom prst="rect">
+            <a:avLst/>
+          </a:prstGeom>
+          <a:noFill/>
+        </p:spPr>
+        <p:txBody>
+          <a:bodyPr wrap="square" rtlCol="0">
+            <a:spAutoFit/>
+          </a:bodyPr>
+          <a:lstStyle/>
+          <a:p>
+            <a:pPr algn="l"/>
+            <a:r>
+              <a:rPr lang="de-DE" sz="1400" dirty="0"/>
+              <a:t>Gewichtsgradienten am Output Layer</a:t>
+            </a:r>
+          </a:p>
+        </p:txBody>
+      </p:sp>
+      <p:sp>
+        <p:nvSpPr>
+          <p:cNvPr id="13" name="TextBox 12">
+            <a:extLst>
+              <a:ext uri="{FF2B5EF4-FFF2-40B4-BE49-F238E27FC236}">
+                <a16:creationId xmlns:a16="http://schemas.microsoft.com/office/drawing/2014/main" id="{32515B93-7F0A-2FF8-89BD-41C718BBECA7}"/>
+              </a:ext>
+            </a:extLst>
+          </p:cNvPr>
+          <p:cNvSpPr txBox="1"/>
+          <p:nvPr/>
+        </p:nvSpPr>
+        <p:spPr>
+          <a:xfrm>
+            <a:off x="9514393" y="3182783"/>
+            <a:ext cx="2071868" cy="523220"/>
+          </a:xfrm>
+          <a:prstGeom prst="rect">
+            <a:avLst/>
+          </a:prstGeom>
+          <a:noFill/>
+        </p:spPr>
+        <p:txBody>
+          <a:bodyPr wrap="square" rtlCol="0">
+            <a:spAutoFit/>
+          </a:bodyPr>
+          <a:lstStyle/>
+          <a:p>
+            <a:pPr algn="l"/>
+            <a:r>
+              <a:rPr lang="de-DE" sz="1400" dirty="0"/>
+              <a:t>Biasgradienten am Output Layer</a:t>
+            </a:r>
+          </a:p>
+        </p:txBody>
+      </p:sp>
+      <p:sp>
+        <p:nvSpPr>
+          <p:cNvPr id="14" name="TextBox 13">
+            <a:extLst>
+              <a:ext uri="{FF2B5EF4-FFF2-40B4-BE49-F238E27FC236}">
+                <a16:creationId xmlns:a16="http://schemas.microsoft.com/office/drawing/2014/main" id="{3149D791-1838-5468-72DB-ED775F0C3215}"/>
+              </a:ext>
+            </a:extLst>
+          </p:cNvPr>
+          <p:cNvSpPr txBox="1"/>
+          <p:nvPr/>
+        </p:nvSpPr>
+        <p:spPr>
+          <a:xfrm>
+            <a:off x="9514393" y="4356186"/>
+            <a:ext cx="1701478" cy="523220"/>
+          </a:xfrm>
+          <a:prstGeom prst="rect">
+            <a:avLst/>
+          </a:prstGeom>
+          <a:noFill/>
+        </p:spPr>
+        <p:txBody>
+          <a:bodyPr wrap="square" rtlCol="0">
+            <a:spAutoFit/>
+          </a:bodyPr>
+          <a:lstStyle/>
+          <a:p>
+            <a:pPr algn="l"/>
+            <a:r>
+              <a:rPr lang="de-DE" sz="1400" dirty="0"/>
+              <a:t>Gewichtsgradienten am Hidden Layer</a:t>
+            </a:r>
+          </a:p>
+        </p:txBody>
+      </p:sp>
+      <p:sp>
+        <p:nvSpPr>
+          <p:cNvPr id="15" name="TextBox 14">
+            <a:extLst>
+              <a:ext uri="{FF2B5EF4-FFF2-40B4-BE49-F238E27FC236}">
+                <a16:creationId xmlns:a16="http://schemas.microsoft.com/office/drawing/2014/main" id="{CFD22221-7723-5609-4D7F-D3BB381585D4}"/>
+              </a:ext>
+            </a:extLst>
+          </p:cNvPr>
+          <p:cNvSpPr txBox="1"/>
+          <p:nvPr/>
+        </p:nvSpPr>
+        <p:spPr>
+          <a:xfrm>
+            <a:off x="9514393" y="5520065"/>
+            <a:ext cx="2048719" cy="523220"/>
+          </a:xfrm>
+          <a:prstGeom prst="rect">
+            <a:avLst/>
+          </a:prstGeom>
+          <a:noFill/>
+        </p:spPr>
+        <p:txBody>
+          <a:bodyPr wrap="square" rtlCol="0">
+            <a:spAutoFit/>
+          </a:bodyPr>
+          <a:lstStyle/>
+          <a:p>
+            <a:pPr algn="l"/>
+            <a:r>
+              <a:rPr lang="de-DE" sz="1400" dirty="0"/>
+              <a:t>Biasgradienten am Hidden Layer</a:t>
+            </a:r>
+          </a:p>
+        </p:txBody>
+      </p:sp>
+    </p:spTree>
+    <p:extLst>
+      <p:ext uri="{BB962C8B-B14F-4D97-AF65-F5344CB8AC3E}">
+        <p14:creationId xmlns:p14="http://schemas.microsoft.com/office/powerpoint/2010/main" val="3357872495"/>
+      </p:ext>
+    </p:extLst>
+  </p:cSld>
+  <p:clrMapOvr>
+    <a:masterClrMapping/>
+  </p:clrMapOvr>
+</p:sld>
+</file>
+
+<file path=ppt/slides/slide21.xml><?xml version="1.0" encoding="utf-8"?>
+<p:sld xmlns:a="http://schemas.openxmlformats.org/drawingml/2006/main" xmlns:r="http://schemas.openxmlformats.org/officeDocument/2006/relationships" xmlns:p="http://schemas.openxmlformats.org/presentationml/2006/main">
+  <p:cSld>
+    <p:spTree>
+      <p:nvGrpSpPr>
+        <p:cNvPr id="1" name=""/>
+        <p:cNvGrpSpPr/>
+        <p:nvPr/>
+      </p:nvGrpSpPr>
+      <p:grpSpPr>
+        <a:xfrm>
+          <a:off x="0" y="0"/>
+          <a:ext cx="0" cy="0"/>
+          <a:chOff x="0" y="0"/>
+          <a:chExt cx="0" cy="0"/>
+        </a:xfrm>
+      </p:grpSpPr>
+      <p:sp>
+        <p:nvSpPr>
+          <p:cNvPr id="2" name="Title 1">
+            <a:extLst>
+              <a:ext uri="{FF2B5EF4-FFF2-40B4-BE49-F238E27FC236}">
+                <a16:creationId xmlns:a16="http://schemas.microsoft.com/office/drawing/2014/main" id="{4FDDF432-0398-2860-1958-836C75D07FFA}"/>
+              </a:ext>
+            </a:extLst>
+          </p:cNvPr>
+          <p:cNvSpPr>
+            <a:spLocks noGrp="1"/>
+          </p:cNvSpPr>
+          <p:nvPr>
+            <p:ph type="title"/>
+          </p:nvPr>
+        </p:nvSpPr>
+        <p:spPr/>
+        <p:txBody>
+          <a:bodyPr/>
+          <a:lstStyle/>
+          <a:p>
+            <a:r>
+              <a:rPr lang="de-DE" dirty="0"/>
+              <a:t>Implementierung in Python</a:t>
+            </a:r>
+            <a:br>
+              <a:rPr lang="de-DE" dirty="0"/>
+            </a:br>
+            <a:r>
+              <a:rPr lang="de-DE" sz="2400" dirty="0"/>
+              <a:t>Numerische Stabilität in Aktivierungsfunktionen</a:t>
+            </a:r>
+            <a:endParaRPr lang="de-DE" dirty="0"/>
+          </a:p>
+        </p:txBody>
+      </p:sp>
+      <p:sp>
+        <p:nvSpPr>
+          <p:cNvPr id="3" name="Content Placeholder 2">
+            <a:extLst>
+              <a:ext uri="{FF2B5EF4-FFF2-40B4-BE49-F238E27FC236}">
+                <a16:creationId xmlns:a16="http://schemas.microsoft.com/office/drawing/2014/main" id="{833A09AB-4A21-E646-1F7B-0294BB95F879}"/>
+              </a:ext>
+            </a:extLst>
+          </p:cNvPr>
+          <p:cNvSpPr>
+            <a:spLocks noGrp="1"/>
+          </p:cNvSpPr>
+          <p:nvPr>
+            <p:ph idx="1"/>
+          </p:nvPr>
+        </p:nvSpPr>
+        <p:spPr>
+          <a:xfrm>
+            <a:off x="838200" y="1825625"/>
+            <a:ext cx="10366094" cy="1970871"/>
+          </a:xfrm>
+        </p:spPr>
+        <p:txBody>
+          <a:bodyPr>
+            <a:normAutofit/>
+          </a:bodyPr>
+          <a:lstStyle/>
+          <a:p>
+            <a:r>
+              <a:rPr lang="de-DE" sz="2000" dirty="0"/>
+              <a:t>Manche Aktivierungsfunktionen konvergieren schnell gegen plus/minus unendlich</a:t>
+            </a:r>
+          </a:p>
+          <a:p>
+            <a:pPr lvl="1"/>
+            <a:r>
+              <a:rPr lang="de-DE" sz="1600" dirty="0">
+                <a:sym typeface="Wingdings" panose="05000000000000000000" pitchFamily="2" charset="2"/>
+              </a:rPr>
+              <a:t> </a:t>
+            </a:r>
+            <a:r>
+              <a:rPr lang="de-DE" sz="1600" dirty="0" err="1">
+                <a:sym typeface="Wingdings" panose="05000000000000000000" pitchFamily="2" charset="2"/>
+              </a:rPr>
+              <a:t>np.Inf</a:t>
+            </a:r>
+            <a:r>
+              <a:rPr lang="de-DE" sz="1600" dirty="0">
+                <a:sym typeface="Wingdings" panose="05000000000000000000" pitchFamily="2" charset="2"/>
+              </a:rPr>
+              <a:t> oder </a:t>
+            </a:r>
+            <a:r>
+              <a:rPr lang="de-DE" sz="1600" dirty="0" err="1">
+                <a:sym typeface="Wingdings" panose="05000000000000000000" pitchFamily="2" charset="2"/>
+              </a:rPr>
+              <a:t>np.nan</a:t>
+            </a:r>
+            <a:r>
+              <a:rPr lang="de-DE" sz="1600" dirty="0">
+                <a:sym typeface="Wingdings" panose="05000000000000000000" pitchFamily="2" charset="2"/>
+              </a:rPr>
+              <a:t> als </a:t>
+            </a:r>
+            <a:r>
+              <a:rPr lang="de-DE" sz="1600" dirty="0" err="1">
+                <a:sym typeface="Wingdings" panose="05000000000000000000" pitchFamily="2" charset="2"/>
+              </a:rPr>
+              <a:t>Returnwert</a:t>
+            </a:r>
+            <a:endParaRPr lang="de-DE" sz="1600" dirty="0">
+              <a:sym typeface="Wingdings" panose="05000000000000000000" pitchFamily="2" charset="2"/>
+            </a:endParaRPr>
+          </a:p>
+          <a:p>
+            <a:pPr lvl="1"/>
+            <a:r>
+              <a:rPr lang="de-DE" sz="1600" dirty="0">
+                <a:sym typeface="Wingdings" panose="05000000000000000000" pitchFamily="2" charset="2"/>
+              </a:rPr>
+              <a:t> Fehler wird geworfen, Programm beendet</a:t>
+            </a:r>
+          </a:p>
+          <a:p>
+            <a:r>
+              <a:rPr lang="de-DE" sz="2000" dirty="0"/>
+              <a:t>Umformen der Aktivierungsfunktionen für positive/negative Inputs nötig</a:t>
+            </a:r>
+          </a:p>
+          <a:p>
+            <a:r>
+              <a:rPr lang="de-DE" sz="2000" dirty="0"/>
+              <a:t>Beispiel </a:t>
+            </a:r>
+            <a:r>
+              <a:rPr lang="de-DE" sz="2000" dirty="0" err="1"/>
+              <a:t>tanh</a:t>
+            </a:r>
+            <a:r>
+              <a:rPr lang="de-DE" sz="2000" dirty="0"/>
+              <a:t> Aktivierungsfunktion</a:t>
+            </a:r>
+          </a:p>
+        </p:txBody>
+      </p:sp>
+      <p:pic>
+        <p:nvPicPr>
+          <p:cNvPr id="5" name="Picture 4">
+            <a:extLst>
+              <a:ext uri="{FF2B5EF4-FFF2-40B4-BE49-F238E27FC236}">
+                <a16:creationId xmlns:a16="http://schemas.microsoft.com/office/drawing/2014/main" id="{500AC097-B3F5-5536-CBDE-33076C374A36}"/>
+              </a:ext>
+            </a:extLst>
+          </p:cNvPr>
+          <p:cNvPicPr>
+            <a:picLocks noChangeAspect="1"/>
+          </p:cNvPicPr>
+          <p:nvPr/>
+        </p:nvPicPr>
+        <p:blipFill rotWithShape="1">
+          <a:blip r:embed="rId2"/>
+          <a:srcRect l="4743" t="14518" r="4493" b="7561"/>
+          <a:stretch/>
+        </p:blipFill>
+        <p:spPr>
+          <a:xfrm>
+            <a:off x="4589363" y="5011840"/>
+            <a:ext cx="2801073" cy="972274"/>
+          </a:xfrm>
+          <a:prstGeom prst="rect">
+            <a:avLst/>
+          </a:prstGeom>
+        </p:spPr>
+      </p:pic>
+      <p:sp>
+        <p:nvSpPr>
+          <p:cNvPr id="6" name="TextBox 5">
+            <a:extLst>
+              <a:ext uri="{FF2B5EF4-FFF2-40B4-BE49-F238E27FC236}">
+                <a16:creationId xmlns:a16="http://schemas.microsoft.com/office/drawing/2014/main" id="{5EB3AEEC-AAEB-AA12-AAFA-F99AFBECB2A0}"/>
+              </a:ext>
+            </a:extLst>
+          </p:cNvPr>
+          <p:cNvSpPr txBox="1"/>
+          <p:nvPr/>
+        </p:nvSpPr>
+        <p:spPr>
+          <a:xfrm>
+            <a:off x="4479403" y="4177305"/>
+            <a:ext cx="3020992" cy="954107"/>
+          </a:xfrm>
+          <a:prstGeom prst="rect">
+            <a:avLst/>
+          </a:prstGeom>
+          <a:noFill/>
+        </p:spPr>
+        <p:txBody>
+          <a:bodyPr wrap="square" rtlCol="0">
+            <a:spAutoFit/>
+          </a:bodyPr>
+          <a:lstStyle/>
+          <a:p>
+            <a:pPr algn="l"/>
+            <a:r>
+              <a:rPr lang="de-DE" sz="1400" dirty="0"/>
+              <a:t>Gewöhnliche Form: Wenn z &lt; 0 und |z| hoch, dann </a:t>
+            </a:r>
+            <a:r>
+              <a:rPr lang="de-DE" sz="1400" dirty="0" err="1"/>
+              <a:t>exp</a:t>
+            </a:r>
+            <a:r>
+              <a:rPr lang="de-DE" sz="1400" dirty="0"/>
+              <a:t>(-z) </a:t>
+            </a:r>
+            <a:r>
+              <a:rPr lang="de-DE" sz="1400" dirty="0">
+                <a:sym typeface="Wingdings" panose="05000000000000000000" pitchFamily="2" charset="2"/>
+              </a:rPr>
+              <a:t> </a:t>
+            </a:r>
+            <a:r>
+              <a:rPr lang="de-DE" sz="1400" dirty="0"/>
+              <a:t>unendlich. Wenn z &gt; 0 und |z| hoch, dann </a:t>
+            </a:r>
+            <a:r>
+              <a:rPr lang="de-DE" sz="1400" dirty="0" err="1"/>
+              <a:t>exp</a:t>
+            </a:r>
+            <a:r>
+              <a:rPr lang="de-DE" sz="1400" dirty="0"/>
+              <a:t>(z) </a:t>
+            </a:r>
+            <a:r>
+              <a:rPr lang="de-DE" sz="1400" dirty="0">
+                <a:sym typeface="Wingdings" panose="05000000000000000000" pitchFamily="2" charset="2"/>
+              </a:rPr>
+              <a:t> unendlich</a:t>
+            </a:r>
+            <a:endParaRPr lang="de-DE" sz="1400" dirty="0"/>
+          </a:p>
+        </p:txBody>
+      </p:sp>
+      <p:pic>
+        <p:nvPicPr>
+          <p:cNvPr id="8" name="Picture 7">
+            <a:extLst>
+              <a:ext uri="{FF2B5EF4-FFF2-40B4-BE49-F238E27FC236}">
+                <a16:creationId xmlns:a16="http://schemas.microsoft.com/office/drawing/2014/main" id="{26C1852D-CE09-38CB-DD17-DFA9F6164A0F}"/>
+              </a:ext>
+            </a:extLst>
+          </p:cNvPr>
+          <p:cNvPicPr>
+            <a:picLocks noChangeAspect="1"/>
+          </p:cNvPicPr>
+          <p:nvPr/>
+        </p:nvPicPr>
+        <p:blipFill rotWithShape="1">
+          <a:blip r:embed="rId3"/>
+          <a:srcRect l="4987" t="13494" b="8552"/>
+          <a:stretch/>
+        </p:blipFill>
+        <p:spPr>
+          <a:xfrm>
+            <a:off x="8420581" y="5107960"/>
+            <a:ext cx="2696902" cy="876154"/>
+          </a:xfrm>
+          <a:prstGeom prst="rect">
+            <a:avLst/>
+          </a:prstGeom>
+        </p:spPr>
+      </p:pic>
+      <p:sp>
+        <p:nvSpPr>
+          <p:cNvPr id="9" name="TextBox 8">
+            <a:extLst>
+              <a:ext uri="{FF2B5EF4-FFF2-40B4-BE49-F238E27FC236}">
+                <a16:creationId xmlns:a16="http://schemas.microsoft.com/office/drawing/2014/main" id="{76F87FFF-E813-78C2-4603-836321471E94}"/>
+              </a:ext>
+            </a:extLst>
+          </p:cNvPr>
+          <p:cNvSpPr txBox="1"/>
+          <p:nvPr/>
+        </p:nvSpPr>
+        <p:spPr>
+          <a:xfrm>
+            <a:off x="8507392" y="4177305"/>
+            <a:ext cx="2523281" cy="738664"/>
+          </a:xfrm>
+          <a:prstGeom prst="rect">
+            <a:avLst/>
+          </a:prstGeom>
+          <a:noFill/>
+        </p:spPr>
+        <p:txBody>
+          <a:bodyPr wrap="square" rtlCol="0">
+            <a:spAutoFit/>
+          </a:bodyPr>
+          <a:lstStyle/>
+          <a:p>
+            <a:pPr algn="l"/>
+            <a:r>
+              <a:rPr lang="de-DE" sz="1400" dirty="0"/>
+              <a:t>Neue Version für </a:t>
+            </a:r>
+            <a:r>
+              <a:rPr lang="de-DE" sz="1400" b="1" dirty="0"/>
+              <a:t>positive</a:t>
+            </a:r>
+            <a:r>
+              <a:rPr lang="de-DE" sz="1400" dirty="0"/>
+              <a:t> z: Nun, wenn z &gt; 0 und |z| hoch, dann </a:t>
+            </a:r>
+            <a:r>
+              <a:rPr lang="de-DE" sz="1400" dirty="0" err="1"/>
+              <a:t>exp</a:t>
+            </a:r>
+            <a:r>
+              <a:rPr lang="de-DE" sz="1400" dirty="0"/>
+              <a:t>(-z) </a:t>
+            </a:r>
+            <a:r>
+              <a:rPr lang="de-DE" sz="1400" dirty="0">
+                <a:sym typeface="Wingdings" panose="05000000000000000000" pitchFamily="2" charset="2"/>
+              </a:rPr>
+              <a:t> 0</a:t>
+            </a:r>
+            <a:endParaRPr lang="de-DE" sz="1400" dirty="0"/>
+          </a:p>
+        </p:txBody>
+      </p:sp>
+      <p:pic>
+        <p:nvPicPr>
+          <p:cNvPr id="11" name="Picture 10">
+            <a:extLst>
+              <a:ext uri="{FF2B5EF4-FFF2-40B4-BE49-F238E27FC236}">
+                <a16:creationId xmlns:a16="http://schemas.microsoft.com/office/drawing/2014/main" id="{81B5D5C5-E232-F24B-B011-E324CBFAA2F6}"/>
+              </a:ext>
+            </a:extLst>
+          </p:cNvPr>
+          <p:cNvPicPr>
+            <a:picLocks noChangeAspect="1"/>
+          </p:cNvPicPr>
+          <p:nvPr/>
+        </p:nvPicPr>
+        <p:blipFill rotWithShape="1">
+          <a:blip r:embed="rId4"/>
+          <a:srcRect l="5278" t="9664" r="5665" b="14939"/>
+          <a:stretch/>
+        </p:blipFill>
+        <p:spPr>
+          <a:xfrm>
+            <a:off x="1120815" y="5107960"/>
+            <a:ext cx="2392102" cy="876154"/>
+          </a:xfrm>
+          <a:prstGeom prst="rect">
+            <a:avLst/>
+          </a:prstGeom>
+        </p:spPr>
+      </p:pic>
+      <p:sp>
+        <p:nvSpPr>
+          <p:cNvPr id="12" name="TextBox 11">
+            <a:extLst>
+              <a:ext uri="{FF2B5EF4-FFF2-40B4-BE49-F238E27FC236}">
+                <a16:creationId xmlns:a16="http://schemas.microsoft.com/office/drawing/2014/main" id="{12FB9700-5DF7-DCC5-1FA6-48137B098037}"/>
+              </a:ext>
+            </a:extLst>
+          </p:cNvPr>
+          <p:cNvSpPr txBox="1"/>
+          <p:nvPr/>
+        </p:nvSpPr>
+        <p:spPr>
+          <a:xfrm>
+            <a:off x="987706" y="4177305"/>
+            <a:ext cx="2658321" cy="738664"/>
+          </a:xfrm>
+          <a:prstGeom prst="rect">
+            <a:avLst/>
+          </a:prstGeom>
+          <a:noFill/>
+        </p:spPr>
+        <p:txBody>
+          <a:bodyPr wrap="square" rtlCol="0">
+            <a:spAutoFit/>
+          </a:bodyPr>
+          <a:lstStyle/>
+          <a:p>
+            <a:pPr algn="l"/>
+            <a:r>
+              <a:rPr lang="de-DE" sz="1400" dirty="0"/>
+              <a:t>Neue Version für </a:t>
+            </a:r>
+            <a:r>
+              <a:rPr lang="de-DE" sz="1400" b="1" dirty="0"/>
+              <a:t>negative</a:t>
+            </a:r>
+            <a:r>
+              <a:rPr lang="de-DE" sz="1400" dirty="0"/>
+              <a:t> z: Nun, wenn z &lt; 0 und |z| hoch, dann </a:t>
+            </a:r>
+            <a:r>
+              <a:rPr lang="de-DE" sz="1400" dirty="0" err="1"/>
+              <a:t>exp</a:t>
+            </a:r>
+            <a:r>
+              <a:rPr lang="de-DE" sz="1400" dirty="0"/>
+              <a:t>(-z) </a:t>
+            </a:r>
+            <a:r>
+              <a:rPr lang="de-DE" sz="1400" dirty="0">
+                <a:sym typeface="Wingdings" panose="05000000000000000000" pitchFamily="2" charset="2"/>
+              </a:rPr>
+              <a:t> 0</a:t>
+            </a:r>
+            <a:endParaRPr lang="de-DE" sz="1400" dirty="0"/>
+          </a:p>
+        </p:txBody>
+      </p:sp>
+      <p:sp>
+        <p:nvSpPr>
+          <p:cNvPr id="13" name="Multiplication Sign 12">
+            <a:extLst>
+              <a:ext uri="{FF2B5EF4-FFF2-40B4-BE49-F238E27FC236}">
+                <a16:creationId xmlns:a16="http://schemas.microsoft.com/office/drawing/2014/main" id="{5647AAB3-CB26-5216-DDA7-B594D2ACC08B}"/>
+              </a:ext>
+            </a:extLst>
+          </p:cNvPr>
+          <p:cNvSpPr/>
+          <p:nvPr/>
+        </p:nvSpPr>
+        <p:spPr>
+          <a:xfrm>
+            <a:off x="4479403" y="3651814"/>
+            <a:ext cx="2801073" cy="2720051"/>
+          </a:xfrm>
+          <a:prstGeom prst="mathMultiply">
+            <a:avLst/>
+          </a:prstGeom>
+          <a:solidFill>
+            <a:schemeClr val="tx1"/>
+          </a:solidFill>
+          <a:ln>
+            <a:noFill/>
+          </a:ln>
+        </p:spPr>
+        <p:style>
+          <a:lnRef idx="2">
+            <a:schemeClr val="accent1">
+              <a:shade val="50000"/>
+            </a:schemeClr>
+          </a:lnRef>
+          <a:fillRef idx="1">
+            <a:schemeClr val="accent1"/>
+          </a:fillRef>
+          <a:effectRef idx="0">
+            <a:schemeClr val="accent1"/>
+          </a:effectRef>
+          <a:fontRef idx="minor">
+            <a:schemeClr val="lt1"/>
+          </a:fontRef>
+        </p:style>
+        <p:txBody>
+          <a:bodyPr rtlCol="0" anchor="ctr"/>
+          <a:lstStyle/>
+          <a:p>
+            <a:pPr algn="ctr"/>
+            <a:endParaRPr lang="de-DE"/>
+          </a:p>
+        </p:txBody>
+      </p:sp>
+    </p:spTree>
+    <p:extLst>
+      <p:ext uri="{BB962C8B-B14F-4D97-AF65-F5344CB8AC3E}">
+        <p14:creationId xmlns:p14="http://schemas.microsoft.com/office/powerpoint/2010/main" val="748521114"/>
+      </p:ext>
+    </p:extLst>
+  </p:cSld>
+  <p:clrMapOvr>
+    <a:masterClrMapping/>
+  </p:clrMapOvr>
+  <p:timing>
+    <p:tnLst>
+      <p:par>
+        <p:cTn id="1" dur="indefinite" restart="never" nodeType="tmRoot">
+          <p:childTnLst>
+            <p:seq concurrent="1" nextAc="seek">
+              <p:cTn id="2" dur="indefinite" nodeType="mainSeq">
+                <p:childTnLst>
+                  <p:par>
+                    <p:cTn id="3" fill="hold">
+                      <p:stCondLst>
+                        <p:cond delay="indefinite"/>
+                      </p:stCondLst>
+                      <p:childTnLst>
+                        <p:par>
+                          <p:cTn id="4" fill="hold">
+                            <p:stCondLst>
+                              <p:cond delay="0"/>
+                            </p:stCondLst>
+                            <p:childTnLst>
+                              <p:par>
+                                <p:cTn id="5" presetID="1" presetClass="entr" presetSubtype="0" fill="hold" nodeType="clickEffect">
+                                  <p:stCondLst>
+                                    <p:cond delay="0"/>
+                                  </p:stCondLst>
+                                  <p:childTnLst>
+                                    <p:set>
+                                      <p:cBhvr>
+                                        <p:cTn id="6" dur="1" fill="hold">
+                                          <p:stCondLst>
+                                            <p:cond delay="0"/>
+                                          </p:stCondLst>
+                                        </p:cTn>
+                                        <p:tgtEl>
+                                          <p:spTgt spid="3">
+                                            <p:txEl>
+                                              <p:pRg st="0" end="0"/>
+                                            </p:txEl>
+                                          </p:spTgt>
+                                        </p:tgtEl>
+                                        <p:attrNameLst>
+                                          <p:attrName>style.visibility</p:attrName>
+                                        </p:attrNameLst>
+                                      </p:cBhvr>
+                                      <p:to>
+                                        <p:strVal val="visible"/>
+                                      </p:to>
+                                    </p:set>
+                                  </p:childTnLst>
+                                </p:cTn>
+                              </p:par>
+                              <p:par>
+                                <p:cTn id="7" presetID="1" presetClass="entr" presetSubtype="0" fill="hold" nodeType="withEffect">
+                                  <p:stCondLst>
+                                    <p:cond delay="0"/>
+                                  </p:stCondLst>
+                                  <p:childTnLst>
+                                    <p:set>
+                                      <p:cBhvr>
+                                        <p:cTn id="8" dur="1" fill="hold">
+                                          <p:stCondLst>
+                                            <p:cond delay="0"/>
+                                          </p:stCondLst>
+                                        </p:cTn>
+                                        <p:tgtEl>
+                                          <p:spTgt spid="3">
+                                            <p:txEl>
+                                              <p:pRg st="1" end="1"/>
+                                            </p:txEl>
+                                          </p:spTgt>
+                                        </p:tgtEl>
+                                        <p:attrNameLst>
+                                          <p:attrName>style.visibility</p:attrName>
+                                        </p:attrNameLst>
+                                      </p:cBhvr>
+                                      <p:to>
+                                        <p:strVal val="visible"/>
+                                      </p:to>
+                                    </p:set>
+                                  </p:childTnLst>
+                                </p:cTn>
+                              </p:par>
+                              <p:par>
+                                <p:cTn id="9" presetID="1" presetClass="entr" presetSubtype="0" fill="hold" nodeType="withEffect">
+                                  <p:stCondLst>
+                                    <p:cond delay="0"/>
+                                  </p:stCondLst>
+                                  <p:childTnLst>
+                                    <p:set>
+                                      <p:cBhvr>
+                                        <p:cTn id="10" dur="1" fill="hold">
+                                          <p:stCondLst>
+                                            <p:cond delay="0"/>
+                                          </p:stCondLst>
+                                        </p:cTn>
+                                        <p:tgtEl>
+                                          <p:spTgt spid="3">
+                                            <p:txEl>
+                                              <p:pRg st="2" end="2"/>
+                                            </p:txEl>
+                                          </p:spTgt>
+                                        </p:tgtEl>
+                                        <p:attrNameLst>
+                                          <p:attrName>style.visibility</p:attrName>
+                                        </p:attrNameLst>
+                                      </p:cBhvr>
+                                      <p:to>
+                                        <p:strVal val="visible"/>
+                                      </p:to>
+                                    </p:set>
+                                  </p:childTnLst>
+                                </p:cTn>
+                              </p:par>
+                              <p:par>
+                                <p:cTn id="11" presetID="1" presetClass="entr" presetSubtype="0" fill="hold" nodeType="withEffect">
+                                  <p:stCondLst>
+                                    <p:cond delay="0"/>
+                                  </p:stCondLst>
+                                  <p:childTnLst>
+                                    <p:set>
+                                      <p:cBhvr>
+                                        <p:cTn id="12" dur="1" fill="hold">
+                                          <p:stCondLst>
+                                            <p:cond delay="0"/>
+                                          </p:stCondLst>
+                                        </p:cTn>
+                                        <p:tgtEl>
+                                          <p:spTgt spid="3">
+                                            <p:txEl>
+                                              <p:pRg st="3" end="3"/>
+                                            </p:txEl>
+                                          </p:spTgt>
+                                        </p:tgtEl>
+                                        <p:attrNameLst>
+                                          <p:attrName>style.visibility</p:attrName>
+                                        </p:attrNameLst>
+                                      </p:cBhvr>
+                                      <p:to>
+                                        <p:strVal val="visible"/>
+                                      </p:to>
+                                    </p:set>
+                                  </p:childTnLst>
+                                </p:cTn>
+                              </p:par>
+                              <p:par>
+                                <p:cTn id="13" presetID="1" presetClass="entr" presetSubtype="0" fill="hold" nodeType="withEffect">
+                                  <p:stCondLst>
+                                    <p:cond delay="0"/>
+                                  </p:stCondLst>
+                                  <p:childTnLst>
+                                    <p:set>
+                                      <p:cBhvr>
+                                        <p:cTn id="14" dur="1" fill="hold">
+                                          <p:stCondLst>
+                                            <p:cond delay="0"/>
+                                          </p:stCondLst>
+                                        </p:cTn>
+                                        <p:tgtEl>
+                                          <p:spTgt spid="3">
+                                            <p:txEl>
+                                              <p:pRg st="4" end="4"/>
+                                            </p:txEl>
+                                          </p:spTgt>
+                                        </p:tgtEl>
+                                        <p:attrNameLst>
+                                          <p:attrName>style.visibility</p:attrName>
+                                        </p:attrNameLst>
+                                      </p:cBhvr>
+                                      <p:to>
+                                        <p:strVal val="visible"/>
+                                      </p:to>
+                                    </p:set>
+                                  </p:childTnLst>
+                                </p:cTn>
+                              </p:par>
+                            </p:childTnLst>
+                          </p:cTn>
+                        </p:par>
+                      </p:childTnLst>
+                    </p:cTn>
+                  </p:par>
+                  <p:par>
+                    <p:cTn id="15" fill="hold">
+                      <p:stCondLst>
+                        <p:cond delay="indefinite"/>
+                      </p:stCondLst>
+                      <p:childTnLst>
+                        <p:par>
+                          <p:cTn id="16" fill="hold">
+                            <p:stCondLst>
+                              <p:cond delay="0"/>
+                            </p:stCondLst>
+                            <p:childTnLst>
+                              <p:par>
+                                <p:cTn id="17" presetID="1" presetClass="entr" presetSubtype="0" fill="hold" grpId="0" nodeType="clickEffect">
+                                  <p:stCondLst>
+                                    <p:cond delay="0"/>
+                                  </p:stCondLst>
+                                  <p:childTnLst>
+                                    <p:set>
+                                      <p:cBhvr>
+                                        <p:cTn id="18" dur="1" fill="hold">
+                                          <p:stCondLst>
+                                            <p:cond delay="0"/>
+                                          </p:stCondLst>
+                                        </p:cTn>
+                                        <p:tgtEl>
+                                          <p:spTgt spid="6"/>
+                                        </p:tgtEl>
+                                        <p:attrNameLst>
+                                          <p:attrName>style.visibility</p:attrName>
+                                        </p:attrNameLst>
+                                      </p:cBhvr>
+                                      <p:to>
+                                        <p:strVal val="visible"/>
+                                      </p:to>
+                                    </p:set>
+                                  </p:childTnLst>
+                                </p:cTn>
+                              </p:par>
+                              <p:par>
+                                <p:cTn id="19" presetID="1" presetClass="entr" presetSubtype="0" fill="hold" nodeType="withEffect">
+                                  <p:stCondLst>
+                                    <p:cond delay="0"/>
+                                  </p:stCondLst>
+                                  <p:childTnLst>
+                                    <p:set>
+                                      <p:cBhvr>
+                                        <p:cTn id="20" dur="1" fill="hold">
+                                          <p:stCondLst>
+                                            <p:cond delay="0"/>
+                                          </p:stCondLst>
+                                        </p:cTn>
+                                        <p:tgtEl>
+                                          <p:spTgt spid="5"/>
+                                        </p:tgtEl>
+                                        <p:attrNameLst>
+                                          <p:attrName>style.visibility</p:attrName>
+                                        </p:attrNameLst>
+                                      </p:cBhvr>
+                                      <p:to>
+                                        <p:strVal val="visible"/>
+                                      </p:to>
+                                    </p:set>
+                                  </p:childTnLst>
+                                </p:cTn>
+                              </p:par>
+                            </p:childTnLst>
+                          </p:cTn>
+                        </p:par>
+                      </p:childTnLst>
+                    </p:cTn>
+                  </p:par>
+                  <p:par>
+                    <p:cTn id="21" fill="hold">
+                      <p:stCondLst>
+                        <p:cond delay="indefinite"/>
+                      </p:stCondLst>
+                      <p:childTnLst>
+                        <p:par>
+                          <p:cTn id="22" fill="hold">
+                            <p:stCondLst>
+                              <p:cond delay="0"/>
+                            </p:stCondLst>
+                            <p:childTnLst>
+                              <p:par>
+                                <p:cTn id="23" presetID="1" presetClass="entr" presetSubtype="0" fill="hold" grpId="0" nodeType="clickEffect">
+                                  <p:stCondLst>
+                                    <p:cond delay="0"/>
+                                  </p:stCondLst>
+                                  <p:childTnLst>
+                                    <p:set>
+                                      <p:cBhvr>
+                                        <p:cTn id="24" dur="1" fill="hold">
+                                          <p:stCondLst>
+                                            <p:cond delay="0"/>
+                                          </p:stCondLst>
+                                        </p:cTn>
+                                        <p:tgtEl>
+                                          <p:spTgt spid="12"/>
+                                        </p:tgtEl>
+                                        <p:attrNameLst>
+                                          <p:attrName>style.visibility</p:attrName>
+                                        </p:attrNameLst>
+                                      </p:cBhvr>
+                                      <p:to>
+                                        <p:strVal val="visible"/>
+                                      </p:to>
+                                    </p:set>
+                                  </p:childTnLst>
+                                </p:cTn>
+                              </p:par>
+                              <p:par>
+                                <p:cTn id="25" presetID="1" presetClass="entr" presetSubtype="0" fill="hold" nodeType="withEffect">
+                                  <p:stCondLst>
+                                    <p:cond delay="0"/>
+                                  </p:stCondLst>
+                                  <p:childTnLst>
+                                    <p:set>
+                                      <p:cBhvr>
+                                        <p:cTn id="26" dur="1" fill="hold">
+                                          <p:stCondLst>
+                                            <p:cond delay="0"/>
+                                          </p:stCondLst>
+                                        </p:cTn>
+                                        <p:tgtEl>
+                                          <p:spTgt spid="11"/>
+                                        </p:tgtEl>
+                                        <p:attrNameLst>
+                                          <p:attrName>style.visibility</p:attrName>
+                                        </p:attrNameLst>
+                                      </p:cBhvr>
+                                      <p:to>
+                                        <p:strVal val="visible"/>
+                                      </p:to>
+                                    </p:set>
+                                  </p:childTnLst>
+                                </p:cTn>
+                              </p:par>
+                              <p:par>
+                                <p:cTn id="27" presetID="1" presetClass="entr" presetSubtype="0" fill="hold" grpId="0" nodeType="withEffect">
+                                  <p:stCondLst>
+                                    <p:cond delay="0"/>
+                                  </p:stCondLst>
+                                  <p:childTnLst>
+                                    <p:set>
+                                      <p:cBhvr>
+                                        <p:cTn id="28" dur="1" fill="hold">
+                                          <p:stCondLst>
+                                            <p:cond delay="0"/>
+                                          </p:stCondLst>
+                                        </p:cTn>
+                                        <p:tgtEl>
+                                          <p:spTgt spid="9"/>
+                                        </p:tgtEl>
+                                        <p:attrNameLst>
+                                          <p:attrName>style.visibility</p:attrName>
+                                        </p:attrNameLst>
+                                      </p:cBhvr>
+                                      <p:to>
+                                        <p:strVal val="visible"/>
+                                      </p:to>
+                                    </p:set>
+                                  </p:childTnLst>
+                                </p:cTn>
+                              </p:par>
+                              <p:par>
+                                <p:cTn id="29" presetID="1" presetClass="entr" presetSubtype="0" fill="hold" nodeType="withEffect">
+                                  <p:stCondLst>
+                                    <p:cond delay="0"/>
+                                  </p:stCondLst>
+                                  <p:childTnLst>
+                                    <p:set>
+                                      <p:cBhvr>
+                                        <p:cTn id="30" dur="1" fill="hold">
+                                          <p:stCondLst>
+                                            <p:cond delay="0"/>
+                                          </p:stCondLst>
+                                        </p:cTn>
+                                        <p:tgtEl>
+                                          <p:spTgt spid="8"/>
+                                        </p:tgtEl>
+                                        <p:attrNameLst>
+                                          <p:attrName>style.visibility</p:attrName>
+                                        </p:attrNameLst>
+                                      </p:cBhvr>
+                                      <p:to>
+                                        <p:strVal val="visible"/>
+                                      </p:to>
+                                    </p:set>
+                                  </p:childTnLst>
+                                </p:cTn>
+                              </p:par>
+                              <p:par>
+                                <p:cTn id="31" presetID="1" presetClass="entr" presetSubtype="0" fill="hold" grpId="0" nodeType="withEffect">
+                                  <p:stCondLst>
+                                    <p:cond delay="0"/>
+                                  </p:stCondLst>
+                                  <p:childTnLst>
+                                    <p:set>
+                                      <p:cBhvr>
+                                        <p:cTn id="32" dur="1" fill="hold">
+                                          <p:stCondLst>
+                                            <p:cond delay="0"/>
+                                          </p:stCondLst>
+                                        </p:cTn>
+                                        <p:tgtEl>
+                                          <p:spTgt spid="13"/>
+                                        </p:tgtEl>
+                                        <p:attrNameLst>
+                                          <p:attrName>style.visibility</p:attrName>
+                                        </p:attrNameLst>
+                                      </p:cBhvr>
+                                      <p:to>
+                                        <p:strVal val="visible"/>
+                                      </p:to>
+                                    </p:set>
+                                  </p:childTnLst>
+                                </p:cTn>
+                              </p:par>
+                            </p:childTnLst>
+                          </p:cTn>
+                        </p:par>
+                      </p:childTnLst>
+                    </p:cTn>
+                  </p:par>
+                </p:childTnLst>
+              </p:cTn>
+              <p:prevCondLst>
+                <p:cond evt="onPrev" delay="0">
+                  <p:tgtEl>
+                    <p:sldTgt/>
+                  </p:tgtEl>
+                </p:cond>
+              </p:prevCondLst>
+              <p:nextCondLst>
+                <p:cond evt="onNext" delay="0">
+                  <p:tgtEl>
+                    <p:sldTgt/>
+                  </p:tgtEl>
+                </p:cond>
+              </p:nextCondLst>
+            </p:seq>
+          </p:childTnLst>
+        </p:cTn>
+      </p:par>
+    </p:tnLst>
+    <p:bldLst>
+      <p:bldP spid="6" grpId="0"/>
+      <p:bldP spid="9" grpId="0"/>
+      <p:bldP spid="12" grpId="0"/>
+      <p:bldP spid="13" grpId="0" animBg="1"/>
+    </p:bldLst>
+  </p:timing>
+</p:sld>
+</file>
+
+<file path=ppt/slides/slide22.xml><?xml version="1.0" encoding="utf-8"?>
+<p:sld xmlns:a="http://schemas.openxmlformats.org/drawingml/2006/main" xmlns:r="http://schemas.openxmlformats.org/officeDocument/2006/relationships" xmlns:p="http://schemas.openxmlformats.org/presentationml/2006/main">
+  <p:cSld>
+    <p:spTree>
+      <p:nvGrpSpPr>
+        <p:cNvPr id="1" name=""/>
+        <p:cNvGrpSpPr/>
+        <p:nvPr/>
+      </p:nvGrpSpPr>
+      <p:grpSpPr>
+        <a:xfrm>
+          <a:off x="0" y="0"/>
+          <a:ext cx="0" cy="0"/>
+          <a:chOff x="0" y="0"/>
+          <a:chExt cx="0" cy="0"/>
+        </a:xfrm>
+      </p:grpSpPr>
+      <p:sp>
+        <p:nvSpPr>
+          <p:cNvPr id="2" name="Title 1">
+            <a:extLst>
+              <a:ext uri="{FF2B5EF4-FFF2-40B4-BE49-F238E27FC236}">
+                <a16:creationId xmlns:a16="http://schemas.microsoft.com/office/drawing/2014/main" id="{4FDDF432-0398-2860-1958-836C75D07FFA}"/>
+              </a:ext>
+            </a:extLst>
+          </p:cNvPr>
+          <p:cNvSpPr>
+            <a:spLocks noGrp="1"/>
+          </p:cNvSpPr>
+          <p:nvPr>
+            <p:ph type="title"/>
+          </p:nvPr>
+        </p:nvSpPr>
+        <p:spPr/>
+        <p:txBody>
+          <a:bodyPr/>
+          <a:lstStyle/>
+          <a:p>
+            <a:r>
+              <a:rPr lang="de-DE" dirty="0"/>
+              <a:t>Implementierung in Python</a:t>
+            </a:r>
+            <a:br>
+              <a:rPr lang="de-DE" dirty="0"/>
+            </a:br>
+            <a:r>
+              <a:rPr lang="de-DE" sz="2400" dirty="0"/>
+              <a:t>Verbesserungsmöglichkeiten</a:t>
+            </a:r>
+            <a:endParaRPr lang="de-DE" dirty="0"/>
+          </a:p>
+        </p:txBody>
+      </p:sp>
+      <p:sp>
+        <p:nvSpPr>
+          <p:cNvPr id="3" name="Content Placeholder 2">
+            <a:extLst>
+              <a:ext uri="{FF2B5EF4-FFF2-40B4-BE49-F238E27FC236}">
+                <a16:creationId xmlns:a16="http://schemas.microsoft.com/office/drawing/2014/main" id="{833A09AB-4A21-E646-1F7B-0294BB95F879}"/>
+              </a:ext>
+            </a:extLst>
+          </p:cNvPr>
+          <p:cNvSpPr>
+            <a:spLocks noGrp="1"/>
+          </p:cNvSpPr>
+          <p:nvPr>
+            <p:ph idx="1"/>
+          </p:nvPr>
+        </p:nvSpPr>
+        <p:spPr/>
+        <p:txBody>
+          <a:bodyPr/>
+          <a:lstStyle/>
+          <a:p>
+            <a:r>
+              <a:rPr lang="de-DE" dirty="0"/>
+              <a:t>Schlauere Initialisierung der Gewichte um Training zu beschleunigen</a:t>
+            </a:r>
+          </a:p>
+          <a:p>
+            <a:r>
+              <a:rPr lang="de-DE" dirty="0"/>
+              <a:t>Schlauere Anpassung der Gewichte und Biases um Training zu beschleunigen</a:t>
+            </a:r>
+          </a:p>
+          <a:p>
+            <a:pPr lvl="1"/>
+            <a:r>
+              <a:rPr lang="de-DE" dirty="0"/>
+              <a:t>Stochastic Gradient Descent mit Momentum</a:t>
+            </a:r>
+          </a:p>
+          <a:p>
+            <a:pPr lvl="1"/>
+            <a:r>
+              <a:rPr lang="de-DE" dirty="0"/>
+              <a:t>Learning Rate Decay</a:t>
+            </a:r>
+          </a:p>
+          <a:p>
+            <a:pPr lvl="1"/>
+            <a:r>
+              <a:rPr lang="de-DE" dirty="0" err="1"/>
+              <a:t>RMSProp</a:t>
+            </a:r>
+            <a:r>
+              <a:rPr lang="de-DE" dirty="0"/>
+              <a:t> Optimierer</a:t>
+            </a:r>
+          </a:p>
+          <a:p>
+            <a:pPr lvl="1"/>
+            <a:r>
+              <a:rPr lang="de-DE" dirty="0"/>
+              <a:t>Adam Optimierer</a:t>
+            </a:r>
+          </a:p>
+          <a:p>
+            <a:r>
+              <a:rPr lang="de-DE" dirty="0"/>
+              <a:t>CNN und RNN Layer</a:t>
+            </a:r>
+          </a:p>
+          <a:p>
+            <a:r>
+              <a:rPr lang="de-DE" dirty="0"/>
+              <a:t>Loggen / Darstellen der Gradienten während des Trainings</a:t>
+            </a:r>
+          </a:p>
+        </p:txBody>
+      </p:sp>
+    </p:spTree>
+    <p:extLst>
+      <p:ext uri="{BB962C8B-B14F-4D97-AF65-F5344CB8AC3E}">
+        <p14:creationId xmlns:p14="http://schemas.microsoft.com/office/powerpoint/2010/main" val="1567722183"/>
       </p:ext>
     </p:extLst>
   </p:cSld>

</xml_diff>